<commit_message>
Built site for cmapplot: 0.9.1@2c0f19c
</commit_message>
<xml_diff>
--- a/reference/figures/margins.pptx
+++ b/reference/figures/margins.pptx
@@ -104,6 +104,11 @@
       </a:defRPr>
     </a:lvl9pPr>
   </p:defaultTextStyle>
+  <p:extLst>
+    <p:ext uri="{EFAFB233-063F-42B5-8137-9DF3F51BA10A}">
+      <p15:sldGuideLst xmlns:p15="http://schemas.microsoft.com/office/powerpoint/2012/main"/>
+    </p:ext>
+  </p:extLst>
 </p:presentation>
 </file>
 
@@ -238,7 +243,7 @@
           <a:p>
             <a:fld id="{601E7828-7FC6-4336-B4EC-5F99010F00A5}" type="datetimeFigureOut">
               <a:rPr lang="en-US" smtClean="0"/>
-              <a:t>10/10/2020</a:t>
+              <a:t>11/2/2020</a:t>
             </a:fld>
             <a:endParaRPr lang="en-US"/>
           </a:p>
@@ -408,7 +413,7 @@
           <a:p>
             <a:fld id="{601E7828-7FC6-4336-B4EC-5F99010F00A5}" type="datetimeFigureOut">
               <a:rPr lang="en-US" smtClean="0"/>
-              <a:t>10/10/2020</a:t>
+              <a:t>11/2/2020</a:t>
             </a:fld>
             <a:endParaRPr lang="en-US"/>
           </a:p>
@@ -588,7 +593,7 @@
           <a:p>
             <a:fld id="{601E7828-7FC6-4336-B4EC-5F99010F00A5}" type="datetimeFigureOut">
               <a:rPr lang="en-US" smtClean="0"/>
-              <a:t>10/10/2020</a:t>
+              <a:t>11/2/2020</a:t>
             </a:fld>
             <a:endParaRPr lang="en-US"/>
           </a:p>
@@ -758,7 +763,7 @@
           <a:p>
             <a:fld id="{601E7828-7FC6-4336-B4EC-5F99010F00A5}" type="datetimeFigureOut">
               <a:rPr lang="en-US" smtClean="0"/>
-              <a:t>10/10/2020</a:t>
+              <a:t>11/2/2020</a:t>
             </a:fld>
             <a:endParaRPr lang="en-US"/>
           </a:p>
@@ -1004,7 +1009,7 @@
           <a:p>
             <a:fld id="{601E7828-7FC6-4336-B4EC-5F99010F00A5}" type="datetimeFigureOut">
               <a:rPr lang="en-US" smtClean="0"/>
-              <a:t>10/10/2020</a:t>
+              <a:t>11/2/2020</a:t>
             </a:fld>
             <a:endParaRPr lang="en-US"/>
           </a:p>
@@ -1236,7 +1241,7 @@
           <a:p>
             <a:fld id="{601E7828-7FC6-4336-B4EC-5F99010F00A5}" type="datetimeFigureOut">
               <a:rPr lang="en-US" smtClean="0"/>
-              <a:t>10/10/2020</a:t>
+              <a:t>11/2/2020</a:t>
             </a:fld>
             <a:endParaRPr lang="en-US"/>
           </a:p>
@@ -1603,7 +1608,7 @@
           <a:p>
             <a:fld id="{601E7828-7FC6-4336-B4EC-5F99010F00A5}" type="datetimeFigureOut">
               <a:rPr lang="en-US" smtClean="0"/>
-              <a:t>10/10/2020</a:t>
+              <a:t>11/2/2020</a:t>
             </a:fld>
             <a:endParaRPr lang="en-US"/>
           </a:p>
@@ -1721,7 +1726,7 @@
           <a:p>
             <a:fld id="{601E7828-7FC6-4336-B4EC-5F99010F00A5}" type="datetimeFigureOut">
               <a:rPr lang="en-US" smtClean="0"/>
-              <a:t>10/10/2020</a:t>
+              <a:t>11/2/2020</a:t>
             </a:fld>
             <a:endParaRPr lang="en-US"/>
           </a:p>
@@ -1816,7 +1821,7 @@
           <a:p>
             <a:fld id="{601E7828-7FC6-4336-B4EC-5F99010F00A5}" type="datetimeFigureOut">
               <a:rPr lang="en-US" smtClean="0"/>
-              <a:t>10/10/2020</a:t>
+              <a:t>11/2/2020</a:t>
             </a:fld>
             <a:endParaRPr lang="en-US"/>
           </a:p>
@@ -2093,7 +2098,7 @@
           <a:p>
             <a:fld id="{601E7828-7FC6-4336-B4EC-5F99010F00A5}" type="datetimeFigureOut">
               <a:rPr lang="en-US" smtClean="0"/>
-              <a:t>10/10/2020</a:t>
+              <a:t>11/2/2020</a:t>
             </a:fld>
             <a:endParaRPr lang="en-US"/>
           </a:p>
@@ -2346,7 +2351,7 @@
           <a:p>
             <a:fld id="{601E7828-7FC6-4336-B4EC-5F99010F00A5}" type="datetimeFigureOut">
               <a:rPr lang="en-US" smtClean="0"/>
-              <a:t>10/10/2020</a:t>
+              <a:t>11/2/2020</a:t>
             </a:fld>
             <a:endParaRPr lang="en-US"/>
           </a:p>
@@ -2559,7 +2564,7 @@
           <a:p>
             <a:fld id="{601E7828-7FC6-4336-B4EC-5F99010F00A5}" type="datetimeFigureOut">
               <a:rPr lang="en-US" smtClean="0"/>
-              <a:t>10/10/2020</a:t>
+              <a:t>11/2/2020</a:t>
             </a:fld>
             <a:endParaRPr lang="en-US"/>
           </a:p>
@@ -3801,7 +3806,7 @@
           </a:xfrm>
           <a:prstGeom prst="leftBrace">
             <a:avLst>
-              <a:gd name="adj1" fmla="val 79717"/>
+              <a:gd name="adj1" fmla="val 33569"/>
               <a:gd name="adj2" fmla="val 50000"/>
             </a:avLst>
           </a:prstGeom>
@@ -3984,7 +3989,7 @@
         <p:spPr>
           <a:xfrm>
             <a:off x="1524000" y="6471570"/>
-            <a:ext cx="9052560" cy="369332"/>
+            <a:ext cx="10608008" cy="369332"/>
           </a:xfrm>
           <a:prstGeom prst="rect">
             <a:avLst/>
@@ -4027,7 +4032,31 @@
                   <a:srgbClr val="7030A0"/>
                 </a:solidFill>
               </a:rPr>
-              <a:t>                                                                        </a:t>
+              <a:t>                                                       </a:t>
+            </a:r>
+            <a:r>
+              <a:rPr lang="en-US" dirty="0" smtClean="0">
+                <a:solidFill>
+                  <a:srgbClr val="7030A0"/>
+                </a:solidFill>
+              </a:rPr>
+              <a:t> </a:t>
+            </a:r>
+            <a:r>
+              <a:rPr lang="en-US" dirty="0" err="1" smtClean="0">
+                <a:solidFill>
+                  <a:srgbClr val="7030A0"/>
+                </a:solidFill>
+              </a:rPr>
+              <a:t>margin_panel_r</a:t>
+            </a:r>
+            <a:r>
+              <a:rPr lang="en-US" dirty="0" smtClean="0">
+                <a:solidFill>
+                  <a:srgbClr val="7030A0"/>
+                </a:solidFill>
+              </a:rPr>
+              <a:t>   </a:t>
             </a:r>
             <a:r>
               <a:rPr lang="en-US" dirty="0" err="1" smtClean="0">
@@ -4177,6 +4206,52 @@
                 <a:srgbClr val="7030A0"/>
               </a:solidFill>
             </a:endParaRPr>
+          </a:p>
+        </p:txBody>
+      </p:sp>
+      <p:sp>
+        <p:nvSpPr>
+          <p:cNvPr id="39" name="Left Brace 38"/>
+          <p:cNvSpPr/>
+          <p:nvPr/>
+        </p:nvSpPr>
+        <p:spPr>
+          <a:xfrm rot="5400000" flipH="1">
+            <a:off x="9522625" y="6318094"/>
+            <a:ext cx="112084" cy="109836"/>
+          </a:xfrm>
+          <a:prstGeom prst="leftBrace">
+            <a:avLst>
+              <a:gd name="adj1" fmla="val 25000"/>
+              <a:gd name="adj2" fmla="val 50000"/>
+            </a:avLst>
+          </a:prstGeom>
+          <a:ln w="19050">
+            <a:solidFill>
+              <a:srgbClr val="7030A0"/>
+            </a:solidFill>
+          </a:ln>
+        </p:spPr>
+        <p:style>
+          <a:lnRef idx="1">
+            <a:schemeClr val="accent1"/>
+          </a:lnRef>
+          <a:fillRef idx="0">
+            <a:schemeClr val="accent1"/>
+          </a:fillRef>
+          <a:effectRef idx="0">
+            <a:schemeClr val="accent1"/>
+          </a:effectRef>
+          <a:fontRef idx="minor">
+            <a:schemeClr val="tx1"/>
+          </a:fontRef>
+        </p:style>
+        <p:txBody>
+          <a:bodyPr rtlCol="0" anchor="ctr"/>
+          <a:lstStyle/>
+          <a:p>
+            <a:pPr algn="ctr"/>
+            <a:endParaRPr lang="en-US"/>
           </a:p>
         </p:txBody>
       </p:sp>

</xml_diff>

<commit_message>
Built site for cmapplot: 0.9.3@e93a645
</commit_message>
<xml_diff>
--- a/reference/figures/margins.pptx
+++ b/reference/figures/margins.pptx
@@ -2,18 +2,18 @@
 <file path=ppt/presentation.xml><?xml version="1.0" encoding="utf-8"?>
 <p:presentation xmlns:a="http://schemas.openxmlformats.org/drawingml/2006/main" xmlns:r="http://schemas.openxmlformats.org/officeDocument/2006/relationships" xmlns:p="http://schemas.openxmlformats.org/presentationml/2006/main" saveSubsetFonts="1">
   <p:sldMasterIdLst>
-    <p:sldMasterId id="2147483648" r:id="rId1"/>
+    <p:sldMasterId id="2147483708" r:id="rId1"/>
   </p:sldMasterIdLst>
   <p:sldIdLst>
     <p:sldId id="256" r:id="rId2"/>
   </p:sldIdLst>
-  <p:sldSz cx="12192000" cy="6858000"/>
+  <p:sldSz cx="12801600" cy="8229600"/>
   <p:notesSz cx="6858000" cy="9144000"/>
   <p:defaultTextStyle>
     <a:defPPr>
       <a:defRPr lang="en-US"/>
     </a:defPPr>
-    <a:lvl1pPr marL="0" algn="l" defTabSz="914400" rtl="0" eaLnBrk="1" latinLnBrk="0" hangingPunct="1">
+    <a:lvl1pPr marL="0" algn="l" defTabSz="457200" rtl="0" eaLnBrk="1" latinLnBrk="0" hangingPunct="1">
       <a:defRPr sz="1800" kern="1200">
         <a:solidFill>
           <a:schemeClr val="tx1"/>
@@ -23,7 +23,7 @@
         <a:cs typeface="+mn-cs"/>
       </a:defRPr>
     </a:lvl1pPr>
-    <a:lvl2pPr marL="457200" algn="l" defTabSz="914400" rtl="0" eaLnBrk="1" latinLnBrk="0" hangingPunct="1">
+    <a:lvl2pPr marL="457200" algn="l" defTabSz="457200" rtl="0" eaLnBrk="1" latinLnBrk="0" hangingPunct="1">
       <a:defRPr sz="1800" kern="1200">
         <a:solidFill>
           <a:schemeClr val="tx1"/>
@@ -33,7 +33,7 @@
         <a:cs typeface="+mn-cs"/>
       </a:defRPr>
     </a:lvl2pPr>
-    <a:lvl3pPr marL="914400" algn="l" defTabSz="914400" rtl="0" eaLnBrk="1" latinLnBrk="0" hangingPunct="1">
+    <a:lvl3pPr marL="914400" algn="l" defTabSz="457200" rtl="0" eaLnBrk="1" latinLnBrk="0" hangingPunct="1">
       <a:defRPr sz="1800" kern="1200">
         <a:solidFill>
           <a:schemeClr val="tx1"/>
@@ -43,7 +43,7 @@
         <a:cs typeface="+mn-cs"/>
       </a:defRPr>
     </a:lvl3pPr>
-    <a:lvl4pPr marL="1371600" algn="l" defTabSz="914400" rtl="0" eaLnBrk="1" latinLnBrk="0" hangingPunct="1">
+    <a:lvl4pPr marL="1371600" algn="l" defTabSz="457200" rtl="0" eaLnBrk="1" latinLnBrk="0" hangingPunct="1">
       <a:defRPr sz="1800" kern="1200">
         <a:solidFill>
           <a:schemeClr val="tx1"/>
@@ -53,7 +53,7 @@
         <a:cs typeface="+mn-cs"/>
       </a:defRPr>
     </a:lvl4pPr>
-    <a:lvl5pPr marL="1828800" algn="l" defTabSz="914400" rtl="0" eaLnBrk="1" latinLnBrk="0" hangingPunct="1">
+    <a:lvl5pPr marL="1828800" algn="l" defTabSz="457200" rtl="0" eaLnBrk="1" latinLnBrk="0" hangingPunct="1">
       <a:defRPr sz="1800" kern="1200">
         <a:solidFill>
           <a:schemeClr val="tx1"/>
@@ -63,7 +63,7 @@
         <a:cs typeface="+mn-cs"/>
       </a:defRPr>
     </a:lvl5pPr>
-    <a:lvl6pPr marL="2286000" algn="l" defTabSz="914400" rtl="0" eaLnBrk="1" latinLnBrk="0" hangingPunct="1">
+    <a:lvl6pPr marL="2286000" algn="l" defTabSz="457200" rtl="0" eaLnBrk="1" latinLnBrk="0" hangingPunct="1">
       <a:defRPr sz="1800" kern="1200">
         <a:solidFill>
           <a:schemeClr val="tx1"/>
@@ -73,7 +73,7 @@
         <a:cs typeface="+mn-cs"/>
       </a:defRPr>
     </a:lvl6pPr>
-    <a:lvl7pPr marL="2743200" algn="l" defTabSz="914400" rtl="0" eaLnBrk="1" latinLnBrk="0" hangingPunct="1">
+    <a:lvl7pPr marL="2743200" algn="l" defTabSz="457200" rtl="0" eaLnBrk="1" latinLnBrk="0" hangingPunct="1">
       <a:defRPr sz="1800" kern="1200">
         <a:solidFill>
           <a:schemeClr val="tx1"/>
@@ -83,7 +83,7 @@
         <a:cs typeface="+mn-cs"/>
       </a:defRPr>
     </a:lvl7pPr>
-    <a:lvl8pPr marL="3200400" algn="l" defTabSz="914400" rtl="0" eaLnBrk="1" latinLnBrk="0" hangingPunct="1">
+    <a:lvl8pPr marL="3200400" algn="l" defTabSz="457200" rtl="0" eaLnBrk="1" latinLnBrk="0" hangingPunct="1">
       <a:defRPr sz="1800" kern="1200">
         <a:solidFill>
           <a:schemeClr val="tx1"/>
@@ -93,7 +93,7 @@
         <a:cs typeface="+mn-cs"/>
       </a:defRPr>
     </a:lvl8pPr>
-    <a:lvl9pPr marL="3657600" algn="l" defTabSz="914400" rtl="0" eaLnBrk="1" latinLnBrk="0" hangingPunct="1">
+    <a:lvl9pPr marL="3657600" algn="l" defTabSz="457200" rtl="0" eaLnBrk="1" latinLnBrk="0" hangingPunct="1">
       <a:defRPr sz="1800" kern="1200">
         <a:solidFill>
           <a:schemeClr val="tx1"/>
@@ -141,15 +141,15 @@
         </p:nvSpPr>
         <p:spPr>
           <a:xfrm>
-            <a:off x="1524000" y="1122363"/>
-            <a:ext cx="9144000" cy="2387600"/>
+            <a:off x="1600200" y="1346836"/>
+            <a:ext cx="9601200" cy="2865120"/>
           </a:xfrm>
         </p:spPr>
         <p:txBody>
           <a:bodyPr anchor="b"/>
           <a:lstStyle>
             <a:lvl1pPr algn="ctr">
-              <a:defRPr sz="6000"/>
+              <a:defRPr sz="6300"/>
             </a:lvl1pPr>
           </a:lstStyle>
           <a:p>
@@ -157,7 +157,7 @@
               <a:rPr lang="en-US" smtClean="0"/>
               <a:t>Click to edit Master title style</a:t>
             </a:r>
-            <a:endParaRPr lang="en-US"/>
+            <a:endParaRPr lang="en-US" dirty="0"/>
           </a:p>
         </p:txBody>
       </p:sp>
@@ -173,8 +173,8 @@
         </p:nvSpPr>
         <p:spPr>
           <a:xfrm>
-            <a:off x="1524000" y="3602038"/>
-            <a:ext cx="9144000" cy="1655762"/>
+            <a:off x="1600200" y="4322446"/>
+            <a:ext cx="9601200" cy="1986914"/>
           </a:xfrm>
         </p:spPr>
         <p:txBody>
@@ -182,39 +182,39 @@
           <a:lstStyle>
             <a:lvl1pPr marL="0" indent="0" algn="ctr">
               <a:buNone/>
-              <a:defRPr sz="2400"/>
+              <a:defRPr sz="2520"/>
             </a:lvl1pPr>
-            <a:lvl2pPr marL="457200" indent="0" algn="ctr">
-              <a:buNone/>
-              <a:defRPr sz="2000"/>
+            <a:lvl2pPr marL="480060" indent="0" algn="ctr">
+              <a:buNone/>
+              <a:defRPr sz="2100"/>
             </a:lvl2pPr>
-            <a:lvl3pPr marL="914400" indent="0" algn="ctr">
-              <a:buNone/>
-              <a:defRPr sz="1800"/>
+            <a:lvl3pPr marL="960120" indent="0" algn="ctr">
+              <a:buNone/>
+              <a:defRPr sz="1890"/>
             </a:lvl3pPr>
-            <a:lvl4pPr marL="1371600" indent="0" algn="ctr">
-              <a:buNone/>
-              <a:defRPr sz="1600"/>
+            <a:lvl4pPr marL="1440180" indent="0" algn="ctr">
+              <a:buNone/>
+              <a:defRPr sz="1680"/>
             </a:lvl4pPr>
-            <a:lvl5pPr marL="1828800" indent="0" algn="ctr">
-              <a:buNone/>
-              <a:defRPr sz="1600"/>
+            <a:lvl5pPr marL="1920240" indent="0" algn="ctr">
+              <a:buNone/>
+              <a:defRPr sz="1680"/>
             </a:lvl5pPr>
-            <a:lvl6pPr marL="2286000" indent="0" algn="ctr">
-              <a:buNone/>
-              <a:defRPr sz="1600"/>
+            <a:lvl6pPr marL="2400300" indent="0" algn="ctr">
+              <a:buNone/>
+              <a:defRPr sz="1680"/>
             </a:lvl6pPr>
-            <a:lvl7pPr marL="2743200" indent="0" algn="ctr">
-              <a:buNone/>
-              <a:defRPr sz="1600"/>
+            <a:lvl7pPr marL="2880360" indent="0" algn="ctr">
+              <a:buNone/>
+              <a:defRPr sz="1680"/>
             </a:lvl7pPr>
-            <a:lvl8pPr marL="3200400" indent="0" algn="ctr">
-              <a:buNone/>
-              <a:defRPr sz="1600"/>
+            <a:lvl8pPr marL="3360420" indent="0" algn="ctr">
+              <a:buNone/>
+              <a:defRPr sz="1680"/>
             </a:lvl8pPr>
-            <a:lvl9pPr marL="3657600" indent="0" algn="ctr">
-              <a:buNone/>
-              <a:defRPr sz="1600"/>
+            <a:lvl9pPr marL="3840480" indent="0" algn="ctr">
+              <a:buNone/>
+              <a:defRPr sz="1680"/>
             </a:lvl9pPr>
           </a:lstStyle>
           <a:p>
@@ -222,7 +222,7 @@
               <a:rPr lang="en-US" smtClean="0"/>
               <a:t>Click to edit Master subtitle style</a:t>
             </a:r>
-            <a:endParaRPr lang="en-US"/>
+            <a:endParaRPr lang="en-US" dirty="0"/>
           </a:p>
         </p:txBody>
       </p:sp>
@@ -243,7 +243,7 @@
           <a:p>
             <a:fld id="{601E7828-7FC6-4336-B4EC-5F99010F00A5}" type="datetimeFigureOut">
               <a:rPr lang="en-US" smtClean="0"/>
-              <a:t>11/2/2020</a:t>
+              <a:t>11/24/2020</a:t>
             </a:fld>
             <a:endParaRPr lang="en-US"/>
           </a:p>
@@ -294,7 +294,7 @@
     </p:spTree>
     <p:extLst>
       <p:ext uri="{BB962C8B-B14F-4D97-AF65-F5344CB8AC3E}">
-        <p14:creationId xmlns:p14="http://schemas.microsoft.com/office/powerpoint/2010/main" val="453946890"/>
+        <p14:creationId xmlns:p14="http://schemas.microsoft.com/office/powerpoint/2010/main" val="1985004792"/>
       </p:ext>
     </p:extLst>
   </p:cSld>
@@ -340,7 +340,7 @@
               <a:rPr lang="en-US" smtClean="0"/>
               <a:t>Click to edit Master title style</a:t>
             </a:r>
-            <a:endParaRPr lang="en-US"/>
+            <a:endParaRPr lang="en-US" dirty="0"/>
           </a:p>
         </p:txBody>
       </p:sp>
@@ -392,7 +392,7 @@
               <a:rPr lang="en-US" smtClean="0"/>
               <a:t>Fifth level</a:t>
             </a:r>
-            <a:endParaRPr lang="en-US"/>
+            <a:endParaRPr lang="en-US" dirty="0"/>
           </a:p>
         </p:txBody>
       </p:sp>
@@ -413,7 +413,7 @@
           <a:p>
             <a:fld id="{601E7828-7FC6-4336-B4EC-5F99010F00A5}" type="datetimeFigureOut">
               <a:rPr lang="en-US" smtClean="0"/>
-              <a:t>11/2/2020</a:t>
+              <a:t>11/24/2020</a:t>
             </a:fld>
             <a:endParaRPr lang="en-US"/>
           </a:p>
@@ -464,7 +464,7 @@
     </p:spTree>
     <p:extLst>
       <p:ext uri="{BB962C8B-B14F-4D97-AF65-F5344CB8AC3E}">
-        <p14:creationId xmlns:p14="http://schemas.microsoft.com/office/powerpoint/2010/main" val="1754092637"/>
+        <p14:creationId xmlns:p14="http://schemas.microsoft.com/office/powerpoint/2010/main" val="580237941"/>
       </p:ext>
     </p:extLst>
   </p:cSld>
@@ -503,8 +503,8 @@
         </p:nvSpPr>
         <p:spPr>
           <a:xfrm>
-            <a:off x="8724900" y="365125"/>
-            <a:ext cx="2628900" cy="5811838"/>
+            <a:off x="9161145" y="438150"/>
+            <a:ext cx="2760345" cy="6974206"/>
           </a:xfrm>
         </p:spPr>
         <p:txBody>
@@ -515,7 +515,7 @@
               <a:rPr lang="en-US" smtClean="0"/>
               <a:t>Click to edit Master title style</a:t>
             </a:r>
-            <a:endParaRPr lang="en-US"/>
+            <a:endParaRPr lang="en-US" dirty="0"/>
           </a:p>
         </p:txBody>
       </p:sp>
@@ -531,8 +531,8 @@
         </p:nvSpPr>
         <p:spPr>
           <a:xfrm>
-            <a:off x="838200" y="365125"/>
-            <a:ext cx="7734300" cy="5811838"/>
+            <a:off x="880110" y="438150"/>
+            <a:ext cx="8121015" cy="6974206"/>
           </a:xfrm>
         </p:spPr>
         <p:txBody>
@@ -572,7 +572,7 @@
               <a:rPr lang="en-US" smtClean="0"/>
               <a:t>Fifth level</a:t>
             </a:r>
-            <a:endParaRPr lang="en-US"/>
+            <a:endParaRPr lang="en-US" dirty="0"/>
           </a:p>
         </p:txBody>
       </p:sp>
@@ -593,7 +593,7 @@
           <a:p>
             <a:fld id="{601E7828-7FC6-4336-B4EC-5F99010F00A5}" type="datetimeFigureOut">
               <a:rPr lang="en-US" smtClean="0"/>
-              <a:t>11/2/2020</a:t>
+              <a:t>11/24/2020</a:t>
             </a:fld>
             <a:endParaRPr lang="en-US"/>
           </a:p>
@@ -644,7 +644,7 @@
     </p:spTree>
     <p:extLst>
       <p:ext uri="{BB962C8B-B14F-4D97-AF65-F5344CB8AC3E}">
-        <p14:creationId xmlns:p14="http://schemas.microsoft.com/office/powerpoint/2010/main" val="1420184670"/>
+        <p14:creationId xmlns:p14="http://schemas.microsoft.com/office/powerpoint/2010/main" val="130794805"/>
       </p:ext>
     </p:extLst>
   </p:cSld>
@@ -690,7 +690,7 @@
               <a:rPr lang="en-US" smtClean="0"/>
               <a:t>Click to edit Master title style</a:t>
             </a:r>
-            <a:endParaRPr lang="en-US"/>
+            <a:endParaRPr lang="en-US" dirty="0"/>
           </a:p>
         </p:txBody>
       </p:sp>
@@ -742,7 +742,7 @@
               <a:rPr lang="en-US" smtClean="0"/>
               <a:t>Fifth level</a:t>
             </a:r>
-            <a:endParaRPr lang="en-US"/>
+            <a:endParaRPr lang="en-US" dirty="0"/>
           </a:p>
         </p:txBody>
       </p:sp>
@@ -763,7 +763,7 @@
           <a:p>
             <a:fld id="{601E7828-7FC6-4336-B4EC-5F99010F00A5}" type="datetimeFigureOut">
               <a:rPr lang="en-US" smtClean="0"/>
-              <a:t>11/2/2020</a:t>
+              <a:t>11/24/2020</a:t>
             </a:fld>
             <a:endParaRPr lang="en-US"/>
           </a:p>
@@ -814,7 +814,7 @@
     </p:spTree>
     <p:extLst>
       <p:ext uri="{BB962C8B-B14F-4D97-AF65-F5344CB8AC3E}">
-        <p14:creationId xmlns:p14="http://schemas.microsoft.com/office/powerpoint/2010/main" val="2886532389"/>
+        <p14:creationId xmlns:p14="http://schemas.microsoft.com/office/powerpoint/2010/main" val="1158602608"/>
       </p:ext>
     </p:extLst>
   </p:cSld>
@@ -853,15 +853,15 @@
         </p:nvSpPr>
         <p:spPr>
           <a:xfrm>
-            <a:off x="831850" y="1709738"/>
-            <a:ext cx="10515600" cy="2852737"/>
+            <a:off x="873443" y="2051686"/>
+            <a:ext cx="11041380" cy="3423284"/>
           </a:xfrm>
         </p:spPr>
         <p:txBody>
           <a:bodyPr anchor="b"/>
           <a:lstStyle>
             <a:lvl1pPr>
-              <a:defRPr sz="6000"/>
+              <a:defRPr sz="6300"/>
             </a:lvl1pPr>
           </a:lstStyle>
           <a:p>
@@ -869,7 +869,7 @@
               <a:rPr lang="en-US" smtClean="0"/>
               <a:t>Click to edit Master title style</a:t>
             </a:r>
-            <a:endParaRPr lang="en-US"/>
+            <a:endParaRPr lang="en-US" dirty="0"/>
           </a:p>
         </p:txBody>
       </p:sp>
@@ -885,8 +885,8 @@
         </p:nvSpPr>
         <p:spPr>
           <a:xfrm>
-            <a:off x="831850" y="4589463"/>
-            <a:ext cx="10515600" cy="1500187"/>
+            <a:off x="873443" y="5507356"/>
+            <a:ext cx="11041380" cy="1800224"/>
           </a:xfrm>
         </p:spPr>
         <p:txBody>
@@ -894,7 +894,7 @@
           <a:lstStyle>
             <a:lvl1pPr marL="0" indent="0">
               <a:buNone/>
-              <a:defRPr sz="2400">
+              <a:defRPr sz="2520">
                 <a:solidFill>
                   <a:schemeClr val="tx1">
                     <a:tint val="75000"/>
@@ -902,9 +902,9 @@
                 </a:solidFill>
               </a:defRPr>
             </a:lvl1pPr>
-            <a:lvl2pPr marL="457200" indent="0">
-              <a:buNone/>
-              <a:defRPr sz="2000">
+            <a:lvl2pPr marL="480060" indent="0">
+              <a:buNone/>
+              <a:defRPr sz="2100">
                 <a:solidFill>
                   <a:schemeClr val="tx1">
                     <a:tint val="75000"/>
@@ -912,9 +912,9 @@
                 </a:solidFill>
               </a:defRPr>
             </a:lvl2pPr>
-            <a:lvl3pPr marL="914400" indent="0">
-              <a:buNone/>
-              <a:defRPr sz="1800">
+            <a:lvl3pPr marL="960120" indent="0">
+              <a:buNone/>
+              <a:defRPr sz="1890">
                 <a:solidFill>
                   <a:schemeClr val="tx1">
                     <a:tint val="75000"/>
@@ -922,9 +922,9 @@
                 </a:solidFill>
               </a:defRPr>
             </a:lvl3pPr>
-            <a:lvl4pPr marL="1371600" indent="0">
-              <a:buNone/>
-              <a:defRPr sz="1600">
+            <a:lvl4pPr marL="1440180" indent="0">
+              <a:buNone/>
+              <a:defRPr sz="1680">
                 <a:solidFill>
                   <a:schemeClr val="tx1">
                     <a:tint val="75000"/>
@@ -932,9 +932,9 @@
                 </a:solidFill>
               </a:defRPr>
             </a:lvl4pPr>
-            <a:lvl5pPr marL="1828800" indent="0">
-              <a:buNone/>
-              <a:defRPr sz="1600">
+            <a:lvl5pPr marL="1920240" indent="0">
+              <a:buNone/>
+              <a:defRPr sz="1680">
                 <a:solidFill>
                   <a:schemeClr val="tx1">
                     <a:tint val="75000"/>
@@ -942,9 +942,9 @@
                 </a:solidFill>
               </a:defRPr>
             </a:lvl5pPr>
-            <a:lvl6pPr marL="2286000" indent="0">
-              <a:buNone/>
-              <a:defRPr sz="1600">
+            <a:lvl6pPr marL="2400300" indent="0">
+              <a:buNone/>
+              <a:defRPr sz="1680">
                 <a:solidFill>
                   <a:schemeClr val="tx1">
                     <a:tint val="75000"/>
@@ -952,9 +952,9 @@
                 </a:solidFill>
               </a:defRPr>
             </a:lvl6pPr>
-            <a:lvl7pPr marL="2743200" indent="0">
-              <a:buNone/>
-              <a:defRPr sz="1600">
+            <a:lvl7pPr marL="2880360" indent="0">
+              <a:buNone/>
+              <a:defRPr sz="1680">
                 <a:solidFill>
                   <a:schemeClr val="tx1">
                     <a:tint val="75000"/>
@@ -962,9 +962,9 @@
                 </a:solidFill>
               </a:defRPr>
             </a:lvl7pPr>
-            <a:lvl8pPr marL="3200400" indent="0">
-              <a:buNone/>
-              <a:defRPr sz="1600">
+            <a:lvl8pPr marL="3360420" indent="0">
+              <a:buNone/>
+              <a:defRPr sz="1680">
                 <a:solidFill>
                   <a:schemeClr val="tx1">
                     <a:tint val="75000"/>
@@ -972,9 +972,9 @@
                 </a:solidFill>
               </a:defRPr>
             </a:lvl8pPr>
-            <a:lvl9pPr marL="3657600" indent="0">
-              <a:buNone/>
-              <a:defRPr sz="1600">
+            <a:lvl9pPr marL="3840480" indent="0">
+              <a:buNone/>
+              <a:defRPr sz="1680">
                 <a:solidFill>
                   <a:schemeClr val="tx1">
                     <a:tint val="75000"/>
@@ -1009,7 +1009,7 @@
           <a:p>
             <a:fld id="{601E7828-7FC6-4336-B4EC-5F99010F00A5}" type="datetimeFigureOut">
               <a:rPr lang="en-US" smtClean="0"/>
-              <a:t>11/2/2020</a:t>
+              <a:t>11/24/2020</a:t>
             </a:fld>
             <a:endParaRPr lang="en-US"/>
           </a:p>
@@ -1060,7 +1060,7 @@
     </p:spTree>
     <p:extLst>
       <p:ext uri="{BB962C8B-B14F-4D97-AF65-F5344CB8AC3E}">
-        <p14:creationId xmlns:p14="http://schemas.microsoft.com/office/powerpoint/2010/main" val="3568897876"/>
+        <p14:creationId xmlns:p14="http://schemas.microsoft.com/office/powerpoint/2010/main" val="3935626697"/>
       </p:ext>
     </p:extLst>
   </p:cSld>
@@ -1106,7 +1106,7 @@
               <a:rPr lang="en-US" smtClean="0"/>
               <a:t>Click to edit Master title style</a:t>
             </a:r>
-            <a:endParaRPr lang="en-US"/>
+            <a:endParaRPr lang="en-US" dirty="0"/>
           </a:p>
         </p:txBody>
       </p:sp>
@@ -1122,8 +1122,8 @@
         </p:nvSpPr>
         <p:spPr>
           <a:xfrm>
-            <a:off x="838200" y="1825625"/>
-            <a:ext cx="5181600" cy="4351338"/>
+            <a:off x="880110" y="2190750"/>
+            <a:ext cx="5440680" cy="5221606"/>
           </a:xfrm>
         </p:spPr>
         <p:txBody>
@@ -1163,7 +1163,7 @@
               <a:rPr lang="en-US" smtClean="0"/>
               <a:t>Fifth level</a:t>
             </a:r>
-            <a:endParaRPr lang="en-US"/>
+            <a:endParaRPr lang="en-US" dirty="0"/>
           </a:p>
         </p:txBody>
       </p:sp>
@@ -1179,8 +1179,8 @@
         </p:nvSpPr>
         <p:spPr>
           <a:xfrm>
-            <a:off x="6172200" y="1825625"/>
-            <a:ext cx="5181600" cy="4351338"/>
+            <a:off x="6480810" y="2190750"/>
+            <a:ext cx="5440680" cy="5221606"/>
           </a:xfrm>
         </p:spPr>
         <p:txBody>
@@ -1220,7 +1220,7 @@
               <a:rPr lang="en-US" smtClean="0"/>
               <a:t>Fifth level</a:t>
             </a:r>
-            <a:endParaRPr lang="en-US"/>
+            <a:endParaRPr lang="en-US" dirty="0"/>
           </a:p>
         </p:txBody>
       </p:sp>
@@ -1241,7 +1241,7 @@
           <a:p>
             <a:fld id="{601E7828-7FC6-4336-B4EC-5F99010F00A5}" type="datetimeFigureOut">
               <a:rPr lang="en-US" smtClean="0"/>
-              <a:t>11/2/2020</a:t>
+              <a:t>11/24/2020</a:t>
             </a:fld>
             <a:endParaRPr lang="en-US"/>
           </a:p>
@@ -1292,7 +1292,7 @@
     </p:spTree>
     <p:extLst>
       <p:ext uri="{BB962C8B-B14F-4D97-AF65-F5344CB8AC3E}">
-        <p14:creationId xmlns:p14="http://schemas.microsoft.com/office/powerpoint/2010/main" val="3035763651"/>
+        <p14:creationId xmlns:p14="http://schemas.microsoft.com/office/powerpoint/2010/main" val="3860530941"/>
       </p:ext>
     </p:extLst>
   </p:cSld>
@@ -1331,8 +1331,8 @@
         </p:nvSpPr>
         <p:spPr>
           <a:xfrm>
-            <a:off x="839788" y="365125"/>
-            <a:ext cx="10515600" cy="1325563"/>
+            <a:off x="881777" y="438150"/>
+            <a:ext cx="11041380" cy="1590676"/>
           </a:xfrm>
         </p:spPr>
         <p:txBody>
@@ -1343,7 +1343,7 @@
               <a:rPr lang="en-US" smtClean="0"/>
               <a:t>Click to edit Master title style</a:t>
             </a:r>
-            <a:endParaRPr lang="en-US"/>
+            <a:endParaRPr lang="en-US" dirty="0"/>
           </a:p>
         </p:txBody>
       </p:sp>
@@ -1359,8 +1359,8 @@
         </p:nvSpPr>
         <p:spPr>
           <a:xfrm>
-            <a:off x="839788" y="1681163"/>
-            <a:ext cx="5157787" cy="823912"/>
+            <a:off x="881778" y="2017396"/>
+            <a:ext cx="5415676" cy="988694"/>
           </a:xfrm>
         </p:spPr>
         <p:txBody>
@@ -1368,39 +1368,39 @@
           <a:lstStyle>
             <a:lvl1pPr marL="0" indent="0">
               <a:buNone/>
-              <a:defRPr sz="2400" b="1"/>
+              <a:defRPr sz="2520" b="1"/>
             </a:lvl1pPr>
-            <a:lvl2pPr marL="457200" indent="0">
-              <a:buNone/>
-              <a:defRPr sz="2000" b="1"/>
+            <a:lvl2pPr marL="480060" indent="0">
+              <a:buNone/>
+              <a:defRPr sz="2100" b="1"/>
             </a:lvl2pPr>
-            <a:lvl3pPr marL="914400" indent="0">
-              <a:buNone/>
-              <a:defRPr sz="1800" b="1"/>
+            <a:lvl3pPr marL="960120" indent="0">
+              <a:buNone/>
+              <a:defRPr sz="1890" b="1"/>
             </a:lvl3pPr>
-            <a:lvl4pPr marL="1371600" indent="0">
-              <a:buNone/>
-              <a:defRPr sz="1600" b="1"/>
+            <a:lvl4pPr marL="1440180" indent="0">
+              <a:buNone/>
+              <a:defRPr sz="1680" b="1"/>
             </a:lvl4pPr>
-            <a:lvl5pPr marL="1828800" indent="0">
-              <a:buNone/>
-              <a:defRPr sz="1600" b="1"/>
+            <a:lvl5pPr marL="1920240" indent="0">
+              <a:buNone/>
+              <a:defRPr sz="1680" b="1"/>
             </a:lvl5pPr>
-            <a:lvl6pPr marL="2286000" indent="0">
-              <a:buNone/>
-              <a:defRPr sz="1600" b="1"/>
+            <a:lvl6pPr marL="2400300" indent="0">
+              <a:buNone/>
+              <a:defRPr sz="1680" b="1"/>
             </a:lvl6pPr>
-            <a:lvl7pPr marL="2743200" indent="0">
-              <a:buNone/>
-              <a:defRPr sz="1600" b="1"/>
+            <a:lvl7pPr marL="2880360" indent="0">
+              <a:buNone/>
+              <a:defRPr sz="1680" b="1"/>
             </a:lvl7pPr>
-            <a:lvl8pPr marL="3200400" indent="0">
-              <a:buNone/>
-              <a:defRPr sz="1600" b="1"/>
+            <a:lvl8pPr marL="3360420" indent="0">
+              <a:buNone/>
+              <a:defRPr sz="1680" b="1"/>
             </a:lvl8pPr>
-            <a:lvl9pPr marL="3657600" indent="0">
-              <a:buNone/>
-              <a:defRPr sz="1600" b="1"/>
+            <a:lvl9pPr marL="3840480" indent="0">
+              <a:buNone/>
+              <a:defRPr sz="1680" b="1"/>
             </a:lvl9pPr>
           </a:lstStyle>
           <a:p>
@@ -1424,8 +1424,8 @@
         </p:nvSpPr>
         <p:spPr>
           <a:xfrm>
-            <a:off x="839788" y="2505075"/>
-            <a:ext cx="5157787" cy="3684588"/>
+            <a:off x="881778" y="3006090"/>
+            <a:ext cx="5415676" cy="4421506"/>
           </a:xfrm>
         </p:spPr>
         <p:txBody>
@@ -1465,7 +1465,7 @@
               <a:rPr lang="en-US" smtClean="0"/>
               <a:t>Fifth level</a:t>
             </a:r>
-            <a:endParaRPr lang="en-US"/>
+            <a:endParaRPr lang="en-US" dirty="0"/>
           </a:p>
         </p:txBody>
       </p:sp>
@@ -1481,8 +1481,8 @@
         </p:nvSpPr>
         <p:spPr>
           <a:xfrm>
-            <a:off x="6172200" y="1681163"/>
-            <a:ext cx="5183188" cy="823912"/>
+            <a:off x="6480810" y="2017396"/>
+            <a:ext cx="5442347" cy="988694"/>
           </a:xfrm>
         </p:spPr>
         <p:txBody>
@@ -1490,39 +1490,39 @@
           <a:lstStyle>
             <a:lvl1pPr marL="0" indent="0">
               <a:buNone/>
-              <a:defRPr sz="2400" b="1"/>
+              <a:defRPr sz="2520" b="1"/>
             </a:lvl1pPr>
-            <a:lvl2pPr marL="457200" indent="0">
-              <a:buNone/>
-              <a:defRPr sz="2000" b="1"/>
+            <a:lvl2pPr marL="480060" indent="0">
+              <a:buNone/>
+              <a:defRPr sz="2100" b="1"/>
             </a:lvl2pPr>
-            <a:lvl3pPr marL="914400" indent="0">
-              <a:buNone/>
-              <a:defRPr sz="1800" b="1"/>
+            <a:lvl3pPr marL="960120" indent="0">
+              <a:buNone/>
+              <a:defRPr sz="1890" b="1"/>
             </a:lvl3pPr>
-            <a:lvl4pPr marL="1371600" indent="0">
-              <a:buNone/>
-              <a:defRPr sz="1600" b="1"/>
+            <a:lvl4pPr marL="1440180" indent="0">
+              <a:buNone/>
+              <a:defRPr sz="1680" b="1"/>
             </a:lvl4pPr>
-            <a:lvl5pPr marL="1828800" indent="0">
-              <a:buNone/>
-              <a:defRPr sz="1600" b="1"/>
+            <a:lvl5pPr marL="1920240" indent="0">
+              <a:buNone/>
+              <a:defRPr sz="1680" b="1"/>
             </a:lvl5pPr>
-            <a:lvl6pPr marL="2286000" indent="0">
-              <a:buNone/>
-              <a:defRPr sz="1600" b="1"/>
+            <a:lvl6pPr marL="2400300" indent="0">
+              <a:buNone/>
+              <a:defRPr sz="1680" b="1"/>
             </a:lvl6pPr>
-            <a:lvl7pPr marL="2743200" indent="0">
-              <a:buNone/>
-              <a:defRPr sz="1600" b="1"/>
+            <a:lvl7pPr marL="2880360" indent="0">
+              <a:buNone/>
+              <a:defRPr sz="1680" b="1"/>
             </a:lvl7pPr>
-            <a:lvl8pPr marL="3200400" indent="0">
-              <a:buNone/>
-              <a:defRPr sz="1600" b="1"/>
+            <a:lvl8pPr marL="3360420" indent="0">
+              <a:buNone/>
+              <a:defRPr sz="1680" b="1"/>
             </a:lvl8pPr>
-            <a:lvl9pPr marL="3657600" indent="0">
-              <a:buNone/>
-              <a:defRPr sz="1600" b="1"/>
+            <a:lvl9pPr marL="3840480" indent="0">
+              <a:buNone/>
+              <a:defRPr sz="1680" b="1"/>
             </a:lvl9pPr>
           </a:lstStyle>
           <a:p>
@@ -1546,8 +1546,8 @@
         </p:nvSpPr>
         <p:spPr>
           <a:xfrm>
-            <a:off x="6172200" y="2505075"/>
-            <a:ext cx="5183188" cy="3684588"/>
+            <a:off x="6480810" y="3006090"/>
+            <a:ext cx="5442347" cy="4421506"/>
           </a:xfrm>
         </p:spPr>
         <p:txBody>
@@ -1587,7 +1587,7 @@
               <a:rPr lang="en-US" smtClean="0"/>
               <a:t>Fifth level</a:t>
             </a:r>
-            <a:endParaRPr lang="en-US"/>
+            <a:endParaRPr lang="en-US" dirty="0"/>
           </a:p>
         </p:txBody>
       </p:sp>
@@ -1608,7 +1608,7 @@
           <a:p>
             <a:fld id="{601E7828-7FC6-4336-B4EC-5F99010F00A5}" type="datetimeFigureOut">
               <a:rPr lang="en-US" smtClean="0"/>
-              <a:t>11/2/2020</a:t>
+              <a:t>11/24/2020</a:t>
             </a:fld>
             <a:endParaRPr lang="en-US"/>
           </a:p>
@@ -1659,7 +1659,7 @@
     </p:spTree>
     <p:extLst>
       <p:ext uri="{BB962C8B-B14F-4D97-AF65-F5344CB8AC3E}">
-        <p14:creationId xmlns:p14="http://schemas.microsoft.com/office/powerpoint/2010/main" val="974648201"/>
+        <p14:creationId xmlns:p14="http://schemas.microsoft.com/office/powerpoint/2010/main" val="4202560661"/>
       </p:ext>
     </p:extLst>
   </p:cSld>
@@ -1705,7 +1705,7 @@
               <a:rPr lang="en-US" smtClean="0"/>
               <a:t>Click to edit Master title style</a:t>
             </a:r>
-            <a:endParaRPr lang="en-US"/>
+            <a:endParaRPr lang="en-US" dirty="0"/>
           </a:p>
         </p:txBody>
       </p:sp>
@@ -1726,7 +1726,7 @@
           <a:p>
             <a:fld id="{601E7828-7FC6-4336-B4EC-5F99010F00A5}" type="datetimeFigureOut">
               <a:rPr lang="en-US" smtClean="0"/>
-              <a:t>11/2/2020</a:t>
+              <a:t>11/24/2020</a:t>
             </a:fld>
             <a:endParaRPr lang="en-US"/>
           </a:p>
@@ -1777,7 +1777,7 @@
     </p:spTree>
     <p:extLst>
       <p:ext uri="{BB962C8B-B14F-4D97-AF65-F5344CB8AC3E}">
-        <p14:creationId xmlns:p14="http://schemas.microsoft.com/office/powerpoint/2010/main" val="682016746"/>
+        <p14:creationId xmlns:p14="http://schemas.microsoft.com/office/powerpoint/2010/main" val="1862608508"/>
       </p:ext>
     </p:extLst>
   </p:cSld>
@@ -1821,7 +1821,7 @@
           <a:p>
             <a:fld id="{601E7828-7FC6-4336-B4EC-5F99010F00A5}" type="datetimeFigureOut">
               <a:rPr lang="en-US" smtClean="0"/>
-              <a:t>11/2/2020</a:t>
+              <a:t>11/24/2020</a:t>
             </a:fld>
             <a:endParaRPr lang="en-US"/>
           </a:p>
@@ -1872,7 +1872,7 @@
     </p:spTree>
     <p:extLst>
       <p:ext uri="{BB962C8B-B14F-4D97-AF65-F5344CB8AC3E}">
-        <p14:creationId xmlns:p14="http://schemas.microsoft.com/office/powerpoint/2010/main" val="1565436316"/>
+        <p14:creationId xmlns:p14="http://schemas.microsoft.com/office/powerpoint/2010/main" val="561003971"/>
       </p:ext>
     </p:extLst>
   </p:cSld>
@@ -1911,15 +1911,15 @@
         </p:nvSpPr>
         <p:spPr>
           <a:xfrm>
-            <a:off x="839788" y="457200"/>
-            <a:ext cx="3932237" cy="1600200"/>
+            <a:off x="881778" y="548640"/>
+            <a:ext cx="4128849" cy="1920240"/>
           </a:xfrm>
         </p:spPr>
         <p:txBody>
           <a:bodyPr anchor="b"/>
           <a:lstStyle>
             <a:lvl1pPr>
-              <a:defRPr sz="3200"/>
+              <a:defRPr sz="3360"/>
             </a:lvl1pPr>
           </a:lstStyle>
           <a:p>
@@ -1927,7 +1927,7 @@
               <a:rPr lang="en-US" smtClean="0"/>
               <a:t>Click to edit Master title style</a:t>
             </a:r>
-            <a:endParaRPr lang="en-US"/>
+            <a:endParaRPr lang="en-US" dirty="0"/>
           </a:p>
         </p:txBody>
       </p:sp>
@@ -1943,39 +1943,39 @@
         </p:nvSpPr>
         <p:spPr>
           <a:xfrm>
-            <a:off x="5183188" y="987425"/>
-            <a:ext cx="6172200" cy="4873625"/>
+            <a:off x="5442347" y="1184911"/>
+            <a:ext cx="6480810" cy="5848350"/>
           </a:xfrm>
         </p:spPr>
         <p:txBody>
           <a:bodyPr/>
           <a:lstStyle>
             <a:lvl1pPr>
-              <a:defRPr sz="3200"/>
+              <a:defRPr sz="3360"/>
             </a:lvl1pPr>
             <a:lvl2pPr>
-              <a:defRPr sz="2800"/>
+              <a:defRPr sz="2940"/>
             </a:lvl2pPr>
             <a:lvl3pPr>
-              <a:defRPr sz="2400"/>
+              <a:defRPr sz="2520"/>
             </a:lvl3pPr>
             <a:lvl4pPr>
-              <a:defRPr sz="2000"/>
+              <a:defRPr sz="2100"/>
             </a:lvl4pPr>
             <a:lvl5pPr>
-              <a:defRPr sz="2000"/>
+              <a:defRPr sz="2100"/>
             </a:lvl5pPr>
             <a:lvl6pPr>
-              <a:defRPr sz="2000"/>
+              <a:defRPr sz="2100"/>
             </a:lvl6pPr>
             <a:lvl7pPr>
-              <a:defRPr sz="2000"/>
+              <a:defRPr sz="2100"/>
             </a:lvl7pPr>
             <a:lvl8pPr>
-              <a:defRPr sz="2000"/>
+              <a:defRPr sz="2100"/>
             </a:lvl8pPr>
             <a:lvl9pPr>
-              <a:defRPr sz="2000"/>
+              <a:defRPr sz="2100"/>
             </a:lvl9pPr>
           </a:lstStyle>
           <a:p>
@@ -2012,7 +2012,7 @@
               <a:rPr lang="en-US" smtClean="0"/>
               <a:t>Fifth level</a:t>
             </a:r>
-            <a:endParaRPr lang="en-US"/>
+            <a:endParaRPr lang="en-US" dirty="0"/>
           </a:p>
         </p:txBody>
       </p:sp>
@@ -2028,8 +2028,8 @@
         </p:nvSpPr>
         <p:spPr>
           <a:xfrm>
-            <a:off x="839788" y="2057400"/>
-            <a:ext cx="3932237" cy="3811588"/>
+            <a:off x="881778" y="2468880"/>
+            <a:ext cx="4128849" cy="4573906"/>
           </a:xfrm>
         </p:spPr>
         <p:txBody>
@@ -2037,39 +2037,39 @@
           <a:lstStyle>
             <a:lvl1pPr marL="0" indent="0">
               <a:buNone/>
-              <a:defRPr sz="1600"/>
+              <a:defRPr sz="1680"/>
             </a:lvl1pPr>
-            <a:lvl2pPr marL="457200" indent="0">
-              <a:buNone/>
-              <a:defRPr sz="1400"/>
+            <a:lvl2pPr marL="480060" indent="0">
+              <a:buNone/>
+              <a:defRPr sz="1470"/>
             </a:lvl2pPr>
-            <a:lvl3pPr marL="914400" indent="0">
-              <a:buNone/>
-              <a:defRPr sz="1200"/>
+            <a:lvl3pPr marL="960120" indent="0">
+              <a:buNone/>
+              <a:defRPr sz="1260"/>
             </a:lvl3pPr>
-            <a:lvl4pPr marL="1371600" indent="0">
-              <a:buNone/>
-              <a:defRPr sz="1000"/>
+            <a:lvl4pPr marL="1440180" indent="0">
+              <a:buNone/>
+              <a:defRPr sz="1050"/>
             </a:lvl4pPr>
-            <a:lvl5pPr marL="1828800" indent="0">
-              <a:buNone/>
-              <a:defRPr sz="1000"/>
+            <a:lvl5pPr marL="1920240" indent="0">
+              <a:buNone/>
+              <a:defRPr sz="1050"/>
             </a:lvl5pPr>
-            <a:lvl6pPr marL="2286000" indent="0">
-              <a:buNone/>
-              <a:defRPr sz="1000"/>
+            <a:lvl6pPr marL="2400300" indent="0">
+              <a:buNone/>
+              <a:defRPr sz="1050"/>
             </a:lvl6pPr>
-            <a:lvl7pPr marL="2743200" indent="0">
-              <a:buNone/>
-              <a:defRPr sz="1000"/>
+            <a:lvl7pPr marL="2880360" indent="0">
+              <a:buNone/>
+              <a:defRPr sz="1050"/>
             </a:lvl7pPr>
-            <a:lvl8pPr marL="3200400" indent="0">
-              <a:buNone/>
-              <a:defRPr sz="1000"/>
+            <a:lvl8pPr marL="3360420" indent="0">
+              <a:buNone/>
+              <a:defRPr sz="1050"/>
             </a:lvl8pPr>
-            <a:lvl9pPr marL="3657600" indent="0">
-              <a:buNone/>
-              <a:defRPr sz="1000"/>
+            <a:lvl9pPr marL="3840480" indent="0">
+              <a:buNone/>
+              <a:defRPr sz="1050"/>
             </a:lvl9pPr>
           </a:lstStyle>
           <a:p>
@@ -2098,7 +2098,7 @@
           <a:p>
             <a:fld id="{601E7828-7FC6-4336-B4EC-5F99010F00A5}" type="datetimeFigureOut">
               <a:rPr lang="en-US" smtClean="0"/>
-              <a:t>11/2/2020</a:t>
+              <a:t>11/24/2020</a:t>
             </a:fld>
             <a:endParaRPr lang="en-US"/>
           </a:p>
@@ -2149,7 +2149,7 @@
     </p:spTree>
     <p:extLst>
       <p:ext uri="{BB962C8B-B14F-4D97-AF65-F5344CB8AC3E}">
-        <p14:creationId xmlns:p14="http://schemas.microsoft.com/office/powerpoint/2010/main" val="3775073242"/>
+        <p14:creationId xmlns:p14="http://schemas.microsoft.com/office/powerpoint/2010/main" val="2284034453"/>
       </p:ext>
     </p:extLst>
   </p:cSld>
@@ -2188,15 +2188,15 @@
         </p:nvSpPr>
         <p:spPr>
           <a:xfrm>
-            <a:off x="839788" y="457200"/>
-            <a:ext cx="3932237" cy="1600200"/>
+            <a:off x="881778" y="548640"/>
+            <a:ext cx="4128849" cy="1920240"/>
           </a:xfrm>
         </p:spPr>
         <p:txBody>
           <a:bodyPr anchor="b"/>
           <a:lstStyle>
             <a:lvl1pPr>
-              <a:defRPr sz="3200"/>
+              <a:defRPr sz="3360"/>
             </a:lvl1pPr>
           </a:lstStyle>
           <a:p>
@@ -2204,7 +2204,7 @@
               <a:rPr lang="en-US" smtClean="0"/>
               <a:t>Click to edit Master title style</a:t>
             </a:r>
-            <a:endParaRPr lang="en-US"/>
+            <a:endParaRPr lang="en-US" dirty="0"/>
           </a:p>
         </p:txBody>
       </p:sp>
@@ -2212,7 +2212,7 @@
         <p:nvSpPr>
           <p:cNvPr id="3" name="Picture Placeholder 2"/>
           <p:cNvSpPr>
-            <a:spLocks noGrp="1"/>
+            <a:spLocks noGrp="1" noChangeAspect="1"/>
           </p:cNvSpPr>
           <p:nvPr>
             <p:ph type="pic" idx="1"/>
@@ -2220,8 +2220,73 @@
         </p:nvSpPr>
         <p:spPr>
           <a:xfrm>
-            <a:off x="5183188" y="987425"/>
-            <a:ext cx="6172200" cy="4873625"/>
+            <a:off x="5442347" y="1184911"/>
+            <a:ext cx="6480810" cy="5848350"/>
+          </a:xfrm>
+        </p:spPr>
+        <p:txBody>
+          <a:bodyPr anchor="t"/>
+          <a:lstStyle>
+            <a:lvl1pPr marL="0" indent="0">
+              <a:buNone/>
+              <a:defRPr sz="3360"/>
+            </a:lvl1pPr>
+            <a:lvl2pPr marL="480060" indent="0">
+              <a:buNone/>
+              <a:defRPr sz="2940"/>
+            </a:lvl2pPr>
+            <a:lvl3pPr marL="960120" indent="0">
+              <a:buNone/>
+              <a:defRPr sz="2520"/>
+            </a:lvl3pPr>
+            <a:lvl4pPr marL="1440180" indent="0">
+              <a:buNone/>
+              <a:defRPr sz="2100"/>
+            </a:lvl4pPr>
+            <a:lvl5pPr marL="1920240" indent="0">
+              <a:buNone/>
+              <a:defRPr sz="2100"/>
+            </a:lvl5pPr>
+            <a:lvl6pPr marL="2400300" indent="0">
+              <a:buNone/>
+              <a:defRPr sz="2100"/>
+            </a:lvl6pPr>
+            <a:lvl7pPr marL="2880360" indent="0">
+              <a:buNone/>
+              <a:defRPr sz="2100"/>
+            </a:lvl7pPr>
+            <a:lvl8pPr marL="3360420" indent="0">
+              <a:buNone/>
+              <a:defRPr sz="2100"/>
+            </a:lvl8pPr>
+            <a:lvl9pPr marL="3840480" indent="0">
+              <a:buNone/>
+              <a:defRPr sz="2100"/>
+            </a:lvl9pPr>
+          </a:lstStyle>
+          <a:p>
+            <a:r>
+              <a:rPr lang="en-US" smtClean="0"/>
+              <a:t>Click icon to add picture</a:t>
+            </a:r>
+            <a:endParaRPr lang="en-US" dirty="0"/>
+          </a:p>
+        </p:txBody>
+      </p:sp>
+      <p:sp>
+        <p:nvSpPr>
+          <p:cNvPr id="4" name="Text Placeholder 3"/>
+          <p:cNvSpPr>
+            <a:spLocks noGrp="1"/>
+          </p:cNvSpPr>
+          <p:nvPr>
+            <p:ph type="body" sz="half" idx="2"/>
+          </p:nvPr>
+        </p:nvSpPr>
+        <p:spPr>
+          <a:xfrm>
+            <a:off x="881778" y="2468880"/>
+            <a:ext cx="4128849" cy="4573906"/>
           </a:xfrm>
         </p:spPr>
         <p:txBody>
@@ -2229,129 +2294,68 @@
           <a:lstStyle>
             <a:lvl1pPr marL="0" indent="0">
               <a:buNone/>
-              <a:defRPr sz="3200"/>
+              <a:defRPr sz="1680"/>
             </a:lvl1pPr>
-            <a:lvl2pPr marL="457200" indent="0">
-              <a:buNone/>
-              <a:defRPr sz="2800"/>
+            <a:lvl2pPr marL="480060" indent="0">
+              <a:buNone/>
+              <a:defRPr sz="1470"/>
             </a:lvl2pPr>
-            <a:lvl3pPr marL="914400" indent="0">
-              <a:buNone/>
-              <a:defRPr sz="2400"/>
+            <a:lvl3pPr marL="960120" indent="0">
+              <a:buNone/>
+              <a:defRPr sz="1260"/>
             </a:lvl3pPr>
-            <a:lvl4pPr marL="1371600" indent="0">
-              <a:buNone/>
-              <a:defRPr sz="2000"/>
+            <a:lvl4pPr marL="1440180" indent="0">
+              <a:buNone/>
+              <a:defRPr sz="1050"/>
             </a:lvl4pPr>
-            <a:lvl5pPr marL="1828800" indent="0">
-              <a:buNone/>
-              <a:defRPr sz="2000"/>
+            <a:lvl5pPr marL="1920240" indent="0">
+              <a:buNone/>
+              <a:defRPr sz="1050"/>
             </a:lvl5pPr>
-            <a:lvl6pPr marL="2286000" indent="0">
-              <a:buNone/>
-              <a:defRPr sz="2000"/>
+            <a:lvl6pPr marL="2400300" indent="0">
+              <a:buNone/>
+              <a:defRPr sz="1050"/>
             </a:lvl6pPr>
-            <a:lvl7pPr marL="2743200" indent="0">
-              <a:buNone/>
-              <a:defRPr sz="2000"/>
+            <a:lvl7pPr marL="2880360" indent="0">
+              <a:buNone/>
+              <a:defRPr sz="1050"/>
             </a:lvl7pPr>
-            <a:lvl8pPr marL="3200400" indent="0">
-              <a:buNone/>
-              <a:defRPr sz="2000"/>
+            <a:lvl8pPr marL="3360420" indent="0">
+              <a:buNone/>
+              <a:defRPr sz="1050"/>
             </a:lvl8pPr>
-            <a:lvl9pPr marL="3657600" indent="0">
-              <a:buNone/>
-              <a:defRPr sz="2000"/>
+            <a:lvl9pPr marL="3840480" indent="0">
+              <a:buNone/>
+              <a:defRPr sz="1050"/>
             </a:lvl9pPr>
           </a:lstStyle>
           <a:p>
-            <a:endParaRPr lang="en-US"/>
-          </a:p>
-        </p:txBody>
-      </p:sp>
-      <p:sp>
-        <p:nvSpPr>
-          <p:cNvPr id="4" name="Text Placeholder 3"/>
-          <p:cNvSpPr>
-            <a:spLocks noGrp="1"/>
-          </p:cNvSpPr>
-          <p:nvPr>
-            <p:ph type="body" sz="half" idx="2"/>
-          </p:nvPr>
-        </p:nvSpPr>
-        <p:spPr>
-          <a:xfrm>
-            <a:off x="839788" y="2057400"/>
-            <a:ext cx="3932237" cy="3811588"/>
-          </a:xfrm>
-        </p:spPr>
+            <a:pPr lvl="0"/>
+            <a:r>
+              <a:rPr lang="en-US" smtClean="0"/>
+              <a:t>Edit Master text styles</a:t>
+            </a:r>
+          </a:p>
+        </p:txBody>
+      </p:sp>
+      <p:sp>
+        <p:nvSpPr>
+          <p:cNvPr id="5" name="Date Placeholder 4"/>
+          <p:cNvSpPr>
+            <a:spLocks noGrp="1"/>
+          </p:cNvSpPr>
+          <p:nvPr>
+            <p:ph type="dt" sz="half" idx="10"/>
+          </p:nvPr>
+        </p:nvSpPr>
+        <p:spPr/>
         <p:txBody>
           <a:bodyPr/>
-          <a:lstStyle>
-            <a:lvl1pPr marL="0" indent="0">
-              <a:buNone/>
-              <a:defRPr sz="1600"/>
-            </a:lvl1pPr>
-            <a:lvl2pPr marL="457200" indent="0">
-              <a:buNone/>
-              <a:defRPr sz="1400"/>
-            </a:lvl2pPr>
-            <a:lvl3pPr marL="914400" indent="0">
-              <a:buNone/>
-              <a:defRPr sz="1200"/>
-            </a:lvl3pPr>
-            <a:lvl4pPr marL="1371600" indent="0">
-              <a:buNone/>
-              <a:defRPr sz="1000"/>
-            </a:lvl4pPr>
-            <a:lvl5pPr marL="1828800" indent="0">
-              <a:buNone/>
-              <a:defRPr sz="1000"/>
-            </a:lvl5pPr>
-            <a:lvl6pPr marL="2286000" indent="0">
-              <a:buNone/>
-              <a:defRPr sz="1000"/>
-            </a:lvl6pPr>
-            <a:lvl7pPr marL="2743200" indent="0">
-              <a:buNone/>
-              <a:defRPr sz="1000"/>
-            </a:lvl7pPr>
-            <a:lvl8pPr marL="3200400" indent="0">
-              <a:buNone/>
-              <a:defRPr sz="1000"/>
-            </a:lvl8pPr>
-            <a:lvl9pPr marL="3657600" indent="0">
-              <a:buNone/>
-              <a:defRPr sz="1000"/>
-            </a:lvl9pPr>
-          </a:lstStyle>
-          <a:p>
-            <a:pPr lvl="0"/>
-            <a:r>
-              <a:rPr lang="en-US" smtClean="0"/>
-              <a:t>Edit Master text styles</a:t>
-            </a:r>
-          </a:p>
-        </p:txBody>
-      </p:sp>
-      <p:sp>
-        <p:nvSpPr>
-          <p:cNvPr id="5" name="Date Placeholder 4"/>
-          <p:cNvSpPr>
-            <a:spLocks noGrp="1"/>
-          </p:cNvSpPr>
-          <p:nvPr>
-            <p:ph type="dt" sz="half" idx="10"/>
-          </p:nvPr>
-        </p:nvSpPr>
-        <p:spPr/>
-        <p:txBody>
-          <a:bodyPr/>
           <a:lstStyle/>
           <a:p>
             <a:fld id="{601E7828-7FC6-4336-B4EC-5F99010F00A5}" type="datetimeFigureOut">
               <a:rPr lang="en-US" smtClean="0"/>
-              <a:t>11/2/2020</a:t>
+              <a:t>11/24/2020</a:t>
             </a:fld>
             <a:endParaRPr lang="en-US"/>
           </a:p>
@@ -2402,7 +2406,7 @@
     </p:spTree>
     <p:extLst>
       <p:ext uri="{BB962C8B-B14F-4D97-AF65-F5344CB8AC3E}">
-        <p14:creationId xmlns:p14="http://schemas.microsoft.com/office/powerpoint/2010/main" val="642680855"/>
+        <p14:creationId xmlns:p14="http://schemas.microsoft.com/office/powerpoint/2010/main" val="2030990658"/>
       </p:ext>
     </p:extLst>
   </p:cSld>
@@ -2446,8 +2450,8 @@
         </p:nvSpPr>
         <p:spPr>
           <a:xfrm>
-            <a:off x="838200" y="365125"/>
-            <a:ext cx="10515600" cy="1325563"/>
+            <a:off x="880110" y="438150"/>
+            <a:ext cx="11041380" cy="1590676"/>
           </a:xfrm>
           <a:prstGeom prst="rect">
             <a:avLst/>
@@ -2463,7 +2467,7 @@
               <a:rPr lang="en-US" smtClean="0"/>
               <a:t>Click to edit Master title style</a:t>
             </a:r>
-            <a:endParaRPr lang="en-US"/>
+            <a:endParaRPr lang="en-US" dirty="0"/>
           </a:p>
         </p:txBody>
       </p:sp>
@@ -2479,8 +2483,8 @@
         </p:nvSpPr>
         <p:spPr>
           <a:xfrm>
-            <a:off x="838200" y="1825625"/>
-            <a:ext cx="10515600" cy="4351338"/>
+            <a:off x="880110" y="2190750"/>
+            <a:ext cx="11041380" cy="5221606"/>
           </a:xfrm>
           <a:prstGeom prst="rect">
             <a:avLst/>
@@ -2525,7 +2529,7 @@
               <a:rPr lang="en-US" smtClean="0"/>
               <a:t>Fifth level</a:t>
             </a:r>
-            <a:endParaRPr lang="en-US"/>
+            <a:endParaRPr lang="en-US" dirty="0"/>
           </a:p>
         </p:txBody>
       </p:sp>
@@ -2541,8 +2545,8 @@
         </p:nvSpPr>
         <p:spPr>
           <a:xfrm>
-            <a:off x="838200" y="6356350"/>
-            <a:ext cx="2743200" cy="365125"/>
+            <a:off x="880110" y="7627621"/>
+            <a:ext cx="2880360" cy="438150"/>
           </a:xfrm>
           <a:prstGeom prst="rect">
             <a:avLst/>
@@ -2552,7 +2556,7 @@
           <a:bodyPr vert="horz" lIns="91440" tIns="45720" rIns="91440" bIns="45720" rtlCol="0" anchor="ctr"/>
           <a:lstStyle>
             <a:lvl1pPr algn="l">
-              <a:defRPr sz="1200">
+              <a:defRPr sz="1260">
                 <a:solidFill>
                   <a:schemeClr val="tx1">
                     <a:tint val="75000"/>
@@ -2564,7 +2568,7 @@
           <a:p>
             <a:fld id="{601E7828-7FC6-4336-B4EC-5F99010F00A5}" type="datetimeFigureOut">
               <a:rPr lang="en-US" smtClean="0"/>
-              <a:t>11/2/2020</a:t>
+              <a:t>11/24/2020</a:t>
             </a:fld>
             <a:endParaRPr lang="en-US"/>
           </a:p>
@@ -2582,8 +2586,8 @@
         </p:nvSpPr>
         <p:spPr>
           <a:xfrm>
-            <a:off x="4038600" y="6356350"/>
-            <a:ext cx="4114800" cy="365125"/>
+            <a:off x="4240530" y="7627621"/>
+            <a:ext cx="4320540" cy="438150"/>
           </a:xfrm>
           <a:prstGeom prst="rect">
             <a:avLst/>
@@ -2593,7 +2597,7 @@
           <a:bodyPr vert="horz" lIns="91440" tIns="45720" rIns="91440" bIns="45720" rtlCol="0" anchor="ctr"/>
           <a:lstStyle>
             <a:lvl1pPr algn="ctr">
-              <a:defRPr sz="1200">
+              <a:defRPr sz="1260">
                 <a:solidFill>
                   <a:schemeClr val="tx1">
                     <a:tint val="75000"/>
@@ -2619,8 +2623,8 @@
         </p:nvSpPr>
         <p:spPr>
           <a:xfrm>
-            <a:off x="8610600" y="6356350"/>
-            <a:ext cx="2743200" cy="365125"/>
+            <a:off x="9041130" y="7627621"/>
+            <a:ext cx="2880360" cy="438150"/>
           </a:xfrm>
           <a:prstGeom prst="rect">
             <a:avLst/>
@@ -2630,7 +2634,7 @@
           <a:bodyPr vert="horz" lIns="91440" tIns="45720" rIns="91440" bIns="45720" rtlCol="0" anchor="ctr"/>
           <a:lstStyle>
             <a:lvl1pPr algn="r">
-              <a:defRPr sz="1200">
+              <a:defRPr sz="1260">
                 <a:solidFill>
                   <a:schemeClr val="tx1">
                     <a:tint val="75000"/>
@@ -2651,27 +2655,27 @@
     </p:spTree>
     <p:extLst>
       <p:ext uri="{BB962C8B-B14F-4D97-AF65-F5344CB8AC3E}">
-        <p14:creationId xmlns:p14="http://schemas.microsoft.com/office/powerpoint/2010/main" val="3589886193"/>
+        <p14:creationId xmlns:p14="http://schemas.microsoft.com/office/powerpoint/2010/main" val="3892707291"/>
       </p:ext>
     </p:extLst>
   </p:cSld>
   <p:clrMap bg1="lt1" tx1="dk1" bg2="lt2" tx2="dk2" accent1="accent1" accent2="accent2" accent3="accent3" accent4="accent4" accent5="accent5" accent6="accent6" hlink="hlink" folHlink="folHlink"/>
   <p:sldLayoutIdLst>
-    <p:sldLayoutId id="2147483649" r:id="rId1"/>
-    <p:sldLayoutId id="2147483650" r:id="rId2"/>
-    <p:sldLayoutId id="2147483651" r:id="rId3"/>
-    <p:sldLayoutId id="2147483652" r:id="rId4"/>
-    <p:sldLayoutId id="2147483653" r:id="rId5"/>
-    <p:sldLayoutId id="2147483654" r:id="rId6"/>
-    <p:sldLayoutId id="2147483655" r:id="rId7"/>
-    <p:sldLayoutId id="2147483656" r:id="rId8"/>
-    <p:sldLayoutId id="2147483657" r:id="rId9"/>
-    <p:sldLayoutId id="2147483658" r:id="rId10"/>
-    <p:sldLayoutId id="2147483659" r:id="rId11"/>
+    <p:sldLayoutId id="2147483709" r:id="rId1"/>
+    <p:sldLayoutId id="2147483710" r:id="rId2"/>
+    <p:sldLayoutId id="2147483711" r:id="rId3"/>
+    <p:sldLayoutId id="2147483712" r:id="rId4"/>
+    <p:sldLayoutId id="2147483713" r:id="rId5"/>
+    <p:sldLayoutId id="2147483714" r:id="rId6"/>
+    <p:sldLayoutId id="2147483715" r:id="rId7"/>
+    <p:sldLayoutId id="2147483716" r:id="rId8"/>
+    <p:sldLayoutId id="2147483717" r:id="rId9"/>
+    <p:sldLayoutId id="2147483718" r:id="rId10"/>
+    <p:sldLayoutId id="2147483719" r:id="rId11"/>
   </p:sldLayoutIdLst>
   <p:txStyles>
     <p:titleStyle>
-      <a:lvl1pPr algn="l" defTabSz="914400" rtl="0" eaLnBrk="1" latinLnBrk="0" hangingPunct="1">
+      <a:lvl1pPr algn="l" defTabSz="960120" rtl="0" eaLnBrk="1" latinLnBrk="0" hangingPunct="1">
         <a:lnSpc>
           <a:spcPct val="90000"/>
         </a:lnSpc>
@@ -2679,7 +2683,7 @@
           <a:spcPct val="0"/>
         </a:spcBef>
         <a:buNone/>
-        <a:defRPr sz="4400" kern="1200">
+        <a:defRPr sz="4620" kern="1200">
           <a:solidFill>
             <a:schemeClr val="tx1"/>
           </a:solidFill>
@@ -2690,16 +2694,16 @@
       </a:lvl1pPr>
     </p:titleStyle>
     <p:bodyStyle>
-      <a:lvl1pPr marL="228600" indent="-228600" algn="l" defTabSz="914400" rtl="0" eaLnBrk="1" latinLnBrk="0" hangingPunct="1">
+      <a:lvl1pPr marL="240030" indent="-240030" algn="l" defTabSz="960120" rtl="0" eaLnBrk="1" latinLnBrk="0" hangingPunct="1">
         <a:lnSpc>
           <a:spcPct val="90000"/>
         </a:lnSpc>
         <a:spcBef>
-          <a:spcPts val="1000"/>
+          <a:spcPts val="1050"/>
         </a:spcBef>
         <a:buFont typeface="Arial" panose="020B0604020202020204" pitchFamily="34" charset="0"/>
         <a:buChar char="•"/>
-        <a:defRPr sz="2800" kern="1200">
+        <a:defRPr sz="2940" kern="1200">
           <a:solidFill>
             <a:schemeClr val="tx1"/>
           </a:solidFill>
@@ -2708,16 +2712,16 @@
           <a:cs typeface="+mn-cs"/>
         </a:defRPr>
       </a:lvl1pPr>
-      <a:lvl2pPr marL="685800" indent="-228600" algn="l" defTabSz="914400" rtl="0" eaLnBrk="1" latinLnBrk="0" hangingPunct="1">
+      <a:lvl2pPr marL="720090" indent="-240030" algn="l" defTabSz="960120" rtl="0" eaLnBrk="1" latinLnBrk="0" hangingPunct="1">
         <a:lnSpc>
           <a:spcPct val="90000"/>
         </a:lnSpc>
         <a:spcBef>
-          <a:spcPts val="500"/>
+          <a:spcPts val="525"/>
         </a:spcBef>
         <a:buFont typeface="Arial" panose="020B0604020202020204" pitchFamily="34" charset="0"/>
         <a:buChar char="•"/>
-        <a:defRPr sz="2400" kern="1200">
+        <a:defRPr sz="2520" kern="1200">
           <a:solidFill>
             <a:schemeClr val="tx1"/>
           </a:solidFill>
@@ -2726,16 +2730,16 @@
           <a:cs typeface="+mn-cs"/>
         </a:defRPr>
       </a:lvl2pPr>
-      <a:lvl3pPr marL="1143000" indent="-228600" algn="l" defTabSz="914400" rtl="0" eaLnBrk="1" latinLnBrk="0" hangingPunct="1">
+      <a:lvl3pPr marL="1200150" indent="-240030" algn="l" defTabSz="960120" rtl="0" eaLnBrk="1" latinLnBrk="0" hangingPunct="1">
         <a:lnSpc>
           <a:spcPct val="90000"/>
         </a:lnSpc>
         <a:spcBef>
-          <a:spcPts val="500"/>
+          <a:spcPts val="525"/>
         </a:spcBef>
         <a:buFont typeface="Arial" panose="020B0604020202020204" pitchFamily="34" charset="0"/>
         <a:buChar char="•"/>
-        <a:defRPr sz="2000" kern="1200">
+        <a:defRPr sz="2100" kern="1200">
           <a:solidFill>
             <a:schemeClr val="tx1"/>
           </a:solidFill>
@@ -2744,16 +2748,16 @@
           <a:cs typeface="+mn-cs"/>
         </a:defRPr>
       </a:lvl3pPr>
-      <a:lvl4pPr marL="1600200" indent="-228600" algn="l" defTabSz="914400" rtl="0" eaLnBrk="1" latinLnBrk="0" hangingPunct="1">
+      <a:lvl4pPr marL="1680210" indent="-240030" algn="l" defTabSz="960120" rtl="0" eaLnBrk="1" latinLnBrk="0" hangingPunct="1">
         <a:lnSpc>
           <a:spcPct val="90000"/>
         </a:lnSpc>
         <a:spcBef>
-          <a:spcPts val="500"/>
+          <a:spcPts val="525"/>
         </a:spcBef>
         <a:buFont typeface="Arial" panose="020B0604020202020204" pitchFamily="34" charset="0"/>
         <a:buChar char="•"/>
-        <a:defRPr sz="1800" kern="1200">
+        <a:defRPr sz="1890" kern="1200">
           <a:solidFill>
             <a:schemeClr val="tx1"/>
           </a:solidFill>
@@ -2762,16 +2766,16 @@
           <a:cs typeface="+mn-cs"/>
         </a:defRPr>
       </a:lvl4pPr>
-      <a:lvl5pPr marL="2057400" indent="-228600" algn="l" defTabSz="914400" rtl="0" eaLnBrk="1" latinLnBrk="0" hangingPunct="1">
+      <a:lvl5pPr marL="2160270" indent="-240030" algn="l" defTabSz="960120" rtl="0" eaLnBrk="1" latinLnBrk="0" hangingPunct="1">
         <a:lnSpc>
           <a:spcPct val="90000"/>
         </a:lnSpc>
         <a:spcBef>
-          <a:spcPts val="500"/>
+          <a:spcPts val="525"/>
         </a:spcBef>
         <a:buFont typeface="Arial" panose="020B0604020202020204" pitchFamily="34" charset="0"/>
         <a:buChar char="•"/>
-        <a:defRPr sz="1800" kern="1200">
+        <a:defRPr sz="1890" kern="1200">
           <a:solidFill>
             <a:schemeClr val="tx1"/>
           </a:solidFill>
@@ -2780,16 +2784,16 @@
           <a:cs typeface="+mn-cs"/>
         </a:defRPr>
       </a:lvl5pPr>
-      <a:lvl6pPr marL="2514600" indent="-228600" algn="l" defTabSz="914400" rtl="0" eaLnBrk="1" latinLnBrk="0" hangingPunct="1">
+      <a:lvl6pPr marL="2640330" indent="-240030" algn="l" defTabSz="960120" rtl="0" eaLnBrk="1" latinLnBrk="0" hangingPunct="1">
         <a:lnSpc>
           <a:spcPct val="90000"/>
         </a:lnSpc>
         <a:spcBef>
-          <a:spcPts val="500"/>
+          <a:spcPts val="525"/>
         </a:spcBef>
         <a:buFont typeface="Arial" panose="020B0604020202020204" pitchFamily="34" charset="0"/>
         <a:buChar char="•"/>
-        <a:defRPr sz="1800" kern="1200">
+        <a:defRPr sz="1890" kern="1200">
           <a:solidFill>
             <a:schemeClr val="tx1"/>
           </a:solidFill>
@@ -2798,16 +2802,16 @@
           <a:cs typeface="+mn-cs"/>
         </a:defRPr>
       </a:lvl6pPr>
-      <a:lvl7pPr marL="2971800" indent="-228600" algn="l" defTabSz="914400" rtl="0" eaLnBrk="1" latinLnBrk="0" hangingPunct="1">
+      <a:lvl7pPr marL="3120390" indent="-240030" algn="l" defTabSz="960120" rtl="0" eaLnBrk="1" latinLnBrk="0" hangingPunct="1">
         <a:lnSpc>
           <a:spcPct val="90000"/>
         </a:lnSpc>
         <a:spcBef>
-          <a:spcPts val="500"/>
+          <a:spcPts val="525"/>
         </a:spcBef>
         <a:buFont typeface="Arial" panose="020B0604020202020204" pitchFamily="34" charset="0"/>
         <a:buChar char="•"/>
-        <a:defRPr sz="1800" kern="1200">
+        <a:defRPr sz="1890" kern="1200">
           <a:solidFill>
             <a:schemeClr val="tx1"/>
           </a:solidFill>
@@ -2816,16 +2820,16 @@
           <a:cs typeface="+mn-cs"/>
         </a:defRPr>
       </a:lvl7pPr>
-      <a:lvl8pPr marL="3429000" indent="-228600" algn="l" defTabSz="914400" rtl="0" eaLnBrk="1" latinLnBrk="0" hangingPunct="1">
+      <a:lvl8pPr marL="3600450" indent="-240030" algn="l" defTabSz="960120" rtl="0" eaLnBrk="1" latinLnBrk="0" hangingPunct="1">
         <a:lnSpc>
           <a:spcPct val="90000"/>
         </a:lnSpc>
         <a:spcBef>
-          <a:spcPts val="500"/>
+          <a:spcPts val="525"/>
         </a:spcBef>
         <a:buFont typeface="Arial" panose="020B0604020202020204" pitchFamily="34" charset="0"/>
         <a:buChar char="•"/>
-        <a:defRPr sz="1800" kern="1200">
+        <a:defRPr sz="1890" kern="1200">
           <a:solidFill>
             <a:schemeClr val="tx1"/>
           </a:solidFill>
@@ -2834,16 +2838,16 @@
           <a:cs typeface="+mn-cs"/>
         </a:defRPr>
       </a:lvl8pPr>
-      <a:lvl9pPr marL="3886200" indent="-228600" algn="l" defTabSz="914400" rtl="0" eaLnBrk="1" latinLnBrk="0" hangingPunct="1">
+      <a:lvl9pPr marL="4080510" indent="-240030" algn="l" defTabSz="960120" rtl="0" eaLnBrk="1" latinLnBrk="0" hangingPunct="1">
         <a:lnSpc>
           <a:spcPct val="90000"/>
         </a:lnSpc>
         <a:spcBef>
-          <a:spcPts val="500"/>
+          <a:spcPts val="525"/>
         </a:spcBef>
         <a:buFont typeface="Arial" panose="020B0604020202020204" pitchFamily="34" charset="0"/>
         <a:buChar char="•"/>
-        <a:defRPr sz="1800" kern="1200">
+        <a:defRPr sz="1890" kern="1200">
           <a:solidFill>
             <a:schemeClr val="tx1"/>
           </a:solidFill>
@@ -2857,8 +2861,8 @@
       <a:defPPr>
         <a:defRPr lang="en-US"/>
       </a:defPPr>
-      <a:lvl1pPr marL="0" algn="l" defTabSz="914400" rtl="0" eaLnBrk="1" latinLnBrk="0" hangingPunct="1">
-        <a:defRPr sz="1800" kern="1200">
+      <a:lvl1pPr marL="0" algn="l" defTabSz="960120" rtl="0" eaLnBrk="1" latinLnBrk="0" hangingPunct="1">
+        <a:defRPr sz="1890" kern="1200">
           <a:solidFill>
             <a:schemeClr val="tx1"/>
           </a:solidFill>
@@ -2867,8 +2871,8 @@
           <a:cs typeface="+mn-cs"/>
         </a:defRPr>
       </a:lvl1pPr>
-      <a:lvl2pPr marL="457200" algn="l" defTabSz="914400" rtl="0" eaLnBrk="1" latinLnBrk="0" hangingPunct="1">
-        <a:defRPr sz="1800" kern="1200">
+      <a:lvl2pPr marL="480060" algn="l" defTabSz="960120" rtl="0" eaLnBrk="1" latinLnBrk="0" hangingPunct="1">
+        <a:defRPr sz="1890" kern="1200">
           <a:solidFill>
             <a:schemeClr val="tx1"/>
           </a:solidFill>
@@ -2877,8 +2881,8 @@
           <a:cs typeface="+mn-cs"/>
         </a:defRPr>
       </a:lvl2pPr>
-      <a:lvl3pPr marL="914400" algn="l" defTabSz="914400" rtl="0" eaLnBrk="1" latinLnBrk="0" hangingPunct="1">
-        <a:defRPr sz="1800" kern="1200">
+      <a:lvl3pPr marL="960120" algn="l" defTabSz="960120" rtl="0" eaLnBrk="1" latinLnBrk="0" hangingPunct="1">
+        <a:defRPr sz="1890" kern="1200">
           <a:solidFill>
             <a:schemeClr val="tx1"/>
           </a:solidFill>
@@ -2887,8 +2891,8 @@
           <a:cs typeface="+mn-cs"/>
         </a:defRPr>
       </a:lvl3pPr>
-      <a:lvl4pPr marL="1371600" algn="l" defTabSz="914400" rtl="0" eaLnBrk="1" latinLnBrk="0" hangingPunct="1">
-        <a:defRPr sz="1800" kern="1200">
+      <a:lvl4pPr marL="1440180" algn="l" defTabSz="960120" rtl="0" eaLnBrk="1" latinLnBrk="0" hangingPunct="1">
+        <a:defRPr sz="1890" kern="1200">
           <a:solidFill>
             <a:schemeClr val="tx1"/>
           </a:solidFill>
@@ -2897,8 +2901,8 @@
           <a:cs typeface="+mn-cs"/>
         </a:defRPr>
       </a:lvl4pPr>
-      <a:lvl5pPr marL="1828800" algn="l" defTabSz="914400" rtl="0" eaLnBrk="1" latinLnBrk="0" hangingPunct="1">
-        <a:defRPr sz="1800" kern="1200">
+      <a:lvl5pPr marL="1920240" algn="l" defTabSz="960120" rtl="0" eaLnBrk="1" latinLnBrk="0" hangingPunct="1">
+        <a:defRPr sz="1890" kern="1200">
           <a:solidFill>
             <a:schemeClr val="tx1"/>
           </a:solidFill>
@@ -2907,8 +2911,8 @@
           <a:cs typeface="+mn-cs"/>
         </a:defRPr>
       </a:lvl5pPr>
-      <a:lvl6pPr marL="2286000" algn="l" defTabSz="914400" rtl="0" eaLnBrk="1" latinLnBrk="0" hangingPunct="1">
-        <a:defRPr sz="1800" kern="1200">
+      <a:lvl6pPr marL="2400300" algn="l" defTabSz="960120" rtl="0" eaLnBrk="1" latinLnBrk="0" hangingPunct="1">
+        <a:defRPr sz="1890" kern="1200">
           <a:solidFill>
             <a:schemeClr val="tx1"/>
           </a:solidFill>
@@ -2917,8 +2921,8 @@
           <a:cs typeface="+mn-cs"/>
         </a:defRPr>
       </a:lvl6pPr>
-      <a:lvl7pPr marL="2743200" algn="l" defTabSz="914400" rtl="0" eaLnBrk="1" latinLnBrk="0" hangingPunct="1">
-        <a:defRPr sz="1800" kern="1200">
+      <a:lvl7pPr marL="2880360" algn="l" defTabSz="960120" rtl="0" eaLnBrk="1" latinLnBrk="0" hangingPunct="1">
+        <a:defRPr sz="1890" kern="1200">
           <a:solidFill>
             <a:schemeClr val="tx1"/>
           </a:solidFill>
@@ -2927,8 +2931,8 @@
           <a:cs typeface="+mn-cs"/>
         </a:defRPr>
       </a:lvl7pPr>
-      <a:lvl8pPr marL="3200400" algn="l" defTabSz="914400" rtl="0" eaLnBrk="1" latinLnBrk="0" hangingPunct="1">
-        <a:defRPr sz="1800" kern="1200">
+      <a:lvl8pPr marL="3360420" algn="l" defTabSz="960120" rtl="0" eaLnBrk="1" latinLnBrk="0" hangingPunct="1">
+        <a:defRPr sz="1890" kern="1200">
           <a:solidFill>
             <a:schemeClr val="tx1"/>
           </a:solidFill>
@@ -2937,8 +2941,8 @@
           <a:cs typeface="+mn-cs"/>
         </a:defRPr>
       </a:lvl8pPr>
-      <a:lvl9pPr marL="3657600" algn="l" defTabSz="914400" rtl="0" eaLnBrk="1" latinLnBrk="0" hangingPunct="1">
-        <a:defRPr sz="1800" kern="1200">
+      <a:lvl9pPr marL="3840480" algn="l" defTabSz="960120" rtl="0" eaLnBrk="1" latinLnBrk="0" hangingPunct="1">
+        <a:defRPr sz="1890" kern="1200">
           <a:solidFill>
             <a:schemeClr val="tx1"/>
           </a:solidFill>
@@ -2955,6 +2959,14 @@
 <file path=ppt/slides/slide1.xml><?xml version="1.0" encoding="utf-8"?>
 <p:sld xmlns:a="http://schemas.openxmlformats.org/drawingml/2006/main" xmlns:r="http://schemas.openxmlformats.org/officeDocument/2006/relationships" xmlns:p="http://schemas.openxmlformats.org/presentationml/2006/main">
   <p:cSld>
+    <p:bg>
+      <p:bgPr>
+        <a:solidFill>
+          <a:srgbClr val="E5E5E5"/>
+        </a:solidFill>
+        <a:effectLst/>
+      </p:bgPr>
+    </p:bg>
     <p:spTree>
       <p:nvGrpSpPr>
         <p:cNvPr id="1" name=""/>
@@ -2969,35 +2981,6 @@
           <a:chExt cx="0" cy="0"/>
         </a:xfrm>
       </p:grpSpPr>
-      <p:pic>
-        <p:nvPicPr>
-          <p:cNvPr id="36" name="Picture 35"/>
-          <p:cNvPicPr>
-            <a:picLocks noChangeAspect="1"/>
-          </p:cNvPicPr>
-          <p:nvPr/>
-        </p:nvPicPr>
-        <p:blipFill rotWithShape="1">
-          <a:blip r:embed="rId2">
-            <a:extLst>
-              <a:ext uri="{28A0092B-C50C-407E-A947-70E740481C1C}">
-                <a14:useLocalDpi xmlns:a14="http://schemas.microsoft.com/office/drawing/2010/main" val="0"/>
-              </a:ext>
-            </a:extLst>
-          </a:blip>
-          <a:srcRect l="4532" t="6918" r="4383" b="7138"/>
-          <a:stretch/>
-        </p:blipFill>
-        <p:spPr>
-          <a:xfrm>
-            <a:off x="-7620" y="-22860"/>
-            <a:ext cx="12218669" cy="6888480"/>
-          </a:xfrm>
-          <a:prstGeom prst="rect">
-            <a:avLst/>
-          </a:prstGeom>
-        </p:spPr>
-      </p:pic>
       <p:sp>
         <p:nvSpPr>
           <p:cNvPr id="6" name="TextBox 5"/>
@@ -3006,8 +2989,8 @@
         </p:nvSpPr>
         <p:spPr>
           <a:xfrm>
-            <a:off x="2813685" y="-17119"/>
-            <a:ext cx="1950720" cy="369332"/>
+            <a:off x="2372409" y="103560"/>
+            <a:ext cx="1950720" cy="369460"/>
           </a:xfrm>
           <a:prstGeom prst="rect">
             <a:avLst/>
@@ -3020,23 +3003,16 @@
           </a:bodyPr>
           <a:lstStyle/>
           <a:p>
-            <a:r>
-              <a:rPr lang="en-US" dirty="0" err="1">
+            <a:pPr algn="ctr"/>
+            <a:r>
+              <a:rPr lang="en-US" sz="1801" dirty="0" err="1">
                 <a:solidFill>
                   <a:schemeClr val="accent1"/>
                 </a:solidFill>
               </a:rPr>
-              <a:t>t</a:t>
-            </a:r>
-            <a:r>
-              <a:rPr lang="en-US" dirty="0" err="1" smtClean="0">
-                <a:solidFill>
-                  <a:schemeClr val="accent1"/>
-                </a:solidFill>
-              </a:rPr>
-              <a:t>itle_width</a:t>
-            </a:r>
-            <a:endParaRPr lang="en-US" dirty="0">
+              <a:t>title_width</a:t>
+            </a:r>
+            <a:endParaRPr lang="en-US" sz="1801" dirty="0">
               <a:solidFill>
                 <a:schemeClr val="accent1"/>
               </a:solidFill>
@@ -3052,8 +3028,8 @@
         </p:nvSpPr>
         <p:spPr>
           <a:xfrm rot="5400000">
-            <a:off x="6035605" y="-3306878"/>
-            <a:ext cx="112084" cy="7598231"/>
+            <a:off x="6347525" y="-3635691"/>
+            <a:ext cx="125152" cy="8484148"/>
           </a:xfrm>
           <a:prstGeom prst="leftBrace">
             <a:avLst>
@@ -3082,7 +3058,7 @@
           <a:lstStyle/>
           <a:p>
             <a:pPr algn="ctr"/>
-            <a:endParaRPr lang="en-US"/>
+            <a:endParaRPr lang="en-US" sz="1801"/>
           </a:p>
         </p:txBody>
       </p:sp>
@@ -3094,8 +3070,8 @@
         </p:nvSpPr>
         <p:spPr>
           <a:xfrm>
-            <a:off x="5741193" y="66863"/>
-            <a:ext cx="1020130" cy="369332"/>
+            <a:off x="5900036" y="187544"/>
+            <a:ext cx="1020130" cy="369460"/>
           </a:xfrm>
           <a:prstGeom prst="rect">
             <a:avLst/>
@@ -3108,19 +3084,15 @@
           </a:bodyPr>
           <a:lstStyle/>
           <a:p>
-            <a:r>
-              <a:rPr lang="en-US" dirty="0" smtClean="0">
+            <a:pPr algn="ctr"/>
+            <a:r>
+              <a:rPr lang="en-US" sz="1801" dirty="0">
                 <a:solidFill>
                   <a:schemeClr val="accent1"/>
                 </a:solidFill>
               </a:rPr>
               <a:t>width</a:t>
             </a:r>
-            <a:endParaRPr lang="en-US" dirty="0">
-              <a:solidFill>
-                <a:schemeClr val="accent1"/>
-              </a:solidFill>
-            </a:endParaRPr>
           </a:p>
         </p:txBody>
       </p:sp>
@@ -3132,8 +3104,8 @@
         </p:nvSpPr>
         <p:spPr>
           <a:xfrm>
-            <a:off x="2151347" y="592455"/>
-            <a:ext cx="112084" cy="5682616"/>
+            <a:off x="2026846" y="713135"/>
+            <a:ext cx="107024" cy="5047790"/>
           </a:xfrm>
           <a:prstGeom prst="leftBrace">
             <a:avLst>
@@ -3162,7 +3134,7 @@
           <a:lstStyle/>
           <a:p>
             <a:pPr algn="ctr"/>
-            <a:endParaRPr lang="en-US"/>
+            <a:endParaRPr lang="en-US" sz="1801"/>
           </a:p>
         </p:txBody>
       </p:sp>
@@ -3174,8 +3146,8 @@
         </p:nvSpPr>
         <p:spPr>
           <a:xfrm>
-            <a:off x="1272401" y="3232706"/>
-            <a:ext cx="1020130" cy="369332"/>
+            <a:off x="1147897" y="3052365"/>
+            <a:ext cx="1020130" cy="369460"/>
           </a:xfrm>
           <a:prstGeom prst="rect">
             <a:avLst/>
@@ -3189,18 +3161,13 @@
           <a:lstStyle/>
           <a:p>
             <a:r>
-              <a:rPr lang="en-US" dirty="0" smtClean="0">
+              <a:rPr lang="en-US" sz="1801" dirty="0">
                 <a:solidFill>
                   <a:schemeClr val="accent1"/>
                 </a:solidFill>
               </a:rPr>
               <a:t>height</a:t>
             </a:r>
-            <a:endParaRPr lang="en-US" dirty="0">
-              <a:solidFill>
-                <a:schemeClr val="accent1"/>
-              </a:solidFill>
-            </a:endParaRPr>
           </a:p>
         </p:txBody>
       </p:sp>
@@ -3212,8 +3179,54 @@
         </p:nvSpPr>
         <p:spPr>
           <a:xfrm rot="10800000">
-            <a:off x="9944695" y="934053"/>
-            <a:ext cx="112084" cy="59055"/>
+            <a:off x="10690766" y="875287"/>
+            <a:ext cx="112084" cy="59056"/>
+          </a:xfrm>
+          <a:prstGeom prst="leftBrace">
+            <a:avLst>
+              <a:gd name="adj1" fmla="val 79717"/>
+              <a:gd name="adj2" fmla="val 50000"/>
+            </a:avLst>
+          </a:prstGeom>
+          <a:ln w="19050">
+            <a:solidFill>
+              <a:schemeClr val="accent6"/>
+            </a:solidFill>
+          </a:ln>
+        </p:spPr>
+        <p:style>
+          <a:lnRef idx="1">
+            <a:schemeClr val="accent1"/>
+          </a:lnRef>
+          <a:fillRef idx="0">
+            <a:schemeClr val="accent1"/>
+          </a:fillRef>
+          <a:effectRef idx="0">
+            <a:schemeClr val="accent1"/>
+          </a:effectRef>
+          <a:fontRef idx="minor">
+            <a:schemeClr val="tx1"/>
+          </a:fontRef>
+        </p:style>
+        <p:txBody>
+          <a:bodyPr rtlCol="0" anchor="ctr"/>
+          <a:lstStyle/>
+          <a:p>
+            <a:pPr algn="ctr"/>
+            <a:endParaRPr lang="en-US" sz="1801"/>
+          </a:p>
+        </p:txBody>
+      </p:sp>
+      <p:sp>
+        <p:nvSpPr>
+          <p:cNvPr id="14" name="Left Brace 13"/>
+          <p:cNvSpPr/>
+          <p:nvPr/>
+        </p:nvSpPr>
+        <p:spPr>
+          <a:xfrm rot="10800000">
+            <a:off x="10695298" y="767428"/>
+            <a:ext cx="112084" cy="59056"/>
           </a:xfrm>
           <a:prstGeom prst="leftBrace">
             <a:avLst>
@@ -3246,20 +3259,142 @@
           <a:lstStyle/>
           <a:p>
             <a:pPr algn="ctr"/>
-            <a:endParaRPr lang="en-US"/>
-          </a:p>
-        </p:txBody>
-      </p:sp>
-      <p:sp>
-        <p:nvSpPr>
-          <p:cNvPr id="14" name="Left Brace 13"/>
+            <a:endParaRPr lang="en-US" sz="1801"/>
+          </a:p>
+        </p:txBody>
+      </p:sp>
+      <p:sp>
+        <p:nvSpPr>
+          <p:cNvPr id="18" name="TextBox 17"/>
+          <p:cNvSpPr txBox="1"/>
+          <p:nvPr/>
+        </p:nvSpPr>
+        <p:spPr>
+          <a:xfrm>
+            <a:off x="10862321" y="463667"/>
+            <a:ext cx="2025359" cy="369460"/>
+          </a:xfrm>
+          <a:prstGeom prst="rect">
+            <a:avLst/>
+          </a:prstGeom>
+          <a:noFill/>
+        </p:spPr>
+        <p:txBody>
+          <a:bodyPr wrap="square" rtlCol="0">
+            <a:spAutoFit/>
+          </a:bodyPr>
+          <a:lstStyle/>
+          <a:p>
+            <a:r>
+              <a:rPr lang="en-US" sz="1801" dirty="0" err="1">
+                <a:solidFill>
+                  <a:srgbClr val="7030A0"/>
+                </a:solidFill>
+              </a:rPr>
+              <a:t>margin_legend_t</a:t>
+            </a:r>
+            <a:endParaRPr lang="en-US" sz="1801" dirty="0">
+              <a:solidFill>
+                <a:srgbClr val="7030A0"/>
+              </a:solidFill>
+            </a:endParaRPr>
+          </a:p>
+        </p:txBody>
+      </p:sp>
+      <p:sp>
+        <p:nvSpPr>
+          <p:cNvPr id="19" name="Left Brace 18"/>
           <p:cNvSpPr/>
           <p:nvPr/>
         </p:nvSpPr>
         <p:spPr>
           <a:xfrm rot="10800000">
-            <a:off x="9939635" y="646745"/>
-            <a:ext cx="112084" cy="59055"/>
+            <a:off x="10700360" y="996809"/>
+            <a:ext cx="112084" cy="123818"/>
+          </a:xfrm>
+          <a:prstGeom prst="leftBrace">
+            <a:avLst>
+              <a:gd name="adj1" fmla="val 79717"/>
+              <a:gd name="adj2" fmla="val 50000"/>
+            </a:avLst>
+          </a:prstGeom>
+          <a:ln w="19050">
+            <a:solidFill>
+              <a:schemeClr val="accent6"/>
+            </a:solidFill>
+          </a:ln>
+        </p:spPr>
+        <p:style>
+          <a:lnRef idx="1">
+            <a:schemeClr val="accent1"/>
+          </a:lnRef>
+          <a:fillRef idx="0">
+            <a:schemeClr val="accent1"/>
+          </a:fillRef>
+          <a:effectRef idx="0">
+            <a:schemeClr val="accent1"/>
+          </a:effectRef>
+          <a:fontRef idx="minor">
+            <a:schemeClr val="tx1"/>
+          </a:fontRef>
+        </p:style>
+        <p:txBody>
+          <a:bodyPr rtlCol="0" anchor="ctr"/>
+          <a:lstStyle/>
+          <a:p>
+            <a:pPr algn="ctr"/>
+            <a:endParaRPr lang="en-US" sz="1801"/>
+          </a:p>
+        </p:txBody>
+      </p:sp>
+      <p:sp>
+        <p:nvSpPr>
+          <p:cNvPr id="20" name="TextBox 19"/>
+          <p:cNvSpPr txBox="1"/>
+          <p:nvPr/>
+        </p:nvSpPr>
+        <p:spPr>
+          <a:xfrm>
+            <a:off x="10862319" y="917572"/>
+            <a:ext cx="2025359" cy="369460"/>
+          </a:xfrm>
+          <a:prstGeom prst="rect">
+            <a:avLst/>
+          </a:prstGeom>
+          <a:noFill/>
+        </p:spPr>
+        <p:txBody>
+          <a:bodyPr wrap="square" rtlCol="0">
+            <a:spAutoFit/>
+          </a:bodyPr>
+          <a:lstStyle/>
+          <a:p>
+            <a:r>
+              <a:rPr lang="en-US" sz="1801" dirty="0" err="1">
+                <a:solidFill>
+                  <a:schemeClr val="accent6"/>
+                </a:solidFill>
+              </a:rPr>
+              <a:t>margin_legend_b</a:t>
+            </a:r>
+            <a:endParaRPr lang="en-US" sz="1801" dirty="0">
+              <a:solidFill>
+                <a:schemeClr val="accent6"/>
+              </a:solidFill>
+            </a:endParaRPr>
+          </a:p>
+        </p:txBody>
+      </p:sp>
+      <p:sp>
+        <p:nvSpPr>
+          <p:cNvPr id="21" name="Left Brace 20"/>
+          <p:cNvSpPr/>
+          <p:nvPr/>
+        </p:nvSpPr>
+        <p:spPr>
+          <a:xfrm rot="10800000">
+            <a:off x="10677301" y="5683990"/>
+            <a:ext cx="112084" cy="59056"/>
           </a:xfrm>
           <a:prstGeom prst="leftBrace">
             <a:avLst>
@@ -3292,20 +3427,20 @@
           <a:lstStyle/>
           <a:p>
             <a:pPr algn="ctr"/>
-            <a:endParaRPr lang="en-US"/>
-          </a:p>
-        </p:txBody>
-      </p:sp>
-      <p:sp>
-        <p:nvSpPr>
-          <p:cNvPr id="18" name="TextBox 17"/>
+            <a:endParaRPr lang="en-US" sz="1801"/>
+          </a:p>
+        </p:txBody>
+      </p:sp>
+      <p:sp>
+        <p:nvSpPr>
+          <p:cNvPr id="22" name="TextBox 21"/>
           <p:cNvSpPr txBox="1"/>
           <p:nvPr/>
         </p:nvSpPr>
         <p:spPr>
           <a:xfrm>
-            <a:off x="10106650" y="472387"/>
-            <a:ext cx="2025359" cy="646331"/>
+            <a:off x="10862318" y="5499323"/>
+            <a:ext cx="2025359" cy="369460"/>
           </a:xfrm>
           <a:prstGeom prst="rect">
             <a:avLst/>
@@ -3319,46 +3454,31 @@
           <a:lstStyle/>
           <a:p>
             <a:r>
-              <a:rPr lang="en-US" dirty="0" err="1" smtClean="0">
+              <a:rPr lang="en-US" sz="1801" dirty="0" err="1">
                 <a:solidFill>
                   <a:srgbClr val="7030A0"/>
                 </a:solidFill>
               </a:rPr>
-              <a:t>margin_legend_t</a:t>
-            </a:r>
-            <a:endParaRPr lang="en-US" dirty="0" smtClean="0">
+              <a:t>margin_plot_b</a:t>
+            </a:r>
+            <a:endParaRPr lang="en-US" sz="1801" dirty="0">
               <a:solidFill>
                 <a:srgbClr val="7030A0"/>
               </a:solidFill>
             </a:endParaRPr>
           </a:p>
-          <a:p>
-            <a:r>
-              <a:rPr lang="en-US" dirty="0" err="1" smtClean="0">
-                <a:solidFill>
-                  <a:srgbClr val="7030A0"/>
-                </a:solidFill>
-              </a:rPr>
-              <a:t>margin_legend_i</a:t>
-            </a:r>
-            <a:endParaRPr lang="en-US" dirty="0" smtClean="0">
-              <a:solidFill>
-                <a:srgbClr val="7030A0"/>
-              </a:solidFill>
-            </a:endParaRPr>
-          </a:p>
-        </p:txBody>
-      </p:sp>
-      <p:sp>
-        <p:nvSpPr>
-          <p:cNvPr id="19" name="Left Brace 18"/>
+        </p:txBody>
+      </p:sp>
+      <p:sp>
+        <p:nvSpPr>
+          <p:cNvPr id="25" name="Left Brace 24"/>
           <p:cNvSpPr/>
           <p:nvPr/>
         </p:nvSpPr>
         <p:spPr>
-          <a:xfrm rot="10800000">
-            <a:off x="9944695" y="1235707"/>
-            <a:ext cx="112084" cy="123817"/>
+          <a:xfrm rot="10800000" flipH="1">
+            <a:off x="1941701" y="708372"/>
+            <a:ext cx="112084" cy="59056"/>
           </a:xfrm>
           <a:prstGeom prst="leftBrace">
             <a:avLst>
@@ -3391,58 +3511,20 @@
           <a:lstStyle/>
           <a:p>
             <a:pPr algn="ctr"/>
-            <a:endParaRPr lang="en-US"/>
-          </a:p>
-        </p:txBody>
-      </p:sp>
-      <p:sp>
-        <p:nvSpPr>
-          <p:cNvPr id="20" name="TextBox 19"/>
-          <p:cNvSpPr txBox="1"/>
-          <p:nvPr/>
-        </p:nvSpPr>
-        <p:spPr>
-          <a:xfrm>
-            <a:off x="10106649" y="1092630"/>
-            <a:ext cx="2025359" cy="369332"/>
-          </a:xfrm>
-          <a:prstGeom prst="rect">
-            <a:avLst/>
-          </a:prstGeom>
-          <a:noFill/>
-        </p:spPr>
-        <p:txBody>
-          <a:bodyPr wrap="square" rtlCol="0">
-            <a:spAutoFit/>
-          </a:bodyPr>
-          <a:lstStyle/>
-          <a:p>
-            <a:r>
-              <a:rPr lang="en-US" dirty="0" err="1" smtClean="0">
-                <a:solidFill>
-                  <a:srgbClr val="7030A0"/>
-                </a:solidFill>
-              </a:rPr>
-              <a:t>margin_legend_b</a:t>
-            </a:r>
-            <a:endParaRPr lang="en-US" dirty="0">
-              <a:solidFill>
-                <a:srgbClr val="7030A0"/>
-              </a:solidFill>
-            </a:endParaRPr>
-          </a:p>
-        </p:txBody>
-      </p:sp>
-      <p:sp>
-        <p:nvSpPr>
-          <p:cNvPr id="21" name="Left Brace 20"/>
+            <a:endParaRPr lang="en-US" sz="1801"/>
+          </a:p>
+        </p:txBody>
+      </p:sp>
+      <p:sp>
+        <p:nvSpPr>
+          <p:cNvPr id="26" name="Left Brace 25"/>
           <p:cNvSpPr/>
           <p:nvPr/>
         </p:nvSpPr>
         <p:spPr>
-          <a:xfrm rot="10800000">
-            <a:off x="10004686" y="6210683"/>
-            <a:ext cx="112084" cy="59055"/>
+          <a:xfrm rot="10800000" flipH="1">
+            <a:off x="1941701" y="771193"/>
+            <a:ext cx="112084" cy="59056"/>
           </a:xfrm>
           <a:prstGeom prst="leftBrace">
             <a:avLst>
@@ -3475,58 +3557,20 @@
           <a:lstStyle/>
           <a:p>
             <a:pPr algn="ctr"/>
-            <a:endParaRPr lang="en-US"/>
-          </a:p>
-        </p:txBody>
-      </p:sp>
-      <p:sp>
-        <p:nvSpPr>
-          <p:cNvPr id="22" name="TextBox 21"/>
-          <p:cNvSpPr txBox="1"/>
-          <p:nvPr/>
-        </p:nvSpPr>
-        <p:spPr>
-          <a:xfrm>
-            <a:off x="10166641" y="6026017"/>
-            <a:ext cx="2025359" cy="369332"/>
-          </a:xfrm>
-          <a:prstGeom prst="rect">
-            <a:avLst/>
-          </a:prstGeom>
-          <a:noFill/>
-        </p:spPr>
-        <p:txBody>
-          <a:bodyPr wrap="square" rtlCol="0">
-            <a:spAutoFit/>
-          </a:bodyPr>
-          <a:lstStyle/>
-          <a:p>
-            <a:r>
-              <a:rPr lang="en-US" dirty="0" err="1" smtClean="0">
-                <a:solidFill>
-                  <a:srgbClr val="7030A0"/>
-                </a:solidFill>
-              </a:rPr>
-              <a:t>margin_plot_b</a:t>
-            </a:r>
-            <a:endParaRPr lang="en-US" dirty="0" smtClean="0">
-              <a:solidFill>
-                <a:srgbClr val="7030A0"/>
-              </a:solidFill>
-            </a:endParaRPr>
-          </a:p>
-        </p:txBody>
-      </p:sp>
-      <p:sp>
-        <p:nvSpPr>
-          <p:cNvPr id="25" name="Left Brace 24"/>
+            <a:endParaRPr lang="en-US" sz="1801"/>
+          </a:p>
+        </p:txBody>
+      </p:sp>
+      <p:sp>
+        <p:nvSpPr>
+          <p:cNvPr id="27" name="Left Brace 26"/>
           <p:cNvSpPr/>
           <p:nvPr/>
         </p:nvSpPr>
         <p:spPr>
           <a:xfrm rot="10800000" flipH="1">
-            <a:off x="2066205" y="587689"/>
-            <a:ext cx="112084" cy="59055"/>
+            <a:off x="1939454" y="1434132"/>
+            <a:ext cx="112084" cy="59056"/>
           </a:xfrm>
           <a:prstGeom prst="leftBrace">
             <a:avLst>
@@ -3559,20 +3603,20 @@
           <a:lstStyle/>
           <a:p>
             <a:pPr algn="ctr"/>
-            <a:endParaRPr lang="en-US"/>
-          </a:p>
-        </p:txBody>
-      </p:sp>
-      <p:sp>
-        <p:nvSpPr>
-          <p:cNvPr id="26" name="Left Brace 25"/>
+            <a:endParaRPr lang="en-US" sz="1801"/>
+          </a:p>
+        </p:txBody>
+      </p:sp>
+      <p:sp>
+        <p:nvSpPr>
+          <p:cNvPr id="28" name="Left Brace 27"/>
           <p:cNvSpPr/>
           <p:nvPr/>
         </p:nvSpPr>
         <p:spPr>
           <a:xfrm rot="10800000" flipH="1">
-            <a:off x="2066205" y="650510"/>
-            <a:ext cx="112084" cy="59055"/>
+            <a:off x="1914760" y="5695935"/>
+            <a:ext cx="112084" cy="59056"/>
           </a:xfrm>
           <a:prstGeom prst="leftBrace">
             <a:avLst>
@@ -3605,20 +3649,20 @@
           <a:lstStyle/>
           <a:p>
             <a:pPr algn="ctr"/>
-            <a:endParaRPr lang="en-US"/>
-          </a:p>
-        </p:txBody>
-      </p:sp>
-      <p:sp>
-        <p:nvSpPr>
-          <p:cNvPr id="27" name="Left Brace 26"/>
+            <a:endParaRPr lang="en-US" sz="1801"/>
+          </a:p>
+        </p:txBody>
+      </p:sp>
+      <p:sp>
+        <p:nvSpPr>
+          <p:cNvPr id="29" name="Left Brace 28"/>
           <p:cNvSpPr/>
           <p:nvPr/>
         </p:nvSpPr>
         <p:spPr>
-          <a:xfrm rot="10800000" flipH="1">
-            <a:off x="2063956" y="1544885"/>
-            <a:ext cx="112084" cy="59055"/>
+          <a:xfrm rot="5400000" flipH="1">
+            <a:off x="2141513" y="5851399"/>
+            <a:ext cx="112084" cy="59056"/>
           </a:xfrm>
           <a:prstGeom prst="leftBrace">
             <a:avLst>
@@ -3651,99 +3695,7 @@
           <a:lstStyle/>
           <a:p>
             <a:pPr algn="ctr"/>
-            <a:endParaRPr lang="en-US"/>
-          </a:p>
-        </p:txBody>
-      </p:sp>
-      <p:sp>
-        <p:nvSpPr>
-          <p:cNvPr id="28" name="Left Brace 27"/>
-          <p:cNvSpPr/>
-          <p:nvPr/>
-        </p:nvSpPr>
-        <p:spPr>
-          <a:xfrm rot="10800000" flipH="1">
-            <a:off x="2039263" y="6219661"/>
-            <a:ext cx="112084" cy="59055"/>
-          </a:xfrm>
-          <a:prstGeom prst="leftBrace">
-            <a:avLst>
-              <a:gd name="adj1" fmla="val 79717"/>
-              <a:gd name="adj2" fmla="val 50000"/>
-            </a:avLst>
-          </a:prstGeom>
-          <a:ln w="19050">
-            <a:solidFill>
-              <a:srgbClr val="7030A0"/>
-            </a:solidFill>
-          </a:ln>
-        </p:spPr>
-        <p:style>
-          <a:lnRef idx="1">
-            <a:schemeClr val="accent1"/>
-          </a:lnRef>
-          <a:fillRef idx="0">
-            <a:schemeClr val="accent1"/>
-          </a:fillRef>
-          <a:effectRef idx="0">
-            <a:schemeClr val="accent1"/>
-          </a:effectRef>
-          <a:fontRef idx="minor">
-            <a:schemeClr val="tx1"/>
-          </a:fontRef>
-        </p:style>
-        <p:txBody>
-          <a:bodyPr rtlCol="0" anchor="ctr"/>
-          <a:lstStyle/>
-          <a:p>
-            <a:pPr algn="ctr"/>
-            <a:endParaRPr lang="en-US"/>
-          </a:p>
-        </p:txBody>
-      </p:sp>
-      <p:sp>
-        <p:nvSpPr>
-          <p:cNvPr id="29" name="Left Brace 28"/>
-          <p:cNvSpPr/>
-          <p:nvPr/>
-        </p:nvSpPr>
-        <p:spPr>
-          <a:xfrm rot="5400000" flipH="1">
-            <a:off x="2266016" y="6343486"/>
-            <a:ext cx="112084" cy="59055"/>
-          </a:xfrm>
-          <a:prstGeom prst="leftBrace">
-            <a:avLst>
-              <a:gd name="adj1" fmla="val 79717"/>
-              <a:gd name="adj2" fmla="val 50000"/>
-            </a:avLst>
-          </a:prstGeom>
-          <a:ln w="19050">
-            <a:solidFill>
-              <a:srgbClr val="7030A0"/>
-            </a:solidFill>
-          </a:ln>
-        </p:spPr>
-        <p:style>
-          <a:lnRef idx="1">
-            <a:schemeClr val="accent1"/>
-          </a:lnRef>
-          <a:fillRef idx="0">
-            <a:schemeClr val="accent1"/>
-          </a:fillRef>
-          <a:effectRef idx="0">
-            <a:schemeClr val="accent1"/>
-          </a:effectRef>
-          <a:fontRef idx="minor">
-            <a:schemeClr val="tx1"/>
-          </a:fontRef>
-        </p:style>
-        <p:txBody>
-          <a:bodyPr rtlCol="0" anchor="ctr"/>
-          <a:lstStyle/>
-          <a:p>
-            <a:pPr algn="ctr"/>
-            <a:endParaRPr lang="en-US"/>
+            <a:endParaRPr lang="en-US" sz="1801"/>
           </a:p>
         </p:txBody>
       </p:sp>
@@ -3755,7 +3707,7 @@
         </p:nvSpPr>
         <p:spPr>
           <a:xfrm rot="5400000" flipH="1">
-            <a:off x="4540904" y="6311508"/>
+            <a:off x="4174760" y="5819427"/>
             <a:ext cx="112084" cy="123009"/>
           </a:xfrm>
           <a:prstGeom prst="leftBrace">
@@ -3789,7 +3741,7 @@
           <a:lstStyle/>
           <a:p>
             <a:pPr algn="ctr"/>
-            <a:endParaRPr lang="en-US"/>
+            <a:endParaRPr lang="en-US" sz="1801"/>
           </a:p>
         </p:txBody>
       </p:sp>
@@ -3801,8 +3753,8 @@
         </p:nvSpPr>
         <p:spPr>
           <a:xfrm rot="5400000" flipH="1">
-            <a:off x="9706132" y="6244426"/>
-            <a:ext cx="112084" cy="257178"/>
+            <a:off x="10547950" y="5807616"/>
+            <a:ext cx="112084" cy="146620"/>
           </a:xfrm>
           <a:prstGeom prst="leftBrace">
             <a:avLst>
@@ -3835,7 +3787,7 @@
           <a:lstStyle/>
           <a:p>
             <a:pPr algn="ctr"/>
-            <a:endParaRPr lang="en-US"/>
+            <a:endParaRPr lang="en-US" sz="1801"/>
           </a:p>
         </p:txBody>
       </p:sp>
@@ -3847,8 +3799,8 @@
         </p:nvSpPr>
         <p:spPr>
           <a:xfrm>
-            <a:off x="13380" y="292340"/>
-            <a:ext cx="2025359" cy="646331"/>
+            <a:off x="-111119" y="413023"/>
+            <a:ext cx="2025359" cy="646587"/>
           </a:xfrm>
           <a:prstGeom prst="rect">
             <a:avLst/>
@@ -3863,14 +3815,14 @@
           <a:p>
             <a:pPr algn="r"/>
             <a:r>
-              <a:rPr lang="en-US" dirty="0" err="1" smtClean="0">
+              <a:rPr lang="en-US" sz="1801" dirty="0" err="1">
                 <a:solidFill>
                   <a:srgbClr val="7030A0"/>
                 </a:solidFill>
               </a:rPr>
               <a:t>margin_topline_t</a:t>
             </a:r>
-            <a:endParaRPr lang="en-US" dirty="0" smtClean="0">
+            <a:endParaRPr lang="en-US" sz="1801" dirty="0">
               <a:solidFill>
                 <a:srgbClr val="7030A0"/>
               </a:solidFill>
@@ -3879,14 +3831,14 @@
           <a:p>
             <a:pPr algn="r"/>
             <a:r>
-              <a:rPr lang="en-US" dirty="0" err="1" smtClean="0">
+              <a:rPr lang="en-US" sz="1801" dirty="0" err="1">
                 <a:solidFill>
                   <a:srgbClr val="7030A0"/>
                 </a:solidFill>
               </a:rPr>
               <a:t>margin_title_t</a:t>
             </a:r>
-            <a:endParaRPr lang="en-US" dirty="0" smtClean="0">
+            <a:endParaRPr lang="en-US" sz="1801" dirty="0">
               <a:solidFill>
                 <a:srgbClr val="7030A0"/>
               </a:solidFill>
@@ -3902,8 +3854,8 @@
         </p:nvSpPr>
         <p:spPr>
           <a:xfrm>
-            <a:off x="13380" y="1392278"/>
-            <a:ext cx="2025359" cy="369332"/>
+            <a:off x="-111119" y="1278993"/>
+            <a:ext cx="2025359" cy="369460"/>
           </a:xfrm>
           <a:prstGeom prst="rect">
             <a:avLst/>
@@ -3918,22 +3870,14 @@
           <a:p>
             <a:pPr algn="r"/>
             <a:r>
-              <a:rPr lang="en-US" dirty="0" err="1">
+              <a:rPr lang="en-US" sz="1801" dirty="0" err="1">
                 <a:solidFill>
                   <a:srgbClr val="7030A0"/>
                 </a:solidFill>
               </a:rPr>
-              <a:t>m</a:t>
-            </a:r>
-            <a:r>
-              <a:rPr lang="en-US" dirty="0" err="1" smtClean="0">
-                <a:solidFill>
-                  <a:srgbClr val="7030A0"/>
-                </a:solidFill>
-              </a:rPr>
-              <a:t>argin_title_b</a:t>
-            </a:r>
-            <a:endParaRPr lang="en-US" dirty="0" smtClean="0">
+              <a:t>margin_title_b</a:t>
+            </a:r>
+            <a:endParaRPr lang="en-US" sz="1801" dirty="0">
               <a:solidFill>
                 <a:srgbClr val="7030A0"/>
               </a:solidFill>
@@ -3949,8 +3893,8 @@
         </p:nvSpPr>
         <p:spPr>
           <a:xfrm>
-            <a:off x="-15196" y="6055545"/>
-            <a:ext cx="2025359" cy="369332"/>
+            <a:off x="-139696" y="5531817"/>
+            <a:ext cx="2025359" cy="369460"/>
           </a:xfrm>
           <a:prstGeom prst="rect">
             <a:avLst/>
@@ -3965,14 +3909,14 @@
           <a:p>
             <a:pPr algn="r"/>
             <a:r>
-              <a:rPr lang="en-US" dirty="0" err="1" smtClean="0">
+              <a:rPr lang="en-US" sz="1801" dirty="0" err="1">
                 <a:solidFill>
                   <a:srgbClr val="7030A0"/>
                 </a:solidFill>
               </a:rPr>
               <a:t>margin_caption_b</a:t>
             </a:r>
-            <a:endParaRPr lang="en-US" dirty="0" smtClean="0">
+            <a:endParaRPr lang="en-US" sz="1801" dirty="0">
               <a:solidFill>
                 <a:srgbClr val="7030A0"/>
               </a:solidFill>
@@ -3988,8 +3932,8 @@
         </p:nvSpPr>
         <p:spPr>
           <a:xfrm>
-            <a:off x="1524000" y="6471570"/>
-            <a:ext cx="10608008" cy="369332"/>
+            <a:off x="1399496" y="5979481"/>
+            <a:ext cx="10608008" cy="369460"/>
           </a:xfrm>
           <a:prstGeom prst="rect">
             <a:avLst/>
@@ -4003,7 +3947,7 @@
           <a:lstStyle/>
           <a:p>
             <a:r>
-              <a:rPr lang="en-US" dirty="0" err="1" smtClean="0">
+              <a:rPr lang="en-US" sz="1801" dirty="0" err="1">
                 <a:solidFill>
                   <a:srgbClr val="7030A0"/>
                 </a:solidFill>
@@ -4011,15 +3955,15 @@
               <a:t>margin_title_l</a:t>
             </a:r>
             <a:r>
-              <a:rPr lang="en-US" dirty="0" smtClean="0">
+              <a:rPr lang="en-US" sz="1801" dirty="0">
                 <a:solidFill>
                   <a:srgbClr val="7030A0"/>
                 </a:solidFill>
               </a:rPr>
-              <a:t>                  </a:t>
-            </a:r>
-            <a:r>
-              <a:rPr lang="en-US" dirty="0" err="1" smtClean="0">
+              <a:t>              </a:t>
+            </a:r>
+            <a:r>
+              <a:rPr lang="en-US" sz="1801" dirty="0" err="1">
                 <a:solidFill>
                   <a:srgbClr val="7030A0"/>
                 </a:solidFill>
@@ -4027,46 +3971,40 @@
               <a:t>margin_title_r</a:t>
             </a:r>
             <a:r>
-              <a:rPr lang="en-US" dirty="0" smtClean="0">
+              <a:rPr lang="en-US" sz="1801" dirty="0">
                 <a:solidFill>
                   <a:srgbClr val="7030A0"/>
                 </a:solidFill>
               </a:rPr>
-              <a:t>                                                       </a:t>
-            </a:r>
-            <a:r>
-              <a:rPr lang="en-US" dirty="0" smtClean="0">
+              <a:t>                                                                               </a:t>
+            </a:r>
+            <a:r>
+              <a:rPr lang="en-US" sz="1801" dirty="0" err="1">
+                <a:solidFill>
+                  <a:schemeClr val="accent4">
+                    <a:lumMod val="75000"/>
+                  </a:schemeClr>
+                </a:solidFill>
+              </a:rPr>
+              <a:t>margin_panel_r</a:t>
+            </a:r>
+            <a:r>
+              <a:rPr lang="en-US" sz="1801" dirty="0">
                 <a:solidFill>
                   <a:srgbClr val="7030A0"/>
                 </a:solidFill>
               </a:rPr>
-              <a:t> </a:t>
-            </a:r>
-            <a:r>
-              <a:rPr lang="en-US" dirty="0" err="1" smtClean="0">
-                <a:solidFill>
-                  <a:srgbClr val="7030A0"/>
-                </a:solidFill>
-              </a:rPr>
-              <a:t>margin_panel_r</a:t>
-            </a:r>
-            <a:r>
-              <a:rPr lang="en-US" dirty="0" smtClean="0">
-                <a:solidFill>
-                  <a:srgbClr val="7030A0"/>
-                </a:solidFill>
-              </a:rPr>
-              <a:t>   </a:t>
-            </a:r>
-            <a:r>
-              <a:rPr lang="en-US" dirty="0" err="1" smtClean="0">
+              <a:t>  </a:t>
+            </a:r>
+            <a:r>
+              <a:rPr lang="en-US" sz="1801" dirty="0" err="1">
                 <a:solidFill>
                   <a:srgbClr val="7030A0"/>
                 </a:solidFill>
               </a:rPr>
               <a:t>margin_plot_r</a:t>
             </a:r>
-            <a:endParaRPr lang="en-US" dirty="0" smtClean="0">
+            <a:endParaRPr lang="en-US" sz="1801" dirty="0">
               <a:solidFill>
                 <a:srgbClr val="7030A0"/>
               </a:solidFill>
@@ -4076,59 +4014,13 @@
       </p:sp>
       <p:sp>
         <p:nvSpPr>
-          <p:cNvPr id="37" name="Left Brace 36"/>
-          <p:cNvSpPr/>
-          <p:nvPr/>
-        </p:nvSpPr>
-        <p:spPr>
-          <a:xfrm rot="16200000" flipH="1">
-            <a:off x="4655972" y="363484"/>
-            <a:ext cx="95677" cy="105955"/>
-          </a:xfrm>
-          <a:prstGeom prst="leftBrace">
-            <a:avLst>
-              <a:gd name="adj1" fmla="val 79717"/>
-              <a:gd name="adj2" fmla="val 50000"/>
-            </a:avLst>
-          </a:prstGeom>
-          <a:ln w="19050">
-            <a:solidFill>
-              <a:srgbClr val="7030A0"/>
-            </a:solidFill>
-          </a:ln>
-        </p:spPr>
-        <p:style>
-          <a:lnRef idx="1">
-            <a:schemeClr val="accent1"/>
-          </a:lnRef>
-          <a:fillRef idx="0">
-            <a:schemeClr val="accent1"/>
-          </a:fillRef>
-          <a:effectRef idx="0">
-            <a:schemeClr val="accent1"/>
-          </a:effectRef>
-          <a:fontRef idx="minor">
-            <a:schemeClr val="tx1"/>
-          </a:fontRef>
-        </p:style>
-        <p:txBody>
-          <a:bodyPr rtlCol="0" anchor="ctr"/>
-          <a:lstStyle/>
-          <a:p>
-            <a:pPr algn="ctr"/>
-            <a:endParaRPr lang="en-US"/>
-          </a:p>
-        </p:txBody>
-      </p:sp>
-      <p:sp>
-        <p:nvSpPr>
           <p:cNvPr id="5" name="Left Brace 4"/>
           <p:cNvSpPr/>
           <p:nvPr/>
         </p:nvSpPr>
         <p:spPr>
           <a:xfrm rot="5400000">
-            <a:off x="3416230" y="-771485"/>
+            <a:off x="3291726" y="-650806"/>
             <a:ext cx="112084" cy="2359481"/>
           </a:xfrm>
           <a:prstGeom prst="leftBrace">
@@ -4158,54 +4050,7 @@
           <a:lstStyle/>
           <a:p>
             <a:pPr algn="ctr"/>
-            <a:endParaRPr lang="en-US"/>
-          </a:p>
-        </p:txBody>
-      </p:sp>
-      <p:sp>
-        <p:nvSpPr>
-          <p:cNvPr id="38" name="TextBox 37"/>
-          <p:cNvSpPr txBox="1"/>
-          <p:nvPr/>
-        </p:nvSpPr>
-        <p:spPr>
-          <a:xfrm>
-            <a:off x="3510136" y="-17119"/>
-            <a:ext cx="2025359" cy="369332"/>
-          </a:xfrm>
-          <a:prstGeom prst="rect">
-            <a:avLst/>
-          </a:prstGeom>
-          <a:noFill/>
-        </p:spPr>
-        <p:txBody>
-          <a:bodyPr wrap="square" rtlCol="0">
-            <a:spAutoFit/>
-          </a:bodyPr>
-          <a:lstStyle/>
-          <a:p>
-            <a:pPr algn="r"/>
-            <a:r>
-              <a:rPr lang="en-US" dirty="0" err="1">
-                <a:solidFill>
-                  <a:srgbClr val="7030A0"/>
-                </a:solidFill>
-              </a:rPr>
-              <a:t>l</a:t>
-            </a:r>
-            <a:r>
-              <a:rPr lang="en-US" dirty="0" err="1" smtClean="0">
-                <a:solidFill>
-                  <a:srgbClr val="7030A0"/>
-                </a:solidFill>
-              </a:rPr>
-              <a:t>egend_bump</a:t>
-            </a:r>
-            <a:endParaRPr lang="en-US" dirty="0" smtClean="0">
-              <a:solidFill>
-                <a:srgbClr val="7030A0"/>
-              </a:solidFill>
-            </a:endParaRPr>
+            <a:endParaRPr lang="en-US" sz="1801"/>
           </a:p>
         </p:txBody>
       </p:sp>
@@ -4217,7 +4062,7 @@
         </p:nvSpPr>
         <p:spPr>
           <a:xfrm rot="5400000" flipH="1">
-            <a:off x="9522625" y="6318094"/>
+            <a:off x="10410173" y="5826004"/>
             <a:ext cx="112084" cy="109836"/>
           </a:xfrm>
           <a:prstGeom prst="leftBrace">
@@ -4228,7 +4073,9 @@
           </a:prstGeom>
           <a:ln w="19050">
             <a:solidFill>
-              <a:srgbClr val="7030A0"/>
+              <a:schemeClr val="accent4">
+                <a:lumMod val="75000"/>
+              </a:schemeClr>
             </a:solidFill>
           </a:ln>
         </p:spPr>
@@ -4251,7 +4098,955 @@
           <a:lstStyle/>
           <a:p>
             <a:pPr algn="ctr"/>
-            <a:endParaRPr lang="en-US"/>
+            <a:endParaRPr lang="en-US" sz="1801"/>
+          </a:p>
+        </p:txBody>
+      </p:sp>
+      <p:graphicFrame>
+        <p:nvGraphicFramePr>
+          <p:cNvPr id="2" name="Table 1"/>
+          <p:cNvGraphicFramePr>
+            <a:graphicFrameLocks noGrp="1"/>
+          </p:cNvGraphicFramePr>
+          <p:nvPr>
+            <p:extLst>
+              <p:ext uri="{D42A27DB-BD31-4B8C-83A1-F6EECF244321}">
+                <p14:modId xmlns:p14="http://schemas.microsoft.com/office/powerpoint/2010/main" val="1577209038"/>
+              </p:ext>
+            </p:extLst>
+          </p:nvPr>
+        </p:nvGraphicFramePr>
+        <p:xfrm>
+          <a:off x="1617376" y="6630541"/>
+          <a:ext cx="9599480" cy="1341124"/>
+        </p:xfrm>
+        <a:graphic>
+          <a:graphicData uri="http://schemas.openxmlformats.org/drawingml/2006/table">
+            <a:tbl>
+              <a:tblPr firstRow="1">
+                <a:tableStyleId>{9D7B26C5-4107-4FEC-AEDC-1716B250A1EF}</a:tableStyleId>
+              </a:tblPr>
+              <a:tblGrid>
+                <a:gridCol w="1919896">
+                  <a:extLst>
+                    <a:ext uri="{9D8B030D-6E8A-4147-A177-3AD203B41FA5}">
+                      <a16:colId xmlns:a16="http://schemas.microsoft.com/office/drawing/2014/main" val="1726367728"/>
+                    </a:ext>
+                  </a:extLst>
+                </a:gridCol>
+                <a:gridCol w="1919896">
+                  <a:extLst>
+                    <a:ext uri="{9D8B030D-6E8A-4147-A177-3AD203B41FA5}">
+                      <a16:colId xmlns:a16="http://schemas.microsoft.com/office/drawing/2014/main" val="2547402049"/>
+                    </a:ext>
+                  </a:extLst>
+                </a:gridCol>
+                <a:gridCol w="1919896">
+                  <a:extLst>
+                    <a:ext uri="{9D8B030D-6E8A-4147-A177-3AD203B41FA5}">
+                      <a16:colId xmlns:a16="http://schemas.microsoft.com/office/drawing/2014/main" val="3673652927"/>
+                    </a:ext>
+                  </a:extLst>
+                </a:gridCol>
+                <a:gridCol w="1919896">
+                  <a:extLst>
+                    <a:ext uri="{9D8B030D-6E8A-4147-A177-3AD203B41FA5}">
+                      <a16:colId xmlns:a16="http://schemas.microsoft.com/office/drawing/2014/main" val="2865016860"/>
+                    </a:ext>
+                  </a:extLst>
+                </a:gridCol>
+                <a:gridCol w="1919896">
+                  <a:extLst>
+                    <a:ext uri="{9D8B030D-6E8A-4147-A177-3AD203B41FA5}">
+                      <a16:colId xmlns:a16="http://schemas.microsoft.com/office/drawing/2014/main" val="1345919768"/>
+                    </a:ext>
+                  </a:extLst>
+                </a:gridCol>
+              </a:tblGrid>
+              <a:tr h="335281">
+                <a:tc gridSpan="5">
+                  <a:txBody>
+                    <a:bodyPr/>
+                    <a:lstStyle/>
+                    <a:p>
+                      <a:pPr algn="ctr"/>
+                      <a:r>
+                        <a:rPr lang="en-US" sz="1600" dirty="0"/>
+                        <a:t>Legend</a:t>
+                      </a:r>
+                    </a:p>
+                  </a:txBody>
+                  <a:tcPr anchor="ctr">
+                    <a:lnL w="12700" cap="flat" cmpd="sng" algn="ctr">
+                      <a:solidFill>
+                        <a:schemeClr val="tx1"/>
+                      </a:solidFill>
+                      <a:prstDash val="solid"/>
+                      <a:round/>
+                      <a:headEnd type="none" w="med" len="med"/>
+                      <a:tailEnd type="none" w="med" len="med"/>
+                    </a:lnL>
+                    <a:lnR w="12700" cap="flat" cmpd="sng" algn="ctr">
+                      <a:solidFill>
+                        <a:schemeClr val="tx1"/>
+                      </a:solidFill>
+                      <a:prstDash val="solid"/>
+                      <a:round/>
+                      <a:headEnd type="none" w="med" len="med"/>
+                      <a:tailEnd type="none" w="med" len="med"/>
+                    </a:lnR>
+                    <a:lnT w="12700" cap="flat" cmpd="sng" algn="ctr">
+                      <a:solidFill>
+                        <a:schemeClr val="tx1"/>
+                      </a:solidFill>
+                      <a:prstDash val="solid"/>
+                      <a:round/>
+                      <a:headEnd type="none" w="med" len="med"/>
+                      <a:tailEnd type="none" w="med" len="med"/>
+                    </a:lnT>
+                  </a:tcPr>
+                </a:tc>
+                <a:tc hMerge="1">
+                  <a:txBody>
+                    <a:bodyPr/>
+                    <a:lstStyle/>
+                    <a:p>
+                      <a:pPr algn="ctr"/>
+                      <a:endParaRPr lang="en-US" sz="1600" dirty="0">
+                        <a:solidFill>
+                          <a:schemeClr val="accent1"/>
+                        </a:solidFill>
+                      </a:endParaRPr>
+                    </a:p>
+                  </a:txBody>
+                  <a:tcPr anchor="ctr"/>
+                </a:tc>
+                <a:tc hMerge="1">
+                  <a:txBody>
+                    <a:bodyPr/>
+                    <a:lstStyle/>
+                    <a:p>
+                      <a:pPr algn="ctr"/>
+                      <a:endParaRPr lang="en-US" sz="1600" dirty="0">
+                        <a:solidFill>
+                          <a:srgbClr val="7030A0"/>
+                        </a:solidFill>
+                      </a:endParaRPr>
+                    </a:p>
+                  </a:txBody>
+                  <a:tcPr anchor="ctr"/>
+                </a:tc>
+                <a:tc hMerge="1">
+                  <a:txBody>
+                    <a:bodyPr/>
+                    <a:lstStyle/>
+                    <a:p>
+                      <a:pPr algn="ctr"/>
+                      <a:endParaRPr lang="en-US" sz="1600" dirty="0">
+                        <a:solidFill>
+                          <a:schemeClr val="accent6"/>
+                        </a:solidFill>
+                      </a:endParaRPr>
+                    </a:p>
+                  </a:txBody>
+                  <a:tcPr anchor="ctr"/>
+                </a:tc>
+                <a:tc hMerge="1">
+                  <a:txBody>
+                    <a:bodyPr/>
+                    <a:lstStyle/>
+                    <a:p>
+                      <a:pPr algn="ctr"/>
+                      <a:endParaRPr lang="en-US" sz="1600" dirty="0">
+                        <a:solidFill>
+                          <a:schemeClr val="accent4">
+                            <a:lumMod val="75000"/>
+                          </a:schemeClr>
+                        </a:solidFill>
+                      </a:endParaRPr>
+                    </a:p>
+                  </a:txBody>
+                  <a:tcPr anchor="ctr"/>
+                </a:tc>
+                <a:extLst>
+                  <a:ext uri="{0D108BD9-81ED-4DB2-BD59-A6C34878D82A}">
+                    <a16:rowId xmlns:a16="http://schemas.microsoft.com/office/drawing/2014/main" val="3253321914"/>
+                  </a:ext>
+                </a:extLst>
+              </a:tr>
+              <a:tr h="335281">
+                <a:tc>
+                  <a:txBody>
+                    <a:bodyPr/>
+                    <a:lstStyle/>
+                    <a:p>
+                      <a:pPr algn="r"/>
+                      <a:r>
+                        <a:rPr lang="en-US" sz="1600" dirty="0"/>
+                        <a:t>Where to </a:t>
+                      </a:r>
+                      <a:r>
+                        <a:rPr lang="en-US" sz="1600" dirty="0" smtClean="0"/>
+                        <a:t>set:</a:t>
+                      </a:r>
+                      <a:endParaRPr lang="en-US" sz="1600" dirty="0"/>
+                    </a:p>
+                  </a:txBody>
+                  <a:tcPr anchor="ctr">
+                    <a:lnL w="12700" cap="flat" cmpd="sng" algn="ctr">
+                      <a:solidFill>
+                        <a:schemeClr val="tx1"/>
+                      </a:solidFill>
+                      <a:prstDash val="solid"/>
+                      <a:round/>
+                      <a:headEnd type="none" w="med" len="med"/>
+                      <a:tailEnd type="none" w="med" len="med"/>
+                    </a:lnL>
+                    <a:lnB w="12700" cap="flat" cmpd="sng" algn="ctr">
+                      <a:solidFill>
+                        <a:schemeClr val="tx1"/>
+                      </a:solidFill>
+                      <a:prstDash val="dot"/>
+                      <a:round/>
+                      <a:headEnd type="none" w="med" len="med"/>
+                      <a:tailEnd type="none" w="med" len="med"/>
+                    </a:lnB>
+                  </a:tcPr>
+                </a:tc>
+                <a:tc>
+                  <a:txBody>
+                    <a:bodyPr/>
+                    <a:lstStyle/>
+                    <a:p>
+                      <a:pPr algn="ctr"/>
+                      <a:r>
+                        <a:rPr lang="en-US" sz="1600" dirty="0" err="1">
+                          <a:solidFill>
+                            <a:schemeClr val="accent1"/>
+                          </a:solidFill>
+                        </a:rPr>
+                        <a:t>Finalize_plot</a:t>
+                      </a:r>
+                      <a:r>
+                        <a:rPr lang="en-US" sz="1600" dirty="0">
+                          <a:solidFill>
+                            <a:schemeClr val="accent1"/>
+                          </a:solidFill>
+                        </a:rPr>
+                        <a:t>()</a:t>
+                      </a:r>
+                    </a:p>
+                  </a:txBody>
+                  <a:tcPr anchor="ctr">
+                    <a:lnB w="12700" cap="flat" cmpd="sng" algn="ctr">
+                      <a:solidFill>
+                        <a:schemeClr val="tx1"/>
+                      </a:solidFill>
+                      <a:prstDash val="dot"/>
+                      <a:round/>
+                      <a:headEnd type="none" w="med" len="med"/>
+                      <a:tailEnd type="none" w="med" len="med"/>
+                    </a:lnB>
+                  </a:tcPr>
+                </a:tc>
+                <a:tc>
+                  <a:txBody>
+                    <a:bodyPr/>
+                    <a:lstStyle/>
+                    <a:p>
+                      <a:pPr algn="ctr"/>
+                      <a:r>
+                        <a:rPr lang="en-US" sz="1600" dirty="0" err="1">
+                          <a:solidFill>
+                            <a:srgbClr val="7030A0"/>
+                          </a:solidFill>
+                        </a:rPr>
+                        <a:t>Finalize_plot</a:t>
+                      </a:r>
+                      <a:r>
+                        <a:rPr lang="en-US" sz="1600" dirty="0">
+                          <a:solidFill>
+                            <a:srgbClr val="7030A0"/>
+                          </a:solidFill>
+                        </a:rPr>
+                        <a:t>()</a:t>
+                      </a:r>
+                    </a:p>
+                  </a:txBody>
+                  <a:tcPr anchor="ctr">
+                    <a:lnB w="12700" cap="flat" cmpd="sng" algn="ctr">
+                      <a:solidFill>
+                        <a:schemeClr val="tx1"/>
+                      </a:solidFill>
+                      <a:prstDash val="dot"/>
+                      <a:round/>
+                      <a:headEnd type="none" w="med" len="med"/>
+                      <a:tailEnd type="none" w="med" len="med"/>
+                    </a:lnB>
+                  </a:tcPr>
+                </a:tc>
+                <a:tc>
+                  <a:txBody>
+                    <a:bodyPr/>
+                    <a:lstStyle/>
+                    <a:p>
+                      <a:pPr algn="ctr"/>
+                      <a:r>
+                        <a:rPr lang="en-US" sz="1600" dirty="0">
+                          <a:solidFill>
+                            <a:schemeClr val="accent6"/>
+                          </a:solidFill>
+                        </a:rPr>
+                        <a:t>Either function</a:t>
+                      </a:r>
+                    </a:p>
+                  </a:txBody>
+                  <a:tcPr anchor="ctr">
+                    <a:lnB w="12700" cap="flat" cmpd="sng" algn="ctr">
+                      <a:solidFill>
+                        <a:schemeClr val="tx1"/>
+                      </a:solidFill>
+                      <a:prstDash val="dot"/>
+                      <a:round/>
+                      <a:headEnd type="none" w="med" len="med"/>
+                      <a:tailEnd type="none" w="med" len="med"/>
+                    </a:lnB>
+                  </a:tcPr>
+                </a:tc>
+                <a:tc>
+                  <a:txBody>
+                    <a:bodyPr/>
+                    <a:lstStyle/>
+                    <a:p>
+                      <a:pPr algn="ctr"/>
+                      <a:r>
+                        <a:rPr lang="en-US" sz="1600" dirty="0" err="1">
+                          <a:solidFill>
+                            <a:schemeClr val="accent4">
+                              <a:lumMod val="75000"/>
+                            </a:schemeClr>
+                          </a:solidFill>
+                        </a:rPr>
+                        <a:t>Theme_cmap</a:t>
+                      </a:r>
+                      <a:r>
+                        <a:rPr lang="en-US" sz="1600" dirty="0">
+                          <a:solidFill>
+                            <a:schemeClr val="accent4">
+                              <a:lumMod val="75000"/>
+                            </a:schemeClr>
+                          </a:solidFill>
+                        </a:rPr>
+                        <a:t>()</a:t>
+                      </a:r>
+                    </a:p>
+                  </a:txBody>
+                  <a:tcPr anchor="ctr">
+                    <a:lnR w="12700" cap="flat" cmpd="sng" algn="ctr">
+                      <a:solidFill>
+                        <a:schemeClr val="tx1"/>
+                      </a:solidFill>
+                      <a:prstDash val="solid"/>
+                      <a:round/>
+                      <a:headEnd type="none" w="med" len="med"/>
+                      <a:tailEnd type="none" w="med" len="med"/>
+                    </a:lnR>
+                    <a:lnB w="12700" cap="flat" cmpd="sng" algn="ctr">
+                      <a:solidFill>
+                        <a:schemeClr val="tx1"/>
+                      </a:solidFill>
+                      <a:prstDash val="dot"/>
+                      <a:round/>
+                      <a:headEnd type="none" w="med" len="med"/>
+                      <a:tailEnd type="none" w="med" len="med"/>
+                    </a:lnB>
+                  </a:tcPr>
+                </a:tc>
+                <a:extLst>
+                  <a:ext uri="{0D108BD9-81ED-4DB2-BD59-A6C34878D82A}">
+                    <a16:rowId xmlns:a16="http://schemas.microsoft.com/office/drawing/2014/main" val="227351936"/>
+                  </a:ext>
+                </a:extLst>
+              </a:tr>
+              <a:tr h="335281">
+                <a:tc>
+                  <a:txBody>
+                    <a:bodyPr/>
+                    <a:lstStyle/>
+                    <a:p>
+                      <a:pPr algn="r"/>
+                      <a:r>
+                        <a:rPr lang="en-US" sz="1600" dirty="0" smtClean="0"/>
+                        <a:t>How to set:</a:t>
+                      </a:r>
+                      <a:endParaRPr lang="en-US" sz="1600" dirty="0"/>
+                    </a:p>
+                  </a:txBody>
+                  <a:tcPr anchor="ctr">
+                    <a:lnL w="12700" cap="flat" cmpd="sng" algn="ctr">
+                      <a:solidFill>
+                        <a:schemeClr val="tx1"/>
+                      </a:solidFill>
+                      <a:prstDash val="solid"/>
+                      <a:round/>
+                      <a:headEnd type="none" w="med" len="med"/>
+                      <a:tailEnd type="none" w="med" len="med"/>
+                    </a:lnL>
+                    <a:lnT w="12700" cap="flat" cmpd="sng" algn="ctr">
+                      <a:solidFill>
+                        <a:schemeClr val="tx1"/>
+                      </a:solidFill>
+                      <a:prstDash val="dot"/>
+                      <a:round/>
+                      <a:headEnd type="none" w="med" len="med"/>
+                      <a:tailEnd type="none" w="med" len="med"/>
+                    </a:lnT>
+                    <a:lnB w="12700" cap="flat" cmpd="sng" algn="ctr">
+                      <a:solidFill>
+                        <a:schemeClr val="tx1"/>
+                      </a:solidFill>
+                      <a:prstDash val="dot"/>
+                      <a:round/>
+                      <a:headEnd type="none" w="med" len="med"/>
+                      <a:tailEnd type="none" w="med" len="med"/>
+                    </a:lnB>
+                  </a:tcPr>
+                </a:tc>
+                <a:tc>
+                  <a:txBody>
+                    <a:bodyPr/>
+                    <a:lstStyle/>
+                    <a:p>
+                      <a:pPr algn="ctr"/>
+                      <a:r>
+                        <a:rPr lang="en-US" sz="1600" dirty="0" smtClean="0">
+                          <a:solidFill>
+                            <a:schemeClr val="accent1"/>
+                          </a:solidFill>
+                        </a:rPr>
+                        <a:t>Arguments</a:t>
+                      </a:r>
+                      <a:endParaRPr lang="en-US" sz="1600" dirty="0">
+                        <a:solidFill>
+                          <a:schemeClr val="accent1"/>
+                        </a:solidFill>
+                      </a:endParaRPr>
+                    </a:p>
+                  </a:txBody>
+                  <a:tcPr anchor="ctr">
+                    <a:lnT w="12700" cap="flat" cmpd="sng" algn="ctr">
+                      <a:solidFill>
+                        <a:schemeClr val="tx1"/>
+                      </a:solidFill>
+                      <a:prstDash val="dot"/>
+                      <a:round/>
+                      <a:headEnd type="none" w="med" len="med"/>
+                      <a:tailEnd type="none" w="med" len="med"/>
+                    </a:lnT>
+                    <a:lnB w="12700" cap="flat" cmpd="sng" algn="ctr">
+                      <a:solidFill>
+                        <a:schemeClr val="tx1"/>
+                      </a:solidFill>
+                      <a:prstDash val="dot"/>
+                      <a:round/>
+                      <a:headEnd type="none" w="med" len="med"/>
+                      <a:tailEnd type="none" w="med" len="med"/>
+                    </a:lnB>
+                  </a:tcPr>
+                </a:tc>
+                <a:tc>
+                  <a:txBody>
+                    <a:bodyPr/>
+                    <a:lstStyle/>
+                    <a:p>
+                      <a:pPr algn="ctr"/>
+                      <a:r>
+                        <a:rPr lang="en-US" sz="1600" dirty="0" smtClean="0">
+                          <a:solidFill>
+                            <a:srgbClr val="7030A0"/>
+                          </a:solidFill>
+                        </a:rPr>
+                        <a:t>Overrides</a:t>
+                      </a:r>
+                      <a:endParaRPr lang="en-US" sz="1600" dirty="0">
+                        <a:solidFill>
+                          <a:srgbClr val="7030A0"/>
+                        </a:solidFill>
+                      </a:endParaRPr>
+                    </a:p>
+                  </a:txBody>
+                  <a:tcPr anchor="ctr">
+                    <a:lnT w="12700" cap="flat" cmpd="sng" algn="ctr">
+                      <a:solidFill>
+                        <a:schemeClr val="tx1"/>
+                      </a:solidFill>
+                      <a:prstDash val="dot"/>
+                      <a:round/>
+                      <a:headEnd type="none" w="med" len="med"/>
+                      <a:tailEnd type="none" w="med" len="med"/>
+                    </a:lnT>
+                    <a:lnB w="12700" cap="flat" cmpd="sng" algn="ctr">
+                      <a:solidFill>
+                        <a:schemeClr val="tx1"/>
+                      </a:solidFill>
+                      <a:prstDash val="dot"/>
+                      <a:round/>
+                      <a:headEnd type="none" w="med" len="med"/>
+                      <a:tailEnd type="none" w="med" len="med"/>
+                    </a:lnB>
+                  </a:tcPr>
+                </a:tc>
+                <a:tc>
+                  <a:txBody>
+                    <a:bodyPr/>
+                    <a:lstStyle/>
+                    <a:p>
+                      <a:pPr algn="ctr"/>
+                      <a:r>
+                        <a:rPr lang="en-US" sz="1600" dirty="0" smtClean="0">
+                          <a:solidFill>
+                            <a:schemeClr val="accent6"/>
+                          </a:solidFill>
+                        </a:rPr>
+                        <a:t>Overrides</a:t>
+                      </a:r>
+                      <a:endParaRPr lang="en-US" sz="1600" dirty="0">
+                        <a:solidFill>
+                          <a:schemeClr val="accent6"/>
+                        </a:solidFill>
+                      </a:endParaRPr>
+                    </a:p>
+                  </a:txBody>
+                  <a:tcPr anchor="ctr">
+                    <a:lnT w="12700" cap="flat" cmpd="sng" algn="ctr">
+                      <a:solidFill>
+                        <a:schemeClr val="tx1"/>
+                      </a:solidFill>
+                      <a:prstDash val="dot"/>
+                      <a:round/>
+                      <a:headEnd type="none" w="med" len="med"/>
+                      <a:tailEnd type="none" w="med" len="med"/>
+                    </a:lnT>
+                    <a:lnB w="12700" cap="flat" cmpd="sng" algn="ctr">
+                      <a:solidFill>
+                        <a:schemeClr val="tx1"/>
+                      </a:solidFill>
+                      <a:prstDash val="dot"/>
+                      <a:round/>
+                      <a:headEnd type="none" w="med" len="med"/>
+                      <a:tailEnd type="none" w="med" len="med"/>
+                    </a:lnB>
+                  </a:tcPr>
+                </a:tc>
+                <a:tc>
+                  <a:txBody>
+                    <a:bodyPr/>
+                    <a:lstStyle/>
+                    <a:p>
+                      <a:pPr algn="ctr"/>
+                      <a:r>
+                        <a:rPr lang="en-US" sz="1600" dirty="0" smtClean="0">
+                          <a:solidFill>
+                            <a:schemeClr val="accent4">
+                              <a:lumMod val="75000"/>
+                            </a:schemeClr>
+                          </a:solidFill>
+                        </a:rPr>
+                        <a:t>Overrides</a:t>
+                      </a:r>
+                      <a:endParaRPr lang="en-US" sz="1600" dirty="0">
+                        <a:solidFill>
+                          <a:schemeClr val="accent4">
+                            <a:lumMod val="75000"/>
+                          </a:schemeClr>
+                        </a:solidFill>
+                      </a:endParaRPr>
+                    </a:p>
+                  </a:txBody>
+                  <a:tcPr anchor="ctr">
+                    <a:lnR w="12700" cap="flat" cmpd="sng" algn="ctr">
+                      <a:solidFill>
+                        <a:schemeClr val="tx1"/>
+                      </a:solidFill>
+                      <a:prstDash val="solid"/>
+                      <a:round/>
+                      <a:headEnd type="none" w="med" len="med"/>
+                      <a:tailEnd type="none" w="med" len="med"/>
+                    </a:lnR>
+                    <a:lnT w="12700" cap="flat" cmpd="sng" algn="ctr">
+                      <a:solidFill>
+                        <a:schemeClr val="tx1"/>
+                      </a:solidFill>
+                      <a:prstDash val="dot"/>
+                      <a:round/>
+                      <a:headEnd type="none" w="med" len="med"/>
+                      <a:tailEnd type="none" w="med" len="med"/>
+                    </a:lnT>
+                    <a:lnB w="12700" cap="flat" cmpd="sng" algn="ctr">
+                      <a:solidFill>
+                        <a:schemeClr val="tx1"/>
+                      </a:solidFill>
+                      <a:prstDash val="dot"/>
+                      <a:round/>
+                      <a:headEnd type="none" w="med" len="med"/>
+                      <a:tailEnd type="none" w="med" len="med"/>
+                    </a:lnB>
+                  </a:tcPr>
+                </a:tc>
+                <a:extLst>
+                  <a:ext uri="{0D108BD9-81ED-4DB2-BD59-A6C34878D82A}">
+                    <a16:rowId xmlns:a16="http://schemas.microsoft.com/office/drawing/2014/main" val="1310112458"/>
+                  </a:ext>
+                </a:extLst>
+              </a:tr>
+              <a:tr h="335281">
+                <a:tc>
+                  <a:txBody>
+                    <a:bodyPr/>
+                    <a:lstStyle/>
+                    <a:p>
+                      <a:pPr algn="r"/>
+                      <a:r>
+                        <a:rPr lang="en-US" sz="1600" dirty="0"/>
+                        <a:t>Units:</a:t>
+                      </a:r>
+                    </a:p>
+                  </a:txBody>
+                  <a:tcPr anchor="ctr">
+                    <a:lnL w="12700" cap="flat" cmpd="sng" algn="ctr">
+                      <a:solidFill>
+                        <a:schemeClr val="tx1"/>
+                      </a:solidFill>
+                      <a:prstDash val="solid"/>
+                      <a:round/>
+                      <a:headEnd type="none" w="med" len="med"/>
+                      <a:tailEnd type="none" w="med" len="med"/>
+                    </a:lnL>
+                    <a:lnT w="12700" cap="flat" cmpd="sng" algn="ctr">
+                      <a:solidFill>
+                        <a:schemeClr val="tx1"/>
+                      </a:solidFill>
+                      <a:prstDash val="dot"/>
+                      <a:round/>
+                      <a:headEnd type="none" w="med" len="med"/>
+                      <a:tailEnd type="none" w="med" len="med"/>
+                    </a:lnT>
+                    <a:lnB w="12700" cap="flat" cmpd="sng" algn="ctr">
+                      <a:solidFill>
+                        <a:schemeClr val="tx1"/>
+                      </a:solidFill>
+                      <a:prstDash val="solid"/>
+                      <a:round/>
+                      <a:headEnd type="none" w="med" len="med"/>
+                      <a:tailEnd type="none" w="med" len="med"/>
+                    </a:lnB>
+                  </a:tcPr>
+                </a:tc>
+                <a:tc>
+                  <a:txBody>
+                    <a:bodyPr/>
+                    <a:lstStyle/>
+                    <a:p>
+                      <a:pPr algn="ctr"/>
+                      <a:r>
+                        <a:rPr lang="en-US" sz="1600" dirty="0">
+                          <a:solidFill>
+                            <a:schemeClr val="accent1"/>
+                          </a:solidFill>
+                        </a:rPr>
+                        <a:t>Inches</a:t>
+                      </a:r>
+                    </a:p>
+                  </a:txBody>
+                  <a:tcPr anchor="ctr">
+                    <a:lnT w="12700" cap="flat" cmpd="sng" algn="ctr">
+                      <a:solidFill>
+                        <a:schemeClr val="tx1"/>
+                      </a:solidFill>
+                      <a:prstDash val="dot"/>
+                      <a:round/>
+                      <a:headEnd type="none" w="med" len="med"/>
+                      <a:tailEnd type="none" w="med" len="med"/>
+                    </a:lnT>
+                    <a:lnB w="12700" cap="flat" cmpd="sng" algn="ctr">
+                      <a:solidFill>
+                        <a:schemeClr val="tx1"/>
+                      </a:solidFill>
+                      <a:prstDash val="solid"/>
+                      <a:round/>
+                      <a:headEnd type="none" w="med" len="med"/>
+                      <a:tailEnd type="none" w="med" len="med"/>
+                    </a:lnB>
+                  </a:tcPr>
+                </a:tc>
+                <a:tc>
+                  <a:txBody>
+                    <a:bodyPr/>
+                    <a:lstStyle/>
+                    <a:p>
+                      <a:pPr algn="ctr"/>
+                      <a:r>
+                        <a:rPr lang="en-US" sz="1600" dirty="0" err="1">
+                          <a:solidFill>
+                            <a:srgbClr val="7030A0"/>
+                          </a:solidFill>
+                        </a:rPr>
+                        <a:t>Bigpoints</a:t>
+                      </a:r>
+                      <a:endParaRPr lang="en-US" sz="1600" dirty="0">
+                        <a:solidFill>
+                          <a:srgbClr val="7030A0"/>
+                        </a:solidFill>
+                      </a:endParaRPr>
+                    </a:p>
+                  </a:txBody>
+                  <a:tcPr anchor="ctr">
+                    <a:lnT w="12700" cap="flat" cmpd="sng" algn="ctr">
+                      <a:solidFill>
+                        <a:schemeClr val="tx1"/>
+                      </a:solidFill>
+                      <a:prstDash val="dot"/>
+                      <a:round/>
+                      <a:headEnd type="none" w="med" len="med"/>
+                      <a:tailEnd type="none" w="med" len="med"/>
+                    </a:lnT>
+                    <a:lnB w="12700" cap="flat" cmpd="sng" algn="ctr">
+                      <a:solidFill>
+                        <a:schemeClr val="tx1"/>
+                      </a:solidFill>
+                      <a:prstDash val="solid"/>
+                      <a:round/>
+                      <a:headEnd type="none" w="med" len="med"/>
+                      <a:tailEnd type="none" w="med" len="med"/>
+                    </a:lnB>
+                  </a:tcPr>
+                </a:tc>
+                <a:tc>
+                  <a:txBody>
+                    <a:bodyPr/>
+                    <a:lstStyle/>
+                    <a:p>
+                      <a:pPr algn="ctr"/>
+                      <a:r>
+                        <a:rPr lang="en-US" sz="1600" dirty="0" err="1">
+                          <a:solidFill>
+                            <a:schemeClr val="accent6"/>
+                          </a:solidFill>
+                        </a:rPr>
+                        <a:t>Bigpoints</a:t>
+                      </a:r>
+                      <a:endParaRPr lang="en-US" sz="1600" dirty="0">
+                        <a:solidFill>
+                          <a:schemeClr val="accent6"/>
+                        </a:solidFill>
+                      </a:endParaRPr>
+                    </a:p>
+                  </a:txBody>
+                  <a:tcPr anchor="ctr">
+                    <a:lnT w="12700" cap="flat" cmpd="sng" algn="ctr">
+                      <a:solidFill>
+                        <a:schemeClr val="tx1"/>
+                      </a:solidFill>
+                      <a:prstDash val="dot"/>
+                      <a:round/>
+                      <a:headEnd type="none" w="med" len="med"/>
+                      <a:tailEnd type="none" w="med" len="med"/>
+                    </a:lnT>
+                    <a:lnB w="12700" cap="flat" cmpd="sng" algn="ctr">
+                      <a:solidFill>
+                        <a:schemeClr val="tx1"/>
+                      </a:solidFill>
+                      <a:prstDash val="solid"/>
+                      <a:round/>
+                      <a:headEnd type="none" w="med" len="med"/>
+                      <a:tailEnd type="none" w="med" len="med"/>
+                    </a:lnB>
+                  </a:tcPr>
+                </a:tc>
+                <a:tc>
+                  <a:txBody>
+                    <a:bodyPr/>
+                    <a:lstStyle/>
+                    <a:p>
+                      <a:pPr algn="ctr"/>
+                      <a:r>
+                        <a:rPr lang="en-US" sz="1600" dirty="0" err="1">
+                          <a:solidFill>
+                            <a:schemeClr val="accent4">
+                              <a:lumMod val="75000"/>
+                            </a:schemeClr>
+                          </a:solidFill>
+                        </a:rPr>
+                        <a:t>Bigpoints</a:t>
+                      </a:r>
+                      <a:endParaRPr lang="en-US" sz="1600" dirty="0">
+                        <a:solidFill>
+                          <a:schemeClr val="accent4">
+                            <a:lumMod val="75000"/>
+                          </a:schemeClr>
+                        </a:solidFill>
+                      </a:endParaRPr>
+                    </a:p>
+                  </a:txBody>
+                  <a:tcPr anchor="ctr">
+                    <a:lnR w="12700" cap="flat" cmpd="sng" algn="ctr">
+                      <a:solidFill>
+                        <a:schemeClr val="tx1"/>
+                      </a:solidFill>
+                      <a:prstDash val="solid"/>
+                      <a:round/>
+                      <a:headEnd type="none" w="med" len="med"/>
+                      <a:tailEnd type="none" w="med" len="med"/>
+                    </a:lnR>
+                    <a:lnT w="12700" cap="flat" cmpd="sng" algn="ctr">
+                      <a:solidFill>
+                        <a:schemeClr val="tx1"/>
+                      </a:solidFill>
+                      <a:prstDash val="dot"/>
+                      <a:round/>
+                      <a:headEnd type="none" w="med" len="med"/>
+                      <a:tailEnd type="none" w="med" len="med"/>
+                    </a:lnT>
+                    <a:lnB w="12700" cap="flat" cmpd="sng" algn="ctr">
+                      <a:solidFill>
+                        <a:schemeClr val="tx1"/>
+                      </a:solidFill>
+                      <a:prstDash val="solid"/>
+                      <a:round/>
+                      <a:headEnd type="none" w="med" len="med"/>
+                      <a:tailEnd type="none" w="med" len="med"/>
+                    </a:lnB>
+                  </a:tcPr>
+                </a:tc>
+                <a:extLst>
+                  <a:ext uri="{0D108BD9-81ED-4DB2-BD59-A6C34878D82A}">
+                    <a16:rowId xmlns:a16="http://schemas.microsoft.com/office/drawing/2014/main" val="57019421"/>
+                  </a:ext>
+                </a:extLst>
+              </a:tr>
+            </a:tbl>
+          </a:graphicData>
+        </a:graphic>
+      </p:graphicFrame>
+      <p:pic>
+        <p:nvPicPr>
+          <p:cNvPr id="13" name="Picture 12" descr="Chart, line chart&#10;&#10;Description automatically generated">
+            <a:extLst>
+              <a:ext uri="{FF2B5EF4-FFF2-40B4-BE49-F238E27FC236}">
+                <a16:creationId xmlns:a16="http://schemas.microsoft.com/office/drawing/2014/main" id="{8D780F8C-7987-4FEB-8FCD-CF48F06438A0}"/>
+              </a:ext>
+            </a:extLst>
+          </p:cNvPr>
+          <p:cNvPicPr>
+            <a:picLocks noChangeAspect="1"/>
+          </p:cNvPicPr>
+          <p:nvPr/>
+        </p:nvPicPr>
+        <p:blipFill>
+          <a:blip r:embed="rId2" cstate="print">
+            <a:extLst>
+              <a:ext uri="{28A0092B-C50C-407E-A947-70E740481C1C}">
+                <a14:useLocalDpi xmlns:a14="http://schemas.microsoft.com/office/drawing/2010/main" val="0"/>
+              </a:ext>
+            </a:extLst>
+          </a:blip>
+          <a:stretch>
+            <a:fillRect/>
+          </a:stretch>
+        </p:blipFill>
+        <p:spPr>
+          <a:xfrm>
+            <a:off x="2163625" y="682946"/>
+            <a:ext cx="8506985" cy="5077978"/>
+          </a:xfrm>
+          <a:prstGeom prst="rect">
+            <a:avLst/>
+          </a:prstGeom>
+        </p:spPr>
+      </p:pic>
+      <p:sp>
+        <p:nvSpPr>
+          <p:cNvPr id="40" name="TextBox 39">
+            <a:extLst>
+              <a:ext uri="{FF2B5EF4-FFF2-40B4-BE49-F238E27FC236}">
+                <a16:creationId xmlns:a16="http://schemas.microsoft.com/office/drawing/2014/main" id="{7BFCDB99-5A0E-40F1-BF44-59BF0D547CCE}"/>
+              </a:ext>
+            </a:extLst>
+          </p:cNvPr>
+          <p:cNvSpPr txBox="1"/>
+          <p:nvPr/>
+        </p:nvSpPr>
+        <p:spPr>
+          <a:xfrm>
+            <a:off x="10880750" y="690619"/>
+            <a:ext cx="2439425" cy="369460"/>
+          </a:xfrm>
+          <a:prstGeom prst="rect">
+            <a:avLst/>
+          </a:prstGeom>
+          <a:noFill/>
+        </p:spPr>
+        <p:txBody>
+          <a:bodyPr wrap="square">
+            <a:spAutoFit/>
+          </a:bodyPr>
+          <a:lstStyle/>
+          <a:p>
+            <a:r>
+              <a:rPr lang="en-US" sz="1801" dirty="0" err="1">
+                <a:solidFill>
+                  <a:schemeClr val="accent6"/>
+                </a:solidFill>
+              </a:rPr>
+              <a:t>margin_legend_i</a:t>
+            </a:r>
+            <a:r>
+              <a:rPr lang="en-US" sz="1801" dirty="0">
+                <a:solidFill>
+                  <a:schemeClr val="accent6"/>
+                </a:solidFill>
+              </a:rPr>
+              <a:t> </a:t>
+            </a:r>
+          </a:p>
+        </p:txBody>
+      </p:sp>
+      <p:sp>
+        <p:nvSpPr>
+          <p:cNvPr id="41" name="TextBox 40">
+            <a:extLst>
+              <a:ext uri="{FF2B5EF4-FFF2-40B4-BE49-F238E27FC236}">
+                <a16:creationId xmlns:a16="http://schemas.microsoft.com/office/drawing/2014/main" id="{0B81D785-3D60-4F43-9384-1CEFD9F3D464}"/>
+              </a:ext>
+            </a:extLst>
+          </p:cNvPr>
+          <p:cNvSpPr txBox="1"/>
+          <p:nvPr/>
+        </p:nvSpPr>
+        <p:spPr>
+          <a:xfrm>
+            <a:off x="10880750" y="1380417"/>
+            <a:ext cx="1897151" cy="1323439"/>
+          </a:xfrm>
+          <a:prstGeom prst="rect">
+            <a:avLst/>
+          </a:prstGeom>
+          <a:noFill/>
+        </p:spPr>
+        <p:txBody>
+          <a:bodyPr wrap="square">
+            <a:spAutoFit/>
+          </a:bodyPr>
+          <a:lstStyle/>
+          <a:p>
+            <a:r>
+              <a:rPr lang="en-US" sz="1600" i="1" dirty="0">
+                <a:solidFill>
+                  <a:schemeClr val="accent6"/>
+                </a:solidFill>
+              </a:rPr>
+              <a:t>Note that “margin_legend_i” only applies when there are two or more legends.</a:t>
+            </a:r>
           </a:p>
         </p:txBody>
       </p:sp>
@@ -4271,7 +5066,7 @@
 <file path=ppt/theme/theme1.xml><?xml version="1.0" encoding="utf-8"?>
 <a:theme xmlns:a="http://schemas.openxmlformats.org/drawingml/2006/main" name="Office Theme">
   <a:themeElements>
-    <a:clrScheme name="Office">
+    <a:clrScheme name="Office Theme">
       <a:dk1>
         <a:sysClr val="windowText" lastClr="000000"/>
       </a:dk1>
@@ -4309,7 +5104,7 @@
         <a:srgbClr val="954F72"/>
       </a:folHlink>
     </a:clrScheme>
-    <a:fontScheme name="Office">
+    <a:fontScheme name="Office Theme">
       <a:majorFont>
         <a:latin typeface="Calibri Light" panose="020F0302020204030204"/>
         <a:ea typeface=""/>
@@ -4381,7 +5176,7 @@
         <a:font script="Geor" typeface="Sylfaen"/>
       </a:minorFont>
     </a:fontScheme>
-    <a:fmtScheme name="Office">
+    <a:fmtScheme name="Office Theme">
       <a:fillStyleLst>
         <a:solidFill>
           <a:schemeClr val="phClr"/>

</xml_diff>

<commit_message>
Built site for cmapplot: 0.9.3@e8f47bb
</commit_message>
<xml_diff>
--- a/reference/figures/margins.pptx
+++ b/reference/figures/margins.pptx
@@ -243,7 +243,7 @@
           <a:p>
             <a:fld id="{601E7828-7FC6-4336-B4EC-5F99010F00A5}" type="datetimeFigureOut">
               <a:rPr lang="en-US" smtClean="0"/>
-              <a:t>11/24/2020</a:t>
+              <a:t>11/25/2020</a:t>
             </a:fld>
             <a:endParaRPr lang="en-US"/>
           </a:p>
@@ -413,7 +413,7 @@
           <a:p>
             <a:fld id="{601E7828-7FC6-4336-B4EC-5F99010F00A5}" type="datetimeFigureOut">
               <a:rPr lang="en-US" smtClean="0"/>
-              <a:t>11/24/2020</a:t>
+              <a:t>11/25/2020</a:t>
             </a:fld>
             <a:endParaRPr lang="en-US"/>
           </a:p>
@@ -593,7 +593,7 @@
           <a:p>
             <a:fld id="{601E7828-7FC6-4336-B4EC-5F99010F00A5}" type="datetimeFigureOut">
               <a:rPr lang="en-US" smtClean="0"/>
-              <a:t>11/24/2020</a:t>
+              <a:t>11/25/2020</a:t>
             </a:fld>
             <a:endParaRPr lang="en-US"/>
           </a:p>
@@ -763,7 +763,7 @@
           <a:p>
             <a:fld id="{601E7828-7FC6-4336-B4EC-5F99010F00A5}" type="datetimeFigureOut">
               <a:rPr lang="en-US" smtClean="0"/>
-              <a:t>11/24/2020</a:t>
+              <a:t>11/25/2020</a:t>
             </a:fld>
             <a:endParaRPr lang="en-US"/>
           </a:p>
@@ -1009,7 +1009,7 @@
           <a:p>
             <a:fld id="{601E7828-7FC6-4336-B4EC-5F99010F00A5}" type="datetimeFigureOut">
               <a:rPr lang="en-US" smtClean="0"/>
-              <a:t>11/24/2020</a:t>
+              <a:t>11/25/2020</a:t>
             </a:fld>
             <a:endParaRPr lang="en-US"/>
           </a:p>
@@ -1241,7 +1241,7 @@
           <a:p>
             <a:fld id="{601E7828-7FC6-4336-B4EC-5F99010F00A5}" type="datetimeFigureOut">
               <a:rPr lang="en-US" smtClean="0"/>
-              <a:t>11/24/2020</a:t>
+              <a:t>11/25/2020</a:t>
             </a:fld>
             <a:endParaRPr lang="en-US"/>
           </a:p>
@@ -1608,7 +1608,7 @@
           <a:p>
             <a:fld id="{601E7828-7FC6-4336-B4EC-5F99010F00A5}" type="datetimeFigureOut">
               <a:rPr lang="en-US" smtClean="0"/>
-              <a:t>11/24/2020</a:t>
+              <a:t>11/25/2020</a:t>
             </a:fld>
             <a:endParaRPr lang="en-US"/>
           </a:p>
@@ -1726,7 +1726,7 @@
           <a:p>
             <a:fld id="{601E7828-7FC6-4336-B4EC-5F99010F00A5}" type="datetimeFigureOut">
               <a:rPr lang="en-US" smtClean="0"/>
-              <a:t>11/24/2020</a:t>
+              <a:t>11/25/2020</a:t>
             </a:fld>
             <a:endParaRPr lang="en-US"/>
           </a:p>
@@ -1821,7 +1821,7 @@
           <a:p>
             <a:fld id="{601E7828-7FC6-4336-B4EC-5F99010F00A5}" type="datetimeFigureOut">
               <a:rPr lang="en-US" smtClean="0"/>
-              <a:t>11/24/2020</a:t>
+              <a:t>11/25/2020</a:t>
             </a:fld>
             <a:endParaRPr lang="en-US"/>
           </a:p>
@@ -2098,7 +2098,7 @@
           <a:p>
             <a:fld id="{601E7828-7FC6-4336-B4EC-5F99010F00A5}" type="datetimeFigureOut">
               <a:rPr lang="en-US" smtClean="0"/>
-              <a:t>11/24/2020</a:t>
+              <a:t>11/25/2020</a:t>
             </a:fld>
             <a:endParaRPr lang="en-US"/>
           </a:p>
@@ -2355,7 +2355,7 @@
           <a:p>
             <a:fld id="{601E7828-7FC6-4336-B4EC-5F99010F00A5}" type="datetimeFigureOut">
               <a:rPr lang="en-US" smtClean="0"/>
-              <a:t>11/24/2020</a:t>
+              <a:t>11/25/2020</a:t>
             </a:fld>
             <a:endParaRPr lang="en-US"/>
           </a:p>
@@ -2568,7 +2568,7 @@
           <a:p>
             <a:fld id="{601E7828-7FC6-4336-B4EC-5F99010F00A5}" type="datetimeFigureOut">
               <a:rPr lang="en-US" smtClean="0"/>
-              <a:t>11/24/2020</a:t>
+              <a:t>11/25/2020</a:t>
             </a:fld>
             <a:endParaRPr lang="en-US"/>
           </a:p>
@@ -3168,52 +3168,6 @@
               </a:rPr>
               <a:t>height</a:t>
             </a:r>
-          </a:p>
-        </p:txBody>
-      </p:sp>
-      <p:sp>
-        <p:nvSpPr>
-          <p:cNvPr id="11" name="Left Brace 10"/>
-          <p:cNvSpPr/>
-          <p:nvPr/>
-        </p:nvSpPr>
-        <p:spPr>
-          <a:xfrm rot="10800000">
-            <a:off x="10690766" y="875287"/>
-            <a:ext cx="112084" cy="59056"/>
-          </a:xfrm>
-          <a:prstGeom prst="leftBrace">
-            <a:avLst>
-              <a:gd name="adj1" fmla="val 79717"/>
-              <a:gd name="adj2" fmla="val 50000"/>
-            </a:avLst>
-          </a:prstGeom>
-          <a:ln w="19050">
-            <a:solidFill>
-              <a:schemeClr val="accent6"/>
-            </a:solidFill>
-          </a:ln>
-        </p:spPr>
-        <p:style>
-          <a:lnRef idx="1">
-            <a:schemeClr val="accent1"/>
-          </a:lnRef>
-          <a:fillRef idx="0">
-            <a:schemeClr val="accent1"/>
-          </a:fillRef>
-          <a:effectRef idx="0">
-            <a:schemeClr val="accent1"/>
-          </a:effectRef>
-          <a:fontRef idx="minor">
-            <a:schemeClr val="tx1"/>
-          </a:fontRef>
-        </p:style>
-        <p:txBody>
-          <a:bodyPr rtlCol="0" anchor="ctr"/>
-          <a:lstStyle/>
-          <a:p>
-            <a:pPr algn="ctr"/>
-            <a:endParaRPr lang="en-US" sz="1801"/>
           </a:p>
         </p:txBody>
       </p:sp>
@@ -4966,53 +4920,6 @@
       </p:pic>
       <p:sp>
         <p:nvSpPr>
-          <p:cNvPr id="40" name="TextBox 39">
-            <a:extLst>
-              <a:ext uri="{FF2B5EF4-FFF2-40B4-BE49-F238E27FC236}">
-                <a16:creationId xmlns:a16="http://schemas.microsoft.com/office/drawing/2014/main" id="{7BFCDB99-5A0E-40F1-BF44-59BF0D547CCE}"/>
-              </a:ext>
-            </a:extLst>
-          </p:cNvPr>
-          <p:cNvSpPr txBox="1"/>
-          <p:nvPr/>
-        </p:nvSpPr>
-        <p:spPr>
-          <a:xfrm>
-            <a:off x="10880750" y="690619"/>
-            <a:ext cx="2439425" cy="369460"/>
-          </a:xfrm>
-          <a:prstGeom prst="rect">
-            <a:avLst/>
-          </a:prstGeom>
-          <a:noFill/>
-        </p:spPr>
-        <p:txBody>
-          <a:bodyPr wrap="square">
-            <a:spAutoFit/>
-          </a:bodyPr>
-          <a:lstStyle/>
-          <a:p>
-            <a:r>
-              <a:rPr lang="en-US" sz="1801" dirty="0" err="1">
-                <a:solidFill>
-                  <a:schemeClr val="accent6"/>
-                </a:solidFill>
-              </a:rPr>
-              <a:t>margin_legend_i</a:t>
-            </a:r>
-            <a:r>
-              <a:rPr lang="en-US" sz="1801" dirty="0">
-                <a:solidFill>
-                  <a:schemeClr val="accent6"/>
-                </a:solidFill>
-              </a:rPr>
-              <a:t> </a:t>
-            </a:r>
-          </a:p>
-        </p:txBody>
-      </p:sp>
-      <p:sp>
-        <p:nvSpPr>
           <p:cNvPr id="41" name="TextBox 40">
             <a:extLst>
               <a:ext uri="{FF2B5EF4-FFF2-40B4-BE49-F238E27FC236}">
@@ -5025,8 +4932,8 @@
         </p:nvSpPr>
         <p:spPr>
           <a:xfrm>
-            <a:off x="10880750" y="1380417"/>
-            <a:ext cx="1897151" cy="1323439"/>
+            <a:off x="10862318" y="1397730"/>
+            <a:ext cx="1697005" cy="1815882"/>
           </a:xfrm>
           <a:prstGeom prst="rect">
             <a:avLst/>
@@ -5040,13 +4947,34 @@
           <a:lstStyle/>
           <a:p>
             <a:r>
-              <a:rPr lang="en-US" sz="1600" i="1" dirty="0">
+              <a:rPr lang="en-US" sz="1600" i="1" dirty="0" err="1" smtClean="0">
                 <a:solidFill>
                   <a:schemeClr val="accent6"/>
                 </a:solidFill>
               </a:rPr>
-              <a:t>Note that “margin_legend_i” only applies when there are two or more legends.</a:t>
-            </a:r>
+              <a:t>margin_legend_i</a:t>
+            </a:r>
+            <a:r>
+              <a:rPr lang="en-US" sz="1600" i="1" dirty="0" smtClean="0">
+                <a:solidFill>
+                  <a:schemeClr val="accent6"/>
+                </a:solidFill>
+              </a:rPr>
+              <a:t>, not pictured,</a:t>
+            </a:r>
+            <a:r>
+              <a:rPr lang="en-US" sz="1600" i="1" dirty="0" smtClean="0">
+                <a:solidFill>
+                  <a:schemeClr val="accent6"/>
+                </a:solidFill>
+              </a:rPr>
+              <a:t> sets the vertical space between legends if there the plot contains more than one. </a:t>
+            </a:r>
+            <a:endParaRPr lang="en-US" sz="1600" i="1" dirty="0">
+              <a:solidFill>
+                <a:schemeClr val="accent6"/>
+              </a:solidFill>
+            </a:endParaRPr>
           </a:p>
         </p:txBody>
       </p:sp>

</xml_diff>

<commit_message>
Built site for cmapplot: 1.0.3@ee5d124
</commit_message>
<xml_diff>
--- a/reference/figures/margins.pptx
+++ b/reference/figures/margins.pptx
@@ -243,7 +243,7 @@
           <a:p>
             <a:fld id="{601E7828-7FC6-4336-B4EC-5F99010F00A5}" type="datetimeFigureOut">
               <a:rPr lang="en-US" smtClean="0"/>
-              <a:t>11/25/2020</a:t>
+              <a:t>1/28/2021</a:t>
             </a:fld>
             <a:endParaRPr lang="en-US"/>
           </a:p>
@@ -413,7 +413,7 @@
           <a:p>
             <a:fld id="{601E7828-7FC6-4336-B4EC-5F99010F00A5}" type="datetimeFigureOut">
               <a:rPr lang="en-US" smtClean="0"/>
-              <a:t>11/25/2020</a:t>
+              <a:t>1/28/2021</a:t>
             </a:fld>
             <a:endParaRPr lang="en-US"/>
           </a:p>
@@ -593,7 +593,7 @@
           <a:p>
             <a:fld id="{601E7828-7FC6-4336-B4EC-5F99010F00A5}" type="datetimeFigureOut">
               <a:rPr lang="en-US" smtClean="0"/>
-              <a:t>11/25/2020</a:t>
+              <a:t>1/28/2021</a:t>
             </a:fld>
             <a:endParaRPr lang="en-US"/>
           </a:p>
@@ -763,7 +763,7 @@
           <a:p>
             <a:fld id="{601E7828-7FC6-4336-B4EC-5F99010F00A5}" type="datetimeFigureOut">
               <a:rPr lang="en-US" smtClean="0"/>
-              <a:t>11/25/2020</a:t>
+              <a:t>1/28/2021</a:t>
             </a:fld>
             <a:endParaRPr lang="en-US"/>
           </a:p>
@@ -1009,7 +1009,7 @@
           <a:p>
             <a:fld id="{601E7828-7FC6-4336-B4EC-5F99010F00A5}" type="datetimeFigureOut">
               <a:rPr lang="en-US" smtClean="0"/>
-              <a:t>11/25/2020</a:t>
+              <a:t>1/28/2021</a:t>
             </a:fld>
             <a:endParaRPr lang="en-US"/>
           </a:p>
@@ -1241,7 +1241,7 @@
           <a:p>
             <a:fld id="{601E7828-7FC6-4336-B4EC-5F99010F00A5}" type="datetimeFigureOut">
               <a:rPr lang="en-US" smtClean="0"/>
-              <a:t>11/25/2020</a:t>
+              <a:t>1/28/2021</a:t>
             </a:fld>
             <a:endParaRPr lang="en-US"/>
           </a:p>
@@ -1608,7 +1608,7 @@
           <a:p>
             <a:fld id="{601E7828-7FC6-4336-B4EC-5F99010F00A5}" type="datetimeFigureOut">
               <a:rPr lang="en-US" smtClean="0"/>
-              <a:t>11/25/2020</a:t>
+              <a:t>1/28/2021</a:t>
             </a:fld>
             <a:endParaRPr lang="en-US"/>
           </a:p>
@@ -1726,7 +1726,7 @@
           <a:p>
             <a:fld id="{601E7828-7FC6-4336-B4EC-5F99010F00A5}" type="datetimeFigureOut">
               <a:rPr lang="en-US" smtClean="0"/>
-              <a:t>11/25/2020</a:t>
+              <a:t>1/28/2021</a:t>
             </a:fld>
             <a:endParaRPr lang="en-US"/>
           </a:p>
@@ -1821,7 +1821,7 @@
           <a:p>
             <a:fld id="{601E7828-7FC6-4336-B4EC-5F99010F00A5}" type="datetimeFigureOut">
               <a:rPr lang="en-US" smtClean="0"/>
-              <a:t>11/25/2020</a:t>
+              <a:t>1/28/2021</a:t>
             </a:fld>
             <a:endParaRPr lang="en-US"/>
           </a:p>
@@ -2098,7 +2098,7 @@
           <a:p>
             <a:fld id="{601E7828-7FC6-4336-B4EC-5F99010F00A5}" type="datetimeFigureOut">
               <a:rPr lang="en-US" smtClean="0"/>
-              <a:t>11/25/2020</a:t>
+              <a:t>1/28/2021</a:t>
             </a:fld>
             <a:endParaRPr lang="en-US"/>
           </a:p>
@@ -2355,7 +2355,7 @@
           <a:p>
             <a:fld id="{601E7828-7FC6-4336-B4EC-5F99010F00A5}" type="datetimeFigureOut">
               <a:rPr lang="en-US" smtClean="0"/>
-              <a:t>11/25/2020</a:t>
+              <a:t>1/28/2021</a:t>
             </a:fld>
             <a:endParaRPr lang="en-US"/>
           </a:p>
@@ -2568,7 +2568,7 @@
           <a:p>
             <a:fld id="{601E7828-7FC6-4336-B4EC-5F99010F00A5}" type="datetimeFigureOut">
               <a:rPr lang="en-US" smtClean="0"/>
-              <a:t>11/25/2020</a:t>
+              <a:t>1/28/2021</a:t>
             </a:fld>
             <a:endParaRPr lang="en-US"/>
           </a:p>
@@ -3917,15 +3917,15 @@
               <a:t>              </a:t>
             </a:r>
             <a:r>
-              <a:rPr lang="en-US" sz="1801" dirty="0" err="1">
+              <a:rPr lang="en-US" sz="1801" dirty="0" err="1" smtClean="0">
                 <a:solidFill>
                   <a:srgbClr val="7030A0"/>
                 </a:solidFill>
               </a:rPr>
-              <a:t>margin_title_r</a:t>
-            </a:r>
-            <a:r>
-              <a:rPr lang="en-US" sz="1801" dirty="0">
+              <a:t>margin_plot_l</a:t>
+            </a:r>
+            <a:r>
+              <a:rPr lang="en-US" sz="1801" dirty="0" smtClean="0">
                 <a:solidFill>
                   <a:srgbClr val="7030A0"/>
                 </a:solidFill>
@@ -3974,8 +3974,8 @@
         </p:nvSpPr>
         <p:spPr>
           <a:xfrm rot="5400000">
-            <a:off x="3291726" y="-650806"/>
-            <a:ext cx="112084" cy="2359481"/>
+            <a:off x="3112621" y="-471701"/>
+            <a:ext cx="112084" cy="2001271"/>
           </a:xfrm>
           <a:prstGeom prst="leftBrace">
             <a:avLst>
@@ -4960,15 +4960,7 @@
                   <a:schemeClr val="accent6"/>
                 </a:solidFill>
               </a:rPr>
-              <a:t>, not pictured,</a:t>
-            </a:r>
-            <a:r>
-              <a:rPr lang="en-US" sz="1600" i="1" dirty="0" smtClean="0">
-                <a:solidFill>
-                  <a:schemeClr val="accent6"/>
-                </a:solidFill>
-              </a:rPr>
-              <a:t> sets the vertical space between legends if there the plot contains more than one. </a:t>
+              <a:t>, not pictured, sets the vertical space between legends if there the plot contains more than one. </a:t>
             </a:r>
             <a:endParaRPr lang="en-US" sz="1600" i="1" dirty="0">
               <a:solidFill>

</xml_diff>

<commit_message>
Built site for cmapplot: 1.1.0@ed83fc7
</commit_message>
<xml_diff>
--- a/reference/figures/margins.pptx
+++ b/reference/figures/margins.pptx
@@ -6,6 +6,7 @@
   </p:sldMasterIdLst>
   <p:sldIdLst>
     <p:sldId id="256" r:id="rId2"/>
+    <p:sldId id="257" r:id="rId3"/>
   </p:sldIdLst>
   <p:sldSz cx="12801600" cy="8229600"/>
   <p:notesSz cx="6858000" cy="9144000"/>
@@ -243,7 +244,7 @@
           <a:p>
             <a:fld id="{601E7828-7FC6-4336-B4EC-5F99010F00A5}" type="datetimeFigureOut">
               <a:rPr lang="en-US" smtClean="0"/>
-              <a:t>1/28/2021</a:t>
+              <a:t>3/1/2021</a:t>
             </a:fld>
             <a:endParaRPr lang="en-US"/>
           </a:p>
@@ -413,7 +414,7 @@
           <a:p>
             <a:fld id="{601E7828-7FC6-4336-B4EC-5F99010F00A5}" type="datetimeFigureOut">
               <a:rPr lang="en-US" smtClean="0"/>
-              <a:t>1/28/2021</a:t>
+              <a:t>3/1/2021</a:t>
             </a:fld>
             <a:endParaRPr lang="en-US"/>
           </a:p>
@@ -593,7 +594,7 @@
           <a:p>
             <a:fld id="{601E7828-7FC6-4336-B4EC-5F99010F00A5}" type="datetimeFigureOut">
               <a:rPr lang="en-US" smtClean="0"/>
-              <a:t>1/28/2021</a:t>
+              <a:t>3/1/2021</a:t>
             </a:fld>
             <a:endParaRPr lang="en-US"/>
           </a:p>
@@ -763,7 +764,7 @@
           <a:p>
             <a:fld id="{601E7828-7FC6-4336-B4EC-5F99010F00A5}" type="datetimeFigureOut">
               <a:rPr lang="en-US" smtClean="0"/>
-              <a:t>1/28/2021</a:t>
+              <a:t>3/1/2021</a:t>
             </a:fld>
             <a:endParaRPr lang="en-US"/>
           </a:p>
@@ -1009,7 +1010,7 @@
           <a:p>
             <a:fld id="{601E7828-7FC6-4336-B4EC-5F99010F00A5}" type="datetimeFigureOut">
               <a:rPr lang="en-US" smtClean="0"/>
-              <a:t>1/28/2021</a:t>
+              <a:t>3/1/2021</a:t>
             </a:fld>
             <a:endParaRPr lang="en-US"/>
           </a:p>
@@ -1241,7 +1242,7 @@
           <a:p>
             <a:fld id="{601E7828-7FC6-4336-B4EC-5F99010F00A5}" type="datetimeFigureOut">
               <a:rPr lang="en-US" smtClean="0"/>
-              <a:t>1/28/2021</a:t>
+              <a:t>3/1/2021</a:t>
             </a:fld>
             <a:endParaRPr lang="en-US"/>
           </a:p>
@@ -1608,7 +1609,7 @@
           <a:p>
             <a:fld id="{601E7828-7FC6-4336-B4EC-5F99010F00A5}" type="datetimeFigureOut">
               <a:rPr lang="en-US" smtClean="0"/>
-              <a:t>1/28/2021</a:t>
+              <a:t>3/1/2021</a:t>
             </a:fld>
             <a:endParaRPr lang="en-US"/>
           </a:p>
@@ -1726,7 +1727,7 @@
           <a:p>
             <a:fld id="{601E7828-7FC6-4336-B4EC-5F99010F00A5}" type="datetimeFigureOut">
               <a:rPr lang="en-US" smtClean="0"/>
-              <a:t>1/28/2021</a:t>
+              <a:t>3/1/2021</a:t>
             </a:fld>
             <a:endParaRPr lang="en-US"/>
           </a:p>
@@ -1821,7 +1822,7 @@
           <a:p>
             <a:fld id="{601E7828-7FC6-4336-B4EC-5F99010F00A5}" type="datetimeFigureOut">
               <a:rPr lang="en-US" smtClean="0"/>
-              <a:t>1/28/2021</a:t>
+              <a:t>3/1/2021</a:t>
             </a:fld>
             <a:endParaRPr lang="en-US"/>
           </a:p>
@@ -2098,7 +2099,7 @@
           <a:p>
             <a:fld id="{601E7828-7FC6-4336-B4EC-5F99010F00A5}" type="datetimeFigureOut">
               <a:rPr lang="en-US" smtClean="0"/>
-              <a:t>1/28/2021</a:t>
+              <a:t>3/1/2021</a:t>
             </a:fld>
             <a:endParaRPr lang="en-US"/>
           </a:p>
@@ -2355,7 +2356,7 @@
           <a:p>
             <a:fld id="{601E7828-7FC6-4336-B4EC-5F99010F00A5}" type="datetimeFigureOut">
               <a:rPr lang="en-US" smtClean="0"/>
-              <a:t>1/28/2021</a:t>
+              <a:t>3/1/2021</a:t>
             </a:fld>
             <a:endParaRPr lang="en-US"/>
           </a:p>
@@ -2568,7 +2569,7 @@
           <a:p>
             <a:fld id="{601E7828-7FC6-4336-B4EC-5F99010F00A5}" type="datetimeFigureOut">
               <a:rPr lang="en-US" smtClean="0"/>
-              <a:t>1/28/2021</a:t>
+              <a:t>3/1/2021</a:t>
             </a:fld>
             <a:endParaRPr lang="en-US"/>
           </a:p>
@@ -2989,7 +2990,7 @@
         </p:nvSpPr>
         <p:spPr>
           <a:xfrm>
-            <a:off x="2372409" y="103560"/>
+            <a:off x="2108588" y="62102"/>
             <a:ext cx="1950720" cy="369460"/>
           </a:xfrm>
           <a:prstGeom prst="rect">
@@ -3005,12 +3006,20 @@
           <a:p>
             <a:pPr algn="ctr"/>
             <a:r>
-              <a:rPr lang="en-US" sz="1801" dirty="0" err="1">
+              <a:rPr lang="en-US" sz="1801" dirty="0" err="1" smtClean="0">
                 <a:solidFill>
                   <a:schemeClr val="accent1"/>
                 </a:solidFill>
               </a:rPr>
-              <a:t>title_width</a:t>
+              <a:t>sidebar</a:t>
+            </a:r>
+            <a:r>
+              <a:rPr lang="en-US" sz="1801" dirty="0" err="1" smtClean="0">
+                <a:solidFill>
+                  <a:schemeClr val="accent1"/>
+                </a:solidFill>
+              </a:rPr>
+              <a:t>_width</a:t>
             </a:r>
             <a:endParaRPr lang="en-US" sz="1801" dirty="0">
               <a:solidFill>
@@ -3886,8 +3895,8 @@
         </p:nvSpPr>
         <p:spPr>
           <a:xfrm>
-            <a:off x="1399496" y="5979481"/>
-            <a:ext cx="10608008" cy="369460"/>
+            <a:off x="1147897" y="5979481"/>
+            <a:ext cx="10997211" cy="369460"/>
           </a:xfrm>
           <a:prstGeom prst="rect">
             <a:avLst/>
@@ -3901,15 +3910,15 @@
           <a:lstStyle/>
           <a:p>
             <a:r>
-              <a:rPr lang="en-US" sz="1801" dirty="0" err="1">
+              <a:rPr lang="en-US" sz="1801" dirty="0" err="1" smtClean="0">
                 <a:solidFill>
                   <a:srgbClr val="7030A0"/>
                 </a:solidFill>
               </a:rPr>
-              <a:t>margin_title_l</a:t>
-            </a:r>
-            <a:r>
-              <a:rPr lang="en-US" sz="1801" dirty="0">
+              <a:t>margin_sidebar_l</a:t>
+            </a:r>
+            <a:r>
+              <a:rPr lang="en-US" sz="1801" dirty="0" smtClean="0">
                 <a:solidFill>
                   <a:srgbClr val="7030A0"/>
                 </a:solidFill>
@@ -4065,7 +4074,7 @@
           <p:nvPr>
             <p:extLst>
               <p:ext uri="{D42A27DB-BD31-4B8C-83A1-F6EECF244321}">
-                <p14:modId xmlns:p14="http://schemas.microsoft.com/office/powerpoint/2010/main" val="1577209038"/>
+                <p14:modId xmlns:p14="http://schemas.microsoft.com/office/powerpoint/2010/main" val="3053236634"/>
               </p:ext>
             </p:extLst>
           </p:nvPr>
@@ -4279,7 +4288,15 @@
                             <a:schemeClr val="accent1"/>
                           </a:solidFill>
                         </a:rPr>
-                        <a:t>Finalize_plot</a:t>
+                        <a:t>f</a:t>
+                      </a:r>
+                      <a:r>
+                        <a:rPr lang="en-US" sz="1600" dirty="0" err="1" smtClean="0">
+                          <a:solidFill>
+                            <a:schemeClr val="accent1"/>
+                          </a:solidFill>
+                        </a:rPr>
+                        <a:t>inalize_plot</a:t>
                       </a:r>
                       <a:r>
                         <a:rPr lang="en-US" sz="1600" dirty="0">
@@ -4315,7 +4332,15 @@
                             <a:srgbClr val="7030A0"/>
                           </a:solidFill>
                         </a:rPr>
-                        <a:t>Finalize_plot</a:t>
+                        <a:t>f</a:t>
+                      </a:r>
+                      <a:r>
+                        <a:rPr lang="en-US" sz="1600" dirty="0" err="1" smtClean="0">
+                          <a:solidFill>
+                            <a:srgbClr val="7030A0"/>
+                          </a:solidFill>
+                        </a:rPr>
+                        <a:t>inalize_plot</a:t>
                       </a:r>
                       <a:r>
                         <a:rPr lang="en-US" sz="1600" dirty="0">
@@ -4351,7 +4376,23 @@
                             <a:schemeClr val="accent6"/>
                           </a:solidFill>
                         </a:rPr>
-                        <a:t>Either function</a:t>
+                        <a:t>e</a:t>
+                      </a:r>
+                      <a:r>
+                        <a:rPr lang="en-US" sz="1600" dirty="0" smtClean="0">
+                          <a:solidFill>
+                            <a:schemeClr val="accent6"/>
+                          </a:solidFill>
+                        </a:rPr>
+                        <a:t>ither </a:t>
+                      </a:r>
+                      <a:r>
+                        <a:rPr lang="en-US" sz="1600" dirty="0">
+                          <a:solidFill>
+                            <a:schemeClr val="accent6"/>
+                          </a:solidFill>
+                        </a:rPr>
+                        <a:t>function</a:t>
                       </a:r>
                     </a:p>
                   </a:txBody>
@@ -4381,7 +4422,17 @@
                             </a:schemeClr>
                           </a:solidFill>
                         </a:rPr>
-                        <a:t>Theme_cmap</a:t>
+                        <a:t>t</a:t>
+                      </a:r>
+                      <a:r>
+                        <a:rPr lang="en-US" sz="1600" dirty="0" err="1" smtClean="0">
+                          <a:solidFill>
+                            <a:schemeClr val="accent4">
+                              <a:lumMod val="75000"/>
+                            </a:schemeClr>
+                          </a:solidFill>
+                        </a:rPr>
+                        <a:t>heme_cmap</a:t>
                       </a:r>
                       <a:r>
                         <a:rPr lang="en-US" sz="1600" dirty="0">
@@ -4520,7 +4571,7 @@
                             <a:srgbClr val="7030A0"/>
                           </a:solidFill>
                         </a:rPr>
-                        <a:t>Overrides</a:t>
+                        <a:t>overrides</a:t>
                       </a:r>
                       <a:endParaRPr lang="en-US" sz="1600" dirty="0">
                         <a:solidFill>
@@ -4562,7 +4613,7 @@
                             <a:schemeClr val="accent6"/>
                           </a:solidFill>
                         </a:rPr>
-                        <a:t>Overrides</a:t>
+                        <a:t>overrides</a:t>
                       </a:r>
                       <a:endParaRPr lang="en-US" sz="1600" dirty="0">
                         <a:solidFill>
@@ -4606,7 +4657,7 @@
                             </a:schemeClr>
                           </a:solidFill>
                         </a:rPr>
-                        <a:t>Overrides</a:t>
+                        <a:t>overrides</a:t>
                       </a:r>
                       <a:endParaRPr lang="en-US" sz="1600" dirty="0">
                         <a:solidFill>
@@ -4745,7 +4796,15 @@
                             <a:srgbClr val="7030A0"/>
                           </a:solidFill>
                         </a:rPr>
-                        <a:t>Bigpoints</a:t>
+                        <a:t>b</a:t>
+                      </a:r>
+                      <a:r>
+                        <a:rPr lang="en-US" sz="1600" dirty="0" err="1" smtClean="0">
+                          <a:solidFill>
+                            <a:srgbClr val="7030A0"/>
+                          </a:solidFill>
+                        </a:rPr>
+                        <a:t>igpoints</a:t>
                       </a:r>
                       <a:endParaRPr lang="en-US" sz="1600" dirty="0">
                         <a:solidFill>
@@ -4787,7 +4846,15 @@
                             <a:schemeClr val="accent6"/>
                           </a:solidFill>
                         </a:rPr>
-                        <a:t>Bigpoints</a:t>
+                        <a:t>b</a:t>
+                      </a:r>
+                      <a:r>
+                        <a:rPr lang="en-US" sz="1600" dirty="0" err="1" smtClean="0">
+                          <a:solidFill>
+                            <a:schemeClr val="accent6"/>
+                          </a:solidFill>
+                        </a:rPr>
+                        <a:t>igpoints</a:t>
                       </a:r>
                       <a:endParaRPr lang="en-US" sz="1600" dirty="0">
                         <a:solidFill>
@@ -4831,7 +4898,17 @@
                             </a:schemeClr>
                           </a:solidFill>
                         </a:rPr>
-                        <a:t>Bigpoints</a:t>
+                        <a:t>b</a:t>
+                      </a:r>
+                      <a:r>
+                        <a:rPr lang="en-US" sz="1600" dirty="0" err="1" smtClean="0">
+                          <a:solidFill>
+                            <a:schemeClr val="accent4">
+                              <a:lumMod val="75000"/>
+                            </a:schemeClr>
+                          </a:solidFill>
+                        </a:rPr>
+                        <a:t>igpoints</a:t>
                       </a:r>
                       <a:endParaRPr lang="en-US" sz="1600" dirty="0">
                         <a:solidFill>
@@ -4974,6 +5051,1929 @@
     <p:extLst>
       <p:ext uri="{BB962C8B-B14F-4D97-AF65-F5344CB8AC3E}">
         <p14:creationId xmlns:p14="http://schemas.microsoft.com/office/powerpoint/2010/main" val="361970089"/>
+      </p:ext>
+    </p:extLst>
+  </p:cSld>
+  <p:clrMapOvr>
+    <a:masterClrMapping/>
+  </p:clrMapOvr>
+</p:sld>
+</file>
+
+<file path=ppt/slides/slide2.xml><?xml version="1.0" encoding="utf-8"?>
+<p:sld xmlns:a="http://schemas.openxmlformats.org/drawingml/2006/main" xmlns:r="http://schemas.openxmlformats.org/officeDocument/2006/relationships" xmlns:p="http://schemas.openxmlformats.org/presentationml/2006/main">
+  <p:cSld>
+    <p:bg>
+      <p:bgPr>
+        <a:solidFill>
+          <a:srgbClr val="E5E5E5"/>
+        </a:solidFill>
+        <a:effectLst/>
+      </p:bgPr>
+    </p:bg>
+    <p:spTree>
+      <p:nvGrpSpPr>
+        <p:cNvPr id="1" name=""/>
+        <p:cNvGrpSpPr/>
+        <p:nvPr/>
+      </p:nvGrpSpPr>
+      <p:grpSpPr>
+        <a:xfrm>
+          <a:off x="0" y="0"/>
+          <a:ext cx="0" cy="0"/>
+          <a:chOff x="0" y="0"/>
+          <a:chExt cx="0" cy="0"/>
+        </a:xfrm>
+      </p:grpSpPr>
+      <p:pic>
+        <p:nvPicPr>
+          <p:cNvPr id="3" name="Picture 2"/>
+          <p:cNvPicPr>
+            <a:picLocks noChangeAspect="1"/>
+          </p:cNvPicPr>
+          <p:nvPr/>
+        </p:nvPicPr>
+        <p:blipFill>
+          <a:blip r:embed="rId2" cstate="print">
+            <a:extLst>
+              <a:ext uri="{28A0092B-C50C-407E-A947-70E740481C1C}">
+                <a14:useLocalDpi xmlns:a14="http://schemas.microsoft.com/office/drawing/2010/main" val="0"/>
+              </a:ext>
+            </a:extLst>
+          </a:blip>
+          <a:stretch>
+            <a:fillRect/>
+          </a:stretch>
+        </p:blipFill>
+        <p:spPr>
+          <a:xfrm>
+            <a:off x="2163620" y="681631"/>
+            <a:ext cx="8506985" cy="5077978"/>
+          </a:xfrm>
+          <a:prstGeom prst="rect">
+            <a:avLst/>
+          </a:prstGeom>
+        </p:spPr>
+      </p:pic>
+      <p:sp>
+        <p:nvSpPr>
+          <p:cNvPr id="7" name="Left Brace 6"/>
+          <p:cNvSpPr/>
+          <p:nvPr/>
+        </p:nvSpPr>
+        <p:spPr>
+          <a:xfrm rot="5400000">
+            <a:off x="6347525" y="-3635691"/>
+            <a:ext cx="125152" cy="8484148"/>
+          </a:xfrm>
+          <a:prstGeom prst="leftBrace">
+            <a:avLst>
+              <a:gd name="adj1" fmla="val 79717"/>
+              <a:gd name="adj2" fmla="val 50000"/>
+            </a:avLst>
+          </a:prstGeom>
+          <a:ln w="19050"/>
+        </p:spPr>
+        <p:style>
+          <a:lnRef idx="1">
+            <a:schemeClr val="accent1"/>
+          </a:lnRef>
+          <a:fillRef idx="0">
+            <a:schemeClr val="accent1"/>
+          </a:fillRef>
+          <a:effectRef idx="0">
+            <a:schemeClr val="accent1"/>
+          </a:effectRef>
+          <a:fontRef idx="minor">
+            <a:schemeClr val="tx1"/>
+          </a:fontRef>
+        </p:style>
+        <p:txBody>
+          <a:bodyPr rtlCol="0" anchor="ctr"/>
+          <a:lstStyle/>
+          <a:p>
+            <a:pPr algn="ctr"/>
+            <a:endParaRPr lang="en-US" sz="1801"/>
+          </a:p>
+        </p:txBody>
+      </p:sp>
+      <p:sp>
+        <p:nvSpPr>
+          <p:cNvPr id="8" name="TextBox 7"/>
+          <p:cNvSpPr txBox="1"/>
+          <p:nvPr/>
+        </p:nvSpPr>
+        <p:spPr>
+          <a:xfrm>
+            <a:off x="5900036" y="187544"/>
+            <a:ext cx="1020130" cy="369460"/>
+          </a:xfrm>
+          <a:prstGeom prst="rect">
+            <a:avLst/>
+          </a:prstGeom>
+          <a:noFill/>
+        </p:spPr>
+        <p:txBody>
+          <a:bodyPr wrap="square" rtlCol="0">
+            <a:spAutoFit/>
+          </a:bodyPr>
+          <a:lstStyle/>
+          <a:p>
+            <a:pPr algn="ctr"/>
+            <a:r>
+              <a:rPr lang="en-US" sz="1801" dirty="0">
+                <a:solidFill>
+                  <a:schemeClr val="accent1"/>
+                </a:solidFill>
+              </a:rPr>
+              <a:t>width</a:t>
+            </a:r>
+          </a:p>
+        </p:txBody>
+      </p:sp>
+      <p:sp>
+        <p:nvSpPr>
+          <p:cNvPr id="9" name="Left Brace 8"/>
+          <p:cNvSpPr/>
+          <p:nvPr/>
+        </p:nvSpPr>
+        <p:spPr>
+          <a:xfrm>
+            <a:off x="2026846" y="713135"/>
+            <a:ext cx="107024" cy="5047790"/>
+          </a:xfrm>
+          <a:prstGeom prst="leftBrace">
+            <a:avLst>
+              <a:gd name="adj1" fmla="val 79717"/>
+              <a:gd name="adj2" fmla="val 50000"/>
+            </a:avLst>
+          </a:prstGeom>
+          <a:ln w="19050"/>
+        </p:spPr>
+        <p:style>
+          <a:lnRef idx="1">
+            <a:schemeClr val="accent1"/>
+          </a:lnRef>
+          <a:fillRef idx="0">
+            <a:schemeClr val="accent1"/>
+          </a:fillRef>
+          <a:effectRef idx="0">
+            <a:schemeClr val="accent1"/>
+          </a:effectRef>
+          <a:fontRef idx="minor">
+            <a:schemeClr val="tx1"/>
+          </a:fontRef>
+        </p:style>
+        <p:txBody>
+          <a:bodyPr rtlCol="0" anchor="ctr"/>
+          <a:lstStyle/>
+          <a:p>
+            <a:pPr algn="ctr"/>
+            <a:endParaRPr lang="en-US" sz="1801"/>
+          </a:p>
+        </p:txBody>
+      </p:sp>
+      <p:sp>
+        <p:nvSpPr>
+          <p:cNvPr id="10" name="TextBox 9"/>
+          <p:cNvSpPr txBox="1"/>
+          <p:nvPr/>
+        </p:nvSpPr>
+        <p:spPr>
+          <a:xfrm>
+            <a:off x="1147897" y="3052365"/>
+            <a:ext cx="1020130" cy="369460"/>
+          </a:xfrm>
+          <a:prstGeom prst="rect">
+            <a:avLst/>
+          </a:prstGeom>
+          <a:noFill/>
+        </p:spPr>
+        <p:txBody>
+          <a:bodyPr wrap="square" rtlCol="0">
+            <a:spAutoFit/>
+          </a:bodyPr>
+          <a:lstStyle/>
+          <a:p>
+            <a:r>
+              <a:rPr lang="en-US" sz="1801" dirty="0">
+                <a:solidFill>
+                  <a:schemeClr val="accent1"/>
+                </a:solidFill>
+              </a:rPr>
+              <a:t>height</a:t>
+            </a:r>
+          </a:p>
+        </p:txBody>
+      </p:sp>
+      <p:sp>
+        <p:nvSpPr>
+          <p:cNvPr id="14" name="Left Brace 13"/>
+          <p:cNvSpPr/>
+          <p:nvPr/>
+        </p:nvSpPr>
+        <p:spPr>
+          <a:xfrm rot="10800000">
+            <a:off x="10695298" y="1049368"/>
+            <a:ext cx="112084" cy="59056"/>
+          </a:xfrm>
+          <a:prstGeom prst="leftBrace">
+            <a:avLst>
+              <a:gd name="adj1" fmla="val 79717"/>
+              <a:gd name="adj2" fmla="val 50000"/>
+            </a:avLst>
+          </a:prstGeom>
+          <a:ln w="19050">
+            <a:solidFill>
+              <a:srgbClr val="7030A0"/>
+            </a:solidFill>
+          </a:ln>
+        </p:spPr>
+        <p:style>
+          <a:lnRef idx="1">
+            <a:schemeClr val="accent1"/>
+          </a:lnRef>
+          <a:fillRef idx="0">
+            <a:schemeClr val="accent1"/>
+          </a:fillRef>
+          <a:effectRef idx="0">
+            <a:schemeClr val="accent1"/>
+          </a:effectRef>
+          <a:fontRef idx="minor">
+            <a:schemeClr val="tx1"/>
+          </a:fontRef>
+        </p:style>
+        <p:txBody>
+          <a:bodyPr rtlCol="0" anchor="ctr"/>
+          <a:lstStyle/>
+          <a:p>
+            <a:pPr algn="ctr"/>
+            <a:endParaRPr lang="en-US" sz="1801"/>
+          </a:p>
+        </p:txBody>
+      </p:sp>
+      <p:sp>
+        <p:nvSpPr>
+          <p:cNvPr id="18" name="TextBox 17"/>
+          <p:cNvSpPr txBox="1"/>
+          <p:nvPr/>
+        </p:nvSpPr>
+        <p:spPr>
+          <a:xfrm>
+            <a:off x="10862321" y="745607"/>
+            <a:ext cx="2025359" cy="369460"/>
+          </a:xfrm>
+          <a:prstGeom prst="rect">
+            <a:avLst/>
+          </a:prstGeom>
+          <a:noFill/>
+        </p:spPr>
+        <p:txBody>
+          <a:bodyPr wrap="square" rtlCol="0">
+            <a:spAutoFit/>
+          </a:bodyPr>
+          <a:lstStyle/>
+          <a:p>
+            <a:r>
+              <a:rPr lang="en-US" sz="1801" dirty="0" err="1">
+                <a:solidFill>
+                  <a:srgbClr val="7030A0"/>
+                </a:solidFill>
+              </a:rPr>
+              <a:t>margin_legend_t</a:t>
+            </a:r>
+            <a:endParaRPr lang="en-US" sz="1801" dirty="0">
+              <a:solidFill>
+                <a:srgbClr val="7030A0"/>
+              </a:solidFill>
+            </a:endParaRPr>
+          </a:p>
+        </p:txBody>
+      </p:sp>
+      <p:sp>
+        <p:nvSpPr>
+          <p:cNvPr id="19" name="Left Brace 18"/>
+          <p:cNvSpPr/>
+          <p:nvPr/>
+        </p:nvSpPr>
+        <p:spPr>
+          <a:xfrm rot="10800000">
+            <a:off x="10700360" y="1278749"/>
+            <a:ext cx="112084" cy="123818"/>
+          </a:xfrm>
+          <a:prstGeom prst="leftBrace">
+            <a:avLst>
+              <a:gd name="adj1" fmla="val 79717"/>
+              <a:gd name="adj2" fmla="val 50000"/>
+            </a:avLst>
+          </a:prstGeom>
+          <a:ln w="19050">
+            <a:solidFill>
+              <a:schemeClr val="accent6"/>
+            </a:solidFill>
+          </a:ln>
+        </p:spPr>
+        <p:style>
+          <a:lnRef idx="1">
+            <a:schemeClr val="accent1"/>
+          </a:lnRef>
+          <a:fillRef idx="0">
+            <a:schemeClr val="accent1"/>
+          </a:fillRef>
+          <a:effectRef idx="0">
+            <a:schemeClr val="accent1"/>
+          </a:effectRef>
+          <a:fontRef idx="minor">
+            <a:schemeClr val="tx1"/>
+          </a:fontRef>
+        </p:style>
+        <p:txBody>
+          <a:bodyPr rtlCol="0" anchor="ctr"/>
+          <a:lstStyle/>
+          <a:p>
+            <a:pPr algn="ctr"/>
+            <a:endParaRPr lang="en-US" sz="1801"/>
+          </a:p>
+        </p:txBody>
+      </p:sp>
+      <p:sp>
+        <p:nvSpPr>
+          <p:cNvPr id="20" name="TextBox 19"/>
+          <p:cNvSpPr txBox="1"/>
+          <p:nvPr/>
+        </p:nvSpPr>
+        <p:spPr>
+          <a:xfrm>
+            <a:off x="10862319" y="1199512"/>
+            <a:ext cx="2025359" cy="369460"/>
+          </a:xfrm>
+          <a:prstGeom prst="rect">
+            <a:avLst/>
+          </a:prstGeom>
+          <a:noFill/>
+        </p:spPr>
+        <p:txBody>
+          <a:bodyPr wrap="square" rtlCol="0">
+            <a:spAutoFit/>
+          </a:bodyPr>
+          <a:lstStyle/>
+          <a:p>
+            <a:r>
+              <a:rPr lang="en-US" sz="1801" dirty="0" err="1">
+                <a:solidFill>
+                  <a:schemeClr val="accent6"/>
+                </a:solidFill>
+              </a:rPr>
+              <a:t>margin_legend_b</a:t>
+            </a:r>
+            <a:endParaRPr lang="en-US" sz="1801" dirty="0">
+              <a:solidFill>
+                <a:schemeClr val="accent6"/>
+              </a:solidFill>
+            </a:endParaRPr>
+          </a:p>
+        </p:txBody>
+      </p:sp>
+      <p:sp>
+        <p:nvSpPr>
+          <p:cNvPr id="21" name="Left Brace 20"/>
+          <p:cNvSpPr/>
+          <p:nvPr/>
+        </p:nvSpPr>
+        <p:spPr>
+          <a:xfrm rot="10800000">
+            <a:off x="10677301" y="5485870"/>
+            <a:ext cx="112084" cy="59056"/>
+          </a:xfrm>
+          <a:prstGeom prst="leftBrace">
+            <a:avLst>
+              <a:gd name="adj1" fmla="val 79717"/>
+              <a:gd name="adj2" fmla="val 50000"/>
+            </a:avLst>
+          </a:prstGeom>
+          <a:ln w="19050">
+            <a:solidFill>
+              <a:srgbClr val="7030A0"/>
+            </a:solidFill>
+          </a:ln>
+        </p:spPr>
+        <p:style>
+          <a:lnRef idx="1">
+            <a:schemeClr val="accent1"/>
+          </a:lnRef>
+          <a:fillRef idx="0">
+            <a:schemeClr val="accent1"/>
+          </a:fillRef>
+          <a:effectRef idx="0">
+            <a:schemeClr val="accent1"/>
+          </a:effectRef>
+          <a:fontRef idx="minor">
+            <a:schemeClr val="tx1"/>
+          </a:fontRef>
+        </p:style>
+        <p:txBody>
+          <a:bodyPr rtlCol="0" anchor="ctr"/>
+          <a:lstStyle/>
+          <a:p>
+            <a:pPr algn="ctr"/>
+            <a:endParaRPr lang="en-US" sz="1801"/>
+          </a:p>
+        </p:txBody>
+      </p:sp>
+      <p:sp>
+        <p:nvSpPr>
+          <p:cNvPr id="22" name="TextBox 21"/>
+          <p:cNvSpPr txBox="1"/>
+          <p:nvPr/>
+        </p:nvSpPr>
+        <p:spPr>
+          <a:xfrm>
+            <a:off x="10862318" y="5301203"/>
+            <a:ext cx="2025359" cy="369460"/>
+          </a:xfrm>
+          <a:prstGeom prst="rect">
+            <a:avLst/>
+          </a:prstGeom>
+          <a:noFill/>
+        </p:spPr>
+        <p:txBody>
+          <a:bodyPr wrap="square" rtlCol="0">
+            <a:spAutoFit/>
+          </a:bodyPr>
+          <a:lstStyle/>
+          <a:p>
+            <a:r>
+              <a:rPr lang="en-US" sz="1801" dirty="0" err="1">
+                <a:solidFill>
+                  <a:srgbClr val="7030A0"/>
+                </a:solidFill>
+              </a:rPr>
+              <a:t>margin_plot_b</a:t>
+            </a:r>
+            <a:endParaRPr lang="en-US" sz="1801" dirty="0">
+              <a:solidFill>
+                <a:srgbClr val="7030A0"/>
+              </a:solidFill>
+            </a:endParaRPr>
+          </a:p>
+        </p:txBody>
+      </p:sp>
+      <p:sp>
+        <p:nvSpPr>
+          <p:cNvPr id="25" name="Left Brace 24"/>
+          <p:cNvSpPr/>
+          <p:nvPr/>
+        </p:nvSpPr>
+        <p:spPr>
+          <a:xfrm rot="10800000" flipH="1">
+            <a:off x="1941701" y="708372"/>
+            <a:ext cx="112084" cy="59056"/>
+          </a:xfrm>
+          <a:prstGeom prst="leftBrace">
+            <a:avLst>
+              <a:gd name="adj1" fmla="val 79717"/>
+              <a:gd name="adj2" fmla="val 50000"/>
+            </a:avLst>
+          </a:prstGeom>
+          <a:ln w="19050">
+            <a:solidFill>
+              <a:srgbClr val="7030A0"/>
+            </a:solidFill>
+          </a:ln>
+        </p:spPr>
+        <p:style>
+          <a:lnRef idx="1">
+            <a:schemeClr val="accent1"/>
+          </a:lnRef>
+          <a:fillRef idx="0">
+            <a:schemeClr val="accent1"/>
+          </a:fillRef>
+          <a:effectRef idx="0">
+            <a:schemeClr val="accent1"/>
+          </a:effectRef>
+          <a:fontRef idx="minor">
+            <a:schemeClr val="tx1"/>
+          </a:fontRef>
+        </p:style>
+        <p:txBody>
+          <a:bodyPr rtlCol="0" anchor="ctr"/>
+          <a:lstStyle/>
+          <a:p>
+            <a:pPr algn="ctr"/>
+            <a:endParaRPr lang="en-US" sz="1801"/>
+          </a:p>
+        </p:txBody>
+      </p:sp>
+      <p:sp>
+        <p:nvSpPr>
+          <p:cNvPr id="26" name="Left Brace 25"/>
+          <p:cNvSpPr/>
+          <p:nvPr/>
+        </p:nvSpPr>
+        <p:spPr>
+          <a:xfrm rot="10800000" flipH="1">
+            <a:off x="1941701" y="964233"/>
+            <a:ext cx="112084" cy="59056"/>
+          </a:xfrm>
+          <a:prstGeom prst="leftBrace">
+            <a:avLst>
+              <a:gd name="adj1" fmla="val 79717"/>
+              <a:gd name="adj2" fmla="val 50000"/>
+            </a:avLst>
+          </a:prstGeom>
+          <a:ln w="19050">
+            <a:solidFill>
+              <a:srgbClr val="7030A0"/>
+            </a:solidFill>
+          </a:ln>
+        </p:spPr>
+        <p:style>
+          <a:lnRef idx="1">
+            <a:schemeClr val="accent1"/>
+          </a:lnRef>
+          <a:fillRef idx="0">
+            <a:schemeClr val="accent1"/>
+          </a:fillRef>
+          <a:effectRef idx="0">
+            <a:schemeClr val="accent1"/>
+          </a:effectRef>
+          <a:fontRef idx="minor">
+            <a:schemeClr val="tx1"/>
+          </a:fontRef>
+        </p:style>
+        <p:txBody>
+          <a:bodyPr rtlCol="0" anchor="ctr"/>
+          <a:lstStyle/>
+          <a:p>
+            <a:pPr algn="ctr"/>
+            <a:endParaRPr lang="en-US" sz="1801"/>
+          </a:p>
+        </p:txBody>
+      </p:sp>
+      <p:sp>
+        <p:nvSpPr>
+          <p:cNvPr id="28" name="Left Brace 27"/>
+          <p:cNvSpPr/>
+          <p:nvPr/>
+        </p:nvSpPr>
+        <p:spPr>
+          <a:xfrm rot="10800000" flipH="1">
+            <a:off x="1914760" y="5695935"/>
+            <a:ext cx="112084" cy="59056"/>
+          </a:xfrm>
+          <a:prstGeom prst="leftBrace">
+            <a:avLst>
+              <a:gd name="adj1" fmla="val 79717"/>
+              <a:gd name="adj2" fmla="val 50000"/>
+            </a:avLst>
+          </a:prstGeom>
+          <a:ln w="19050">
+            <a:solidFill>
+              <a:srgbClr val="7030A0"/>
+            </a:solidFill>
+          </a:ln>
+        </p:spPr>
+        <p:style>
+          <a:lnRef idx="1">
+            <a:schemeClr val="accent1"/>
+          </a:lnRef>
+          <a:fillRef idx="0">
+            <a:schemeClr val="accent1"/>
+          </a:fillRef>
+          <a:effectRef idx="0">
+            <a:schemeClr val="accent1"/>
+          </a:effectRef>
+          <a:fontRef idx="minor">
+            <a:schemeClr val="tx1"/>
+          </a:fontRef>
+        </p:style>
+        <p:txBody>
+          <a:bodyPr rtlCol="0" anchor="ctr"/>
+          <a:lstStyle/>
+          <a:p>
+            <a:pPr algn="ctr"/>
+            <a:endParaRPr lang="en-US" sz="1801"/>
+          </a:p>
+        </p:txBody>
+      </p:sp>
+      <p:sp>
+        <p:nvSpPr>
+          <p:cNvPr id="29" name="Left Brace 28"/>
+          <p:cNvSpPr/>
+          <p:nvPr/>
+        </p:nvSpPr>
+        <p:spPr>
+          <a:xfrm rot="5400000" flipH="1">
+            <a:off x="2141513" y="5851399"/>
+            <a:ext cx="112084" cy="59056"/>
+          </a:xfrm>
+          <a:prstGeom prst="leftBrace">
+            <a:avLst>
+              <a:gd name="adj1" fmla="val 79717"/>
+              <a:gd name="adj2" fmla="val 50000"/>
+            </a:avLst>
+          </a:prstGeom>
+          <a:ln w="19050">
+            <a:solidFill>
+              <a:srgbClr val="7030A0"/>
+            </a:solidFill>
+          </a:ln>
+        </p:spPr>
+        <p:style>
+          <a:lnRef idx="1">
+            <a:schemeClr val="accent1"/>
+          </a:lnRef>
+          <a:fillRef idx="0">
+            <a:schemeClr val="accent1"/>
+          </a:fillRef>
+          <a:effectRef idx="0">
+            <a:schemeClr val="accent1"/>
+          </a:effectRef>
+          <a:fontRef idx="minor">
+            <a:schemeClr val="tx1"/>
+          </a:fontRef>
+        </p:style>
+        <p:txBody>
+          <a:bodyPr rtlCol="0" anchor="ctr"/>
+          <a:lstStyle/>
+          <a:p>
+            <a:pPr algn="ctr"/>
+            <a:endParaRPr lang="en-US" sz="1801"/>
+          </a:p>
+        </p:txBody>
+      </p:sp>
+      <p:sp>
+        <p:nvSpPr>
+          <p:cNvPr id="30" name="Left Brace 29"/>
+          <p:cNvSpPr/>
+          <p:nvPr/>
+        </p:nvSpPr>
+        <p:spPr>
+          <a:xfrm rot="5400000" flipH="1">
+            <a:off x="4174760" y="5819427"/>
+            <a:ext cx="112084" cy="123009"/>
+          </a:xfrm>
+          <a:prstGeom prst="leftBrace">
+            <a:avLst>
+              <a:gd name="adj1" fmla="val 79717"/>
+              <a:gd name="adj2" fmla="val 50000"/>
+            </a:avLst>
+          </a:prstGeom>
+          <a:ln w="19050">
+            <a:solidFill>
+              <a:srgbClr val="7030A0"/>
+            </a:solidFill>
+          </a:ln>
+        </p:spPr>
+        <p:style>
+          <a:lnRef idx="1">
+            <a:schemeClr val="accent1"/>
+          </a:lnRef>
+          <a:fillRef idx="0">
+            <a:schemeClr val="accent1"/>
+          </a:fillRef>
+          <a:effectRef idx="0">
+            <a:schemeClr val="accent1"/>
+          </a:effectRef>
+          <a:fontRef idx="minor">
+            <a:schemeClr val="tx1"/>
+          </a:fontRef>
+        </p:style>
+        <p:txBody>
+          <a:bodyPr rtlCol="0" anchor="ctr"/>
+          <a:lstStyle/>
+          <a:p>
+            <a:pPr algn="ctr"/>
+            <a:endParaRPr lang="en-US" sz="1801"/>
+          </a:p>
+        </p:txBody>
+      </p:sp>
+      <p:sp>
+        <p:nvSpPr>
+          <p:cNvPr id="31" name="Left Brace 30"/>
+          <p:cNvSpPr/>
+          <p:nvPr/>
+        </p:nvSpPr>
+        <p:spPr>
+          <a:xfrm rot="5400000" flipH="1">
+            <a:off x="10547950" y="5807616"/>
+            <a:ext cx="112084" cy="146620"/>
+          </a:xfrm>
+          <a:prstGeom prst="leftBrace">
+            <a:avLst>
+              <a:gd name="adj1" fmla="val 33569"/>
+              <a:gd name="adj2" fmla="val 50000"/>
+            </a:avLst>
+          </a:prstGeom>
+          <a:ln w="19050">
+            <a:solidFill>
+              <a:srgbClr val="7030A0"/>
+            </a:solidFill>
+          </a:ln>
+        </p:spPr>
+        <p:style>
+          <a:lnRef idx="1">
+            <a:schemeClr val="accent1"/>
+          </a:lnRef>
+          <a:fillRef idx="0">
+            <a:schemeClr val="accent1"/>
+          </a:fillRef>
+          <a:effectRef idx="0">
+            <a:schemeClr val="accent1"/>
+          </a:effectRef>
+          <a:fontRef idx="minor">
+            <a:schemeClr val="tx1"/>
+          </a:fontRef>
+        </p:style>
+        <p:txBody>
+          <a:bodyPr rtlCol="0" anchor="ctr"/>
+          <a:lstStyle/>
+          <a:p>
+            <a:pPr algn="ctr"/>
+            <a:endParaRPr lang="en-US" sz="1801"/>
+          </a:p>
+        </p:txBody>
+      </p:sp>
+      <p:sp>
+        <p:nvSpPr>
+          <p:cNvPr id="32" name="TextBox 31"/>
+          <p:cNvSpPr txBox="1"/>
+          <p:nvPr/>
+        </p:nvSpPr>
+        <p:spPr>
+          <a:xfrm>
+            <a:off x="-139697" y="506955"/>
+            <a:ext cx="2025359" cy="646587"/>
+          </a:xfrm>
+          <a:prstGeom prst="rect">
+            <a:avLst/>
+          </a:prstGeom>
+          <a:noFill/>
+        </p:spPr>
+        <p:txBody>
+          <a:bodyPr wrap="square" rtlCol="0">
+            <a:spAutoFit/>
+          </a:bodyPr>
+          <a:lstStyle/>
+          <a:p>
+            <a:pPr algn="r"/>
+            <a:r>
+              <a:rPr lang="en-US" sz="1801" dirty="0" err="1" smtClean="0">
+                <a:solidFill>
+                  <a:srgbClr val="7030A0"/>
+                </a:solidFill>
+              </a:rPr>
+              <a:t>margin_title_t</a:t>
+            </a:r>
+            <a:endParaRPr lang="en-US" sz="1801" dirty="0" smtClean="0">
+              <a:solidFill>
+                <a:srgbClr val="7030A0"/>
+              </a:solidFill>
+            </a:endParaRPr>
+          </a:p>
+          <a:p>
+            <a:pPr algn="r"/>
+            <a:r>
+              <a:rPr lang="en-US" sz="1801" dirty="0" err="1" smtClean="0">
+                <a:solidFill>
+                  <a:srgbClr val="7030A0"/>
+                </a:solidFill>
+              </a:rPr>
+              <a:t>margin_topline_t</a:t>
+            </a:r>
+            <a:endParaRPr lang="en-US" sz="1801" dirty="0">
+              <a:solidFill>
+                <a:srgbClr val="7030A0"/>
+              </a:solidFill>
+            </a:endParaRPr>
+          </a:p>
+        </p:txBody>
+      </p:sp>
+      <p:sp>
+        <p:nvSpPr>
+          <p:cNvPr id="34" name="TextBox 33"/>
+          <p:cNvSpPr txBox="1"/>
+          <p:nvPr/>
+        </p:nvSpPr>
+        <p:spPr>
+          <a:xfrm>
+            <a:off x="-139696" y="5531817"/>
+            <a:ext cx="2025359" cy="369460"/>
+          </a:xfrm>
+          <a:prstGeom prst="rect">
+            <a:avLst/>
+          </a:prstGeom>
+          <a:noFill/>
+        </p:spPr>
+        <p:txBody>
+          <a:bodyPr wrap="square" rtlCol="0">
+            <a:spAutoFit/>
+          </a:bodyPr>
+          <a:lstStyle/>
+          <a:p>
+            <a:pPr algn="r"/>
+            <a:r>
+              <a:rPr lang="en-US" sz="1801" dirty="0" err="1">
+                <a:solidFill>
+                  <a:srgbClr val="7030A0"/>
+                </a:solidFill>
+              </a:rPr>
+              <a:t>margin_caption_b</a:t>
+            </a:r>
+            <a:endParaRPr lang="en-US" sz="1801" dirty="0">
+              <a:solidFill>
+                <a:srgbClr val="7030A0"/>
+              </a:solidFill>
+            </a:endParaRPr>
+          </a:p>
+        </p:txBody>
+      </p:sp>
+      <p:sp>
+        <p:nvSpPr>
+          <p:cNvPr id="35" name="TextBox 34"/>
+          <p:cNvSpPr txBox="1"/>
+          <p:nvPr/>
+        </p:nvSpPr>
+        <p:spPr>
+          <a:xfrm>
+            <a:off x="1147897" y="5979481"/>
+            <a:ext cx="10997211" cy="369460"/>
+          </a:xfrm>
+          <a:prstGeom prst="rect">
+            <a:avLst/>
+          </a:prstGeom>
+          <a:noFill/>
+        </p:spPr>
+        <p:txBody>
+          <a:bodyPr wrap="square" rtlCol="0">
+            <a:spAutoFit/>
+          </a:bodyPr>
+          <a:lstStyle/>
+          <a:p>
+            <a:r>
+              <a:rPr lang="en-US" sz="1801" dirty="0" err="1" smtClean="0">
+                <a:solidFill>
+                  <a:srgbClr val="7030A0"/>
+                </a:solidFill>
+              </a:rPr>
+              <a:t>margin_sidebar_l</a:t>
+            </a:r>
+            <a:r>
+              <a:rPr lang="en-US" sz="1801" dirty="0" smtClean="0">
+                <a:solidFill>
+                  <a:srgbClr val="7030A0"/>
+                </a:solidFill>
+              </a:rPr>
+              <a:t>              </a:t>
+            </a:r>
+            <a:r>
+              <a:rPr lang="en-US" sz="1801" dirty="0" err="1" smtClean="0">
+                <a:solidFill>
+                  <a:srgbClr val="7030A0"/>
+                </a:solidFill>
+              </a:rPr>
+              <a:t>margin_plot_l</a:t>
+            </a:r>
+            <a:r>
+              <a:rPr lang="en-US" sz="1801" dirty="0" smtClean="0">
+                <a:solidFill>
+                  <a:srgbClr val="7030A0"/>
+                </a:solidFill>
+              </a:rPr>
+              <a:t>                                                                               </a:t>
+            </a:r>
+            <a:r>
+              <a:rPr lang="en-US" sz="1801" dirty="0" err="1">
+                <a:solidFill>
+                  <a:schemeClr val="accent4">
+                    <a:lumMod val="75000"/>
+                  </a:schemeClr>
+                </a:solidFill>
+              </a:rPr>
+              <a:t>margin_panel_r</a:t>
+            </a:r>
+            <a:r>
+              <a:rPr lang="en-US" sz="1801" dirty="0">
+                <a:solidFill>
+                  <a:srgbClr val="7030A0"/>
+                </a:solidFill>
+              </a:rPr>
+              <a:t>  </a:t>
+            </a:r>
+            <a:r>
+              <a:rPr lang="en-US" sz="1801" dirty="0" err="1">
+                <a:solidFill>
+                  <a:srgbClr val="7030A0"/>
+                </a:solidFill>
+              </a:rPr>
+              <a:t>margin_plot_r</a:t>
+            </a:r>
+            <a:endParaRPr lang="en-US" sz="1801" dirty="0">
+              <a:solidFill>
+                <a:srgbClr val="7030A0"/>
+              </a:solidFill>
+            </a:endParaRPr>
+          </a:p>
+        </p:txBody>
+      </p:sp>
+      <p:sp>
+        <p:nvSpPr>
+          <p:cNvPr id="39" name="Left Brace 38"/>
+          <p:cNvSpPr/>
+          <p:nvPr/>
+        </p:nvSpPr>
+        <p:spPr>
+          <a:xfrm rot="5400000" flipH="1">
+            <a:off x="10410173" y="5826004"/>
+            <a:ext cx="112084" cy="109836"/>
+          </a:xfrm>
+          <a:prstGeom prst="leftBrace">
+            <a:avLst>
+              <a:gd name="adj1" fmla="val 25000"/>
+              <a:gd name="adj2" fmla="val 50000"/>
+            </a:avLst>
+          </a:prstGeom>
+          <a:ln w="19050">
+            <a:solidFill>
+              <a:schemeClr val="accent4">
+                <a:lumMod val="75000"/>
+              </a:schemeClr>
+            </a:solidFill>
+          </a:ln>
+        </p:spPr>
+        <p:style>
+          <a:lnRef idx="1">
+            <a:schemeClr val="accent1"/>
+          </a:lnRef>
+          <a:fillRef idx="0">
+            <a:schemeClr val="accent1"/>
+          </a:fillRef>
+          <a:effectRef idx="0">
+            <a:schemeClr val="accent1"/>
+          </a:effectRef>
+          <a:fontRef idx="minor">
+            <a:schemeClr val="tx1"/>
+          </a:fontRef>
+        </p:style>
+        <p:txBody>
+          <a:bodyPr rtlCol="0" anchor="ctr"/>
+          <a:lstStyle/>
+          <a:p>
+            <a:pPr algn="ctr"/>
+            <a:endParaRPr lang="en-US" sz="1801"/>
+          </a:p>
+        </p:txBody>
+      </p:sp>
+      <p:graphicFrame>
+        <p:nvGraphicFramePr>
+          <p:cNvPr id="2" name="Table 1"/>
+          <p:cNvGraphicFramePr>
+            <a:graphicFrameLocks noGrp="1"/>
+          </p:cNvGraphicFramePr>
+          <p:nvPr>
+            <p:extLst>
+              <p:ext uri="{D42A27DB-BD31-4B8C-83A1-F6EECF244321}">
+                <p14:modId xmlns:p14="http://schemas.microsoft.com/office/powerpoint/2010/main" val="3053236634"/>
+              </p:ext>
+            </p:extLst>
+          </p:nvPr>
+        </p:nvGraphicFramePr>
+        <p:xfrm>
+          <a:off x="1617376" y="6630541"/>
+          <a:ext cx="9599480" cy="1341124"/>
+        </p:xfrm>
+        <a:graphic>
+          <a:graphicData uri="http://schemas.openxmlformats.org/drawingml/2006/table">
+            <a:tbl>
+              <a:tblPr firstRow="1">
+                <a:tableStyleId>{9D7B26C5-4107-4FEC-AEDC-1716B250A1EF}</a:tableStyleId>
+              </a:tblPr>
+              <a:tblGrid>
+                <a:gridCol w="1919896">
+                  <a:extLst>
+                    <a:ext uri="{9D8B030D-6E8A-4147-A177-3AD203B41FA5}">
+                      <a16:colId xmlns:a16="http://schemas.microsoft.com/office/drawing/2014/main" val="1726367728"/>
+                    </a:ext>
+                  </a:extLst>
+                </a:gridCol>
+                <a:gridCol w="1919896">
+                  <a:extLst>
+                    <a:ext uri="{9D8B030D-6E8A-4147-A177-3AD203B41FA5}">
+                      <a16:colId xmlns:a16="http://schemas.microsoft.com/office/drawing/2014/main" val="2547402049"/>
+                    </a:ext>
+                  </a:extLst>
+                </a:gridCol>
+                <a:gridCol w="1919896">
+                  <a:extLst>
+                    <a:ext uri="{9D8B030D-6E8A-4147-A177-3AD203B41FA5}">
+                      <a16:colId xmlns:a16="http://schemas.microsoft.com/office/drawing/2014/main" val="3673652927"/>
+                    </a:ext>
+                  </a:extLst>
+                </a:gridCol>
+                <a:gridCol w="1919896">
+                  <a:extLst>
+                    <a:ext uri="{9D8B030D-6E8A-4147-A177-3AD203B41FA5}">
+                      <a16:colId xmlns:a16="http://schemas.microsoft.com/office/drawing/2014/main" val="2865016860"/>
+                    </a:ext>
+                  </a:extLst>
+                </a:gridCol>
+                <a:gridCol w="1919896">
+                  <a:extLst>
+                    <a:ext uri="{9D8B030D-6E8A-4147-A177-3AD203B41FA5}">
+                      <a16:colId xmlns:a16="http://schemas.microsoft.com/office/drawing/2014/main" val="1345919768"/>
+                    </a:ext>
+                  </a:extLst>
+                </a:gridCol>
+              </a:tblGrid>
+              <a:tr h="335281">
+                <a:tc gridSpan="5">
+                  <a:txBody>
+                    <a:bodyPr/>
+                    <a:lstStyle/>
+                    <a:p>
+                      <a:pPr algn="ctr"/>
+                      <a:r>
+                        <a:rPr lang="en-US" sz="1600" dirty="0"/>
+                        <a:t>Legend</a:t>
+                      </a:r>
+                    </a:p>
+                  </a:txBody>
+                  <a:tcPr anchor="ctr">
+                    <a:lnL w="12700" cap="flat" cmpd="sng" algn="ctr">
+                      <a:solidFill>
+                        <a:schemeClr val="tx1"/>
+                      </a:solidFill>
+                      <a:prstDash val="solid"/>
+                      <a:round/>
+                      <a:headEnd type="none" w="med" len="med"/>
+                      <a:tailEnd type="none" w="med" len="med"/>
+                    </a:lnL>
+                    <a:lnR w="12700" cap="flat" cmpd="sng" algn="ctr">
+                      <a:solidFill>
+                        <a:schemeClr val="tx1"/>
+                      </a:solidFill>
+                      <a:prstDash val="solid"/>
+                      <a:round/>
+                      <a:headEnd type="none" w="med" len="med"/>
+                      <a:tailEnd type="none" w="med" len="med"/>
+                    </a:lnR>
+                    <a:lnT w="12700" cap="flat" cmpd="sng" algn="ctr">
+                      <a:solidFill>
+                        <a:schemeClr val="tx1"/>
+                      </a:solidFill>
+                      <a:prstDash val="solid"/>
+                      <a:round/>
+                      <a:headEnd type="none" w="med" len="med"/>
+                      <a:tailEnd type="none" w="med" len="med"/>
+                    </a:lnT>
+                  </a:tcPr>
+                </a:tc>
+                <a:tc hMerge="1">
+                  <a:txBody>
+                    <a:bodyPr/>
+                    <a:lstStyle/>
+                    <a:p>
+                      <a:pPr algn="ctr"/>
+                      <a:endParaRPr lang="en-US" sz="1600" dirty="0">
+                        <a:solidFill>
+                          <a:schemeClr val="accent1"/>
+                        </a:solidFill>
+                      </a:endParaRPr>
+                    </a:p>
+                  </a:txBody>
+                  <a:tcPr anchor="ctr"/>
+                </a:tc>
+                <a:tc hMerge="1">
+                  <a:txBody>
+                    <a:bodyPr/>
+                    <a:lstStyle/>
+                    <a:p>
+                      <a:pPr algn="ctr"/>
+                      <a:endParaRPr lang="en-US" sz="1600" dirty="0">
+                        <a:solidFill>
+                          <a:srgbClr val="7030A0"/>
+                        </a:solidFill>
+                      </a:endParaRPr>
+                    </a:p>
+                  </a:txBody>
+                  <a:tcPr anchor="ctr"/>
+                </a:tc>
+                <a:tc hMerge="1">
+                  <a:txBody>
+                    <a:bodyPr/>
+                    <a:lstStyle/>
+                    <a:p>
+                      <a:pPr algn="ctr"/>
+                      <a:endParaRPr lang="en-US" sz="1600" dirty="0">
+                        <a:solidFill>
+                          <a:schemeClr val="accent6"/>
+                        </a:solidFill>
+                      </a:endParaRPr>
+                    </a:p>
+                  </a:txBody>
+                  <a:tcPr anchor="ctr"/>
+                </a:tc>
+                <a:tc hMerge="1">
+                  <a:txBody>
+                    <a:bodyPr/>
+                    <a:lstStyle/>
+                    <a:p>
+                      <a:pPr algn="ctr"/>
+                      <a:endParaRPr lang="en-US" sz="1600" dirty="0">
+                        <a:solidFill>
+                          <a:schemeClr val="accent4">
+                            <a:lumMod val="75000"/>
+                          </a:schemeClr>
+                        </a:solidFill>
+                      </a:endParaRPr>
+                    </a:p>
+                  </a:txBody>
+                  <a:tcPr anchor="ctr"/>
+                </a:tc>
+                <a:extLst>
+                  <a:ext uri="{0D108BD9-81ED-4DB2-BD59-A6C34878D82A}">
+                    <a16:rowId xmlns:a16="http://schemas.microsoft.com/office/drawing/2014/main" val="3253321914"/>
+                  </a:ext>
+                </a:extLst>
+              </a:tr>
+              <a:tr h="335281">
+                <a:tc>
+                  <a:txBody>
+                    <a:bodyPr/>
+                    <a:lstStyle/>
+                    <a:p>
+                      <a:pPr algn="r"/>
+                      <a:r>
+                        <a:rPr lang="en-US" sz="1600" dirty="0"/>
+                        <a:t>Where to </a:t>
+                      </a:r>
+                      <a:r>
+                        <a:rPr lang="en-US" sz="1600" dirty="0" smtClean="0"/>
+                        <a:t>set:</a:t>
+                      </a:r>
+                      <a:endParaRPr lang="en-US" sz="1600" dirty="0"/>
+                    </a:p>
+                  </a:txBody>
+                  <a:tcPr anchor="ctr">
+                    <a:lnL w="12700" cap="flat" cmpd="sng" algn="ctr">
+                      <a:solidFill>
+                        <a:schemeClr val="tx1"/>
+                      </a:solidFill>
+                      <a:prstDash val="solid"/>
+                      <a:round/>
+                      <a:headEnd type="none" w="med" len="med"/>
+                      <a:tailEnd type="none" w="med" len="med"/>
+                    </a:lnL>
+                    <a:lnB w="12700" cap="flat" cmpd="sng" algn="ctr">
+                      <a:solidFill>
+                        <a:schemeClr val="tx1"/>
+                      </a:solidFill>
+                      <a:prstDash val="dot"/>
+                      <a:round/>
+                      <a:headEnd type="none" w="med" len="med"/>
+                      <a:tailEnd type="none" w="med" len="med"/>
+                    </a:lnB>
+                  </a:tcPr>
+                </a:tc>
+                <a:tc>
+                  <a:txBody>
+                    <a:bodyPr/>
+                    <a:lstStyle/>
+                    <a:p>
+                      <a:pPr algn="ctr"/>
+                      <a:r>
+                        <a:rPr lang="en-US" sz="1600" dirty="0" err="1">
+                          <a:solidFill>
+                            <a:schemeClr val="accent1"/>
+                          </a:solidFill>
+                        </a:rPr>
+                        <a:t>f</a:t>
+                      </a:r>
+                      <a:r>
+                        <a:rPr lang="en-US" sz="1600" dirty="0" err="1" smtClean="0">
+                          <a:solidFill>
+                            <a:schemeClr val="accent1"/>
+                          </a:solidFill>
+                        </a:rPr>
+                        <a:t>inalize_plot</a:t>
+                      </a:r>
+                      <a:r>
+                        <a:rPr lang="en-US" sz="1600" dirty="0">
+                          <a:solidFill>
+                            <a:schemeClr val="accent1"/>
+                          </a:solidFill>
+                        </a:rPr>
+                        <a:t>()</a:t>
+                      </a:r>
+                    </a:p>
+                  </a:txBody>
+                  <a:tcPr anchor="ctr">
+                    <a:lnB w="12700" cap="flat" cmpd="sng" algn="ctr">
+                      <a:solidFill>
+                        <a:schemeClr val="tx1"/>
+                      </a:solidFill>
+                      <a:prstDash val="dot"/>
+                      <a:round/>
+                      <a:headEnd type="none" w="med" len="med"/>
+                      <a:tailEnd type="none" w="med" len="med"/>
+                    </a:lnB>
+                  </a:tcPr>
+                </a:tc>
+                <a:tc>
+                  <a:txBody>
+                    <a:bodyPr/>
+                    <a:lstStyle/>
+                    <a:p>
+                      <a:pPr algn="ctr"/>
+                      <a:r>
+                        <a:rPr lang="en-US" sz="1600" dirty="0" err="1">
+                          <a:solidFill>
+                            <a:srgbClr val="7030A0"/>
+                          </a:solidFill>
+                        </a:rPr>
+                        <a:t>f</a:t>
+                      </a:r>
+                      <a:r>
+                        <a:rPr lang="en-US" sz="1600" dirty="0" err="1" smtClean="0">
+                          <a:solidFill>
+                            <a:srgbClr val="7030A0"/>
+                          </a:solidFill>
+                        </a:rPr>
+                        <a:t>inalize_plot</a:t>
+                      </a:r>
+                      <a:r>
+                        <a:rPr lang="en-US" sz="1600" dirty="0">
+                          <a:solidFill>
+                            <a:srgbClr val="7030A0"/>
+                          </a:solidFill>
+                        </a:rPr>
+                        <a:t>()</a:t>
+                      </a:r>
+                    </a:p>
+                  </a:txBody>
+                  <a:tcPr anchor="ctr">
+                    <a:lnB w="12700" cap="flat" cmpd="sng" algn="ctr">
+                      <a:solidFill>
+                        <a:schemeClr val="tx1"/>
+                      </a:solidFill>
+                      <a:prstDash val="dot"/>
+                      <a:round/>
+                      <a:headEnd type="none" w="med" len="med"/>
+                      <a:tailEnd type="none" w="med" len="med"/>
+                    </a:lnB>
+                  </a:tcPr>
+                </a:tc>
+                <a:tc>
+                  <a:txBody>
+                    <a:bodyPr/>
+                    <a:lstStyle/>
+                    <a:p>
+                      <a:pPr algn="ctr"/>
+                      <a:r>
+                        <a:rPr lang="en-US" sz="1600" dirty="0">
+                          <a:solidFill>
+                            <a:schemeClr val="accent6"/>
+                          </a:solidFill>
+                        </a:rPr>
+                        <a:t>e</a:t>
+                      </a:r>
+                      <a:r>
+                        <a:rPr lang="en-US" sz="1600" dirty="0" smtClean="0">
+                          <a:solidFill>
+                            <a:schemeClr val="accent6"/>
+                          </a:solidFill>
+                        </a:rPr>
+                        <a:t>ither </a:t>
+                      </a:r>
+                      <a:r>
+                        <a:rPr lang="en-US" sz="1600" dirty="0">
+                          <a:solidFill>
+                            <a:schemeClr val="accent6"/>
+                          </a:solidFill>
+                        </a:rPr>
+                        <a:t>function</a:t>
+                      </a:r>
+                    </a:p>
+                  </a:txBody>
+                  <a:tcPr anchor="ctr">
+                    <a:lnB w="12700" cap="flat" cmpd="sng" algn="ctr">
+                      <a:solidFill>
+                        <a:schemeClr val="tx1"/>
+                      </a:solidFill>
+                      <a:prstDash val="dot"/>
+                      <a:round/>
+                      <a:headEnd type="none" w="med" len="med"/>
+                      <a:tailEnd type="none" w="med" len="med"/>
+                    </a:lnB>
+                  </a:tcPr>
+                </a:tc>
+                <a:tc>
+                  <a:txBody>
+                    <a:bodyPr/>
+                    <a:lstStyle/>
+                    <a:p>
+                      <a:pPr algn="ctr"/>
+                      <a:r>
+                        <a:rPr lang="en-US" sz="1600" dirty="0" err="1">
+                          <a:solidFill>
+                            <a:schemeClr val="accent4">
+                              <a:lumMod val="75000"/>
+                            </a:schemeClr>
+                          </a:solidFill>
+                        </a:rPr>
+                        <a:t>t</a:t>
+                      </a:r>
+                      <a:r>
+                        <a:rPr lang="en-US" sz="1600" dirty="0" err="1" smtClean="0">
+                          <a:solidFill>
+                            <a:schemeClr val="accent4">
+                              <a:lumMod val="75000"/>
+                            </a:schemeClr>
+                          </a:solidFill>
+                        </a:rPr>
+                        <a:t>heme_cmap</a:t>
+                      </a:r>
+                      <a:r>
+                        <a:rPr lang="en-US" sz="1600" dirty="0">
+                          <a:solidFill>
+                            <a:schemeClr val="accent4">
+                              <a:lumMod val="75000"/>
+                            </a:schemeClr>
+                          </a:solidFill>
+                        </a:rPr>
+                        <a:t>()</a:t>
+                      </a:r>
+                    </a:p>
+                  </a:txBody>
+                  <a:tcPr anchor="ctr">
+                    <a:lnR w="12700" cap="flat" cmpd="sng" algn="ctr">
+                      <a:solidFill>
+                        <a:schemeClr val="tx1"/>
+                      </a:solidFill>
+                      <a:prstDash val="solid"/>
+                      <a:round/>
+                      <a:headEnd type="none" w="med" len="med"/>
+                      <a:tailEnd type="none" w="med" len="med"/>
+                    </a:lnR>
+                    <a:lnB w="12700" cap="flat" cmpd="sng" algn="ctr">
+                      <a:solidFill>
+                        <a:schemeClr val="tx1"/>
+                      </a:solidFill>
+                      <a:prstDash val="dot"/>
+                      <a:round/>
+                      <a:headEnd type="none" w="med" len="med"/>
+                      <a:tailEnd type="none" w="med" len="med"/>
+                    </a:lnB>
+                  </a:tcPr>
+                </a:tc>
+                <a:extLst>
+                  <a:ext uri="{0D108BD9-81ED-4DB2-BD59-A6C34878D82A}">
+                    <a16:rowId xmlns:a16="http://schemas.microsoft.com/office/drawing/2014/main" val="227351936"/>
+                  </a:ext>
+                </a:extLst>
+              </a:tr>
+              <a:tr h="335281">
+                <a:tc>
+                  <a:txBody>
+                    <a:bodyPr/>
+                    <a:lstStyle/>
+                    <a:p>
+                      <a:pPr algn="r"/>
+                      <a:r>
+                        <a:rPr lang="en-US" sz="1600" dirty="0" smtClean="0"/>
+                        <a:t>How to set:</a:t>
+                      </a:r>
+                      <a:endParaRPr lang="en-US" sz="1600" dirty="0"/>
+                    </a:p>
+                  </a:txBody>
+                  <a:tcPr anchor="ctr">
+                    <a:lnL w="12700" cap="flat" cmpd="sng" algn="ctr">
+                      <a:solidFill>
+                        <a:schemeClr val="tx1"/>
+                      </a:solidFill>
+                      <a:prstDash val="solid"/>
+                      <a:round/>
+                      <a:headEnd type="none" w="med" len="med"/>
+                      <a:tailEnd type="none" w="med" len="med"/>
+                    </a:lnL>
+                    <a:lnT w="12700" cap="flat" cmpd="sng" algn="ctr">
+                      <a:solidFill>
+                        <a:schemeClr val="tx1"/>
+                      </a:solidFill>
+                      <a:prstDash val="dot"/>
+                      <a:round/>
+                      <a:headEnd type="none" w="med" len="med"/>
+                      <a:tailEnd type="none" w="med" len="med"/>
+                    </a:lnT>
+                    <a:lnB w="12700" cap="flat" cmpd="sng" algn="ctr">
+                      <a:solidFill>
+                        <a:schemeClr val="tx1"/>
+                      </a:solidFill>
+                      <a:prstDash val="dot"/>
+                      <a:round/>
+                      <a:headEnd type="none" w="med" len="med"/>
+                      <a:tailEnd type="none" w="med" len="med"/>
+                    </a:lnB>
+                  </a:tcPr>
+                </a:tc>
+                <a:tc>
+                  <a:txBody>
+                    <a:bodyPr/>
+                    <a:lstStyle/>
+                    <a:p>
+                      <a:pPr algn="ctr"/>
+                      <a:r>
+                        <a:rPr lang="en-US" sz="1600" dirty="0" smtClean="0">
+                          <a:solidFill>
+                            <a:schemeClr val="accent1"/>
+                          </a:solidFill>
+                        </a:rPr>
+                        <a:t>Arguments</a:t>
+                      </a:r>
+                      <a:endParaRPr lang="en-US" sz="1600" dirty="0">
+                        <a:solidFill>
+                          <a:schemeClr val="accent1"/>
+                        </a:solidFill>
+                      </a:endParaRPr>
+                    </a:p>
+                  </a:txBody>
+                  <a:tcPr anchor="ctr">
+                    <a:lnT w="12700" cap="flat" cmpd="sng" algn="ctr">
+                      <a:solidFill>
+                        <a:schemeClr val="tx1"/>
+                      </a:solidFill>
+                      <a:prstDash val="dot"/>
+                      <a:round/>
+                      <a:headEnd type="none" w="med" len="med"/>
+                      <a:tailEnd type="none" w="med" len="med"/>
+                    </a:lnT>
+                    <a:lnB w="12700" cap="flat" cmpd="sng" algn="ctr">
+                      <a:solidFill>
+                        <a:schemeClr val="tx1"/>
+                      </a:solidFill>
+                      <a:prstDash val="dot"/>
+                      <a:round/>
+                      <a:headEnd type="none" w="med" len="med"/>
+                      <a:tailEnd type="none" w="med" len="med"/>
+                    </a:lnB>
+                  </a:tcPr>
+                </a:tc>
+                <a:tc>
+                  <a:txBody>
+                    <a:bodyPr/>
+                    <a:lstStyle/>
+                    <a:p>
+                      <a:pPr algn="ctr"/>
+                      <a:r>
+                        <a:rPr lang="en-US" sz="1600" dirty="0" smtClean="0">
+                          <a:solidFill>
+                            <a:srgbClr val="7030A0"/>
+                          </a:solidFill>
+                        </a:rPr>
+                        <a:t>overrides</a:t>
+                      </a:r>
+                      <a:endParaRPr lang="en-US" sz="1600" dirty="0">
+                        <a:solidFill>
+                          <a:srgbClr val="7030A0"/>
+                        </a:solidFill>
+                      </a:endParaRPr>
+                    </a:p>
+                  </a:txBody>
+                  <a:tcPr anchor="ctr">
+                    <a:lnT w="12700" cap="flat" cmpd="sng" algn="ctr">
+                      <a:solidFill>
+                        <a:schemeClr val="tx1"/>
+                      </a:solidFill>
+                      <a:prstDash val="dot"/>
+                      <a:round/>
+                      <a:headEnd type="none" w="med" len="med"/>
+                      <a:tailEnd type="none" w="med" len="med"/>
+                    </a:lnT>
+                    <a:lnB w="12700" cap="flat" cmpd="sng" algn="ctr">
+                      <a:solidFill>
+                        <a:schemeClr val="tx1"/>
+                      </a:solidFill>
+                      <a:prstDash val="dot"/>
+                      <a:round/>
+                      <a:headEnd type="none" w="med" len="med"/>
+                      <a:tailEnd type="none" w="med" len="med"/>
+                    </a:lnB>
+                  </a:tcPr>
+                </a:tc>
+                <a:tc>
+                  <a:txBody>
+                    <a:bodyPr/>
+                    <a:lstStyle/>
+                    <a:p>
+                      <a:pPr algn="ctr"/>
+                      <a:r>
+                        <a:rPr lang="en-US" sz="1600" dirty="0" smtClean="0">
+                          <a:solidFill>
+                            <a:schemeClr val="accent6"/>
+                          </a:solidFill>
+                        </a:rPr>
+                        <a:t>overrides</a:t>
+                      </a:r>
+                      <a:endParaRPr lang="en-US" sz="1600" dirty="0">
+                        <a:solidFill>
+                          <a:schemeClr val="accent6"/>
+                        </a:solidFill>
+                      </a:endParaRPr>
+                    </a:p>
+                  </a:txBody>
+                  <a:tcPr anchor="ctr">
+                    <a:lnT w="12700" cap="flat" cmpd="sng" algn="ctr">
+                      <a:solidFill>
+                        <a:schemeClr val="tx1"/>
+                      </a:solidFill>
+                      <a:prstDash val="dot"/>
+                      <a:round/>
+                      <a:headEnd type="none" w="med" len="med"/>
+                      <a:tailEnd type="none" w="med" len="med"/>
+                    </a:lnT>
+                    <a:lnB w="12700" cap="flat" cmpd="sng" algn="ctr">
+                      <a:solidFill>
+                        <a:schemeClr val="tx1"/>
+                      </a:solidFill>
+                      <a:prstDash val="dot"/>
+                      <a:round/>
+                      <a:headEnd type="none" w="med" len="med"/>
+                      <a:tailEnd type="none" w="med" len="med"/>
+                    </a:lnB>
+                  </a:tcPr>
+                </a:tc>
+                <a:tc>
+                  <a:txBody>
+                    <a:bodyPr/>
+                    <a:lstStyle/>
+                    <a:p>
+                      <a:pPr algn="ctr"/>
+                      <a:r>
+                        <a:rPr lang="en-US" sz="1600" dirty="0" smtClean="0">
+                          <a:solidFill>
+                            <a:schemeClr val="accent4">
+                              <a:lumMod val="75000"/>
+                            </a:schemeClr>
+                          </a:solidFill>
+                        </a:rPr>
+                        <a:t>overrides</a:t>
+                      </a:r>
+                      <a:endParaRPr lang="en-US" sz="1600" dirty="0">
+                        <a:solidFill>
+                          <a:schemeClr val="accent4">
+                            <a:lumMod val="75000"/>
+                          </a:schemeClr>
+                        </a:solidFill>
+                      </a:endParaRPr>
+                    </a:p>
+                  </a:txBody>
+                  <a:tcPr anchor="ctr">
+                    <a:lnR w="12700" cap="flat" cmpd="sng" algn="ctr">
+                      <a:solidFill>
+                        <a:schemeClr val="tx1"/>
+                      </a:solidFill>
+                      <a:prstDash val="solid"/>
+                      <a:round/>
+                      <a:headEnd type="none" w="med" len="med"/>
+                      <a:tailEnd type="none" w="med" len="med"/>
+                    </a:lnR>
+                    <a:lnT w="12700" cap="flat" cmpd="sng" algn="ctr">
+                      <a:solidFill>
+                        <a:schemeClr val="tx1"/>
+                      </a:solidFill>
+                      <a:prstDash val="dot"/>
+                      <a:round/>
+                      <a:headEnd type="none" w="med" len="med"/>
+                      <a:tailEnd type="none" w="med" len="med"/>
+                    </a:lnT>
+                    <a:lnB w="12700" cap="flat" cmpd="sng" algn="ctr">
+                      <a:solidFill>
+                        <a:schemeClr val="tx1"/>
+                      </a:solidFill>
+                      <a:prstDash val="dot"/>
+                      <a:round/>
+                      <a:headEnd type="none" w="med" len="med"/>
+                      <a:tailEnd type="none" w="med" len="med"/>
+                    </a:lnB>
+                  </a:tcPr>
+                </a:tc>
+                <a:extLst>
+                  <a:ext uri="{0D108BD9-81ED-4DB2-BD59-A6C34878D82A}">
+                    <a16:rowId xmlns:a16="http://schemas.microsoft.com/office/drawing/2014/main" val="1310112458"/>
+                  </a:ext>
+                </a:extLst>
+              </a:tr>
+              <a:tr h="335281">
+                <a:tc>
+                  <a:txBody>
+                    <a:bodyPr/>
+                    <a:lstStyle/>
+                    <a:p>
+                      <a:pPr algn="r"/>
+                      <a:r>
+                        <a:rPr lang="en-US" sz="1600" dirty="0"/>
+                        <a:t>Units:</a:t>
+                      </a:r>
+                    </a:p>
+                  </a:txBody>
+                  <a:tcPr anchor="ctr">
+                    <a:lnL w="12700" cap="flat" cmpd="sng" algn="ctr">
+                      <a:solidFill>
+                        <a:schemeClr val="tx1"/>
+                      </a:solidFill>
+                      <a:prstDash val="solid"/>
+                      <a:round/>
+                      <a:headEnd type="none" w="med" len="med"/>
+                      <a:tailEnd type="none" w="med" len="med"/>
+                    </a:lnL>
+                    <a:lnT w="12700" cap="flat" cmpd="sng" algn="ctr">
+                      <a:solidFill>
+                        <a:schemeClr val="tx1"/>
+                      </a:solidFill>
+                      <a:prstDash val="dot"/>
+                      <a:round/>
+                      <a:headEnd type="none" w="med" len="med"/>
+                      <a:tailEnd type="none" w="med" len="med"/>
+                    </a:lnT>
+                    <a:lnB w="12700" cap="flat" cmpd="sng" algn="ctr">
+                      <a:solidFill>
+                        <a:schemeClr val="tx1"/>
+                      </a:solidFill>
+                      <a:prstDash val="solid"/>
+                      <a:round/>
+                      <a:headEnd type="none" w="med" len="med"/>
+                      <a:tailEnd type="none" w="med" len="med"/>
+                    </a:lnB>
+                  </a:tcPr>
+                </a:tc>
+                <a:tc>
+                  <a:txBody>
+                    <a:bodyPr/>
+                    <a:lstStyle/>
+                    <a:p>
+                      <a:pPr algn="ctr"/>
+                      <a:r>
+                        <a:rPr lang="en-US" sz="1600" dirty="0">
+                          <a:solidFill>
+                            <a:schemeClr val="accent1"/>
+                          </a:solidFill>
+                        </a:rPr>
+                        <a:t>Inches</a:t>
+                      </a:r>
+                    </a:p>
+                  </a:txBody>
+                  <a:tcPr anchor="ctr">
+                    <a:lnT w="12700" cap="flat" cmpd="sng" algn="ctr">
+                      <a:solidFill>
+                        <a:schemeClr val="tx1"/>
+                      </a:solidFill>
+                      <a:prstDash val="dot"/>
+                      <a:round/>
+                      <a:headEnd type="none" w="med" len="med"/>
+                      <a:tailEnd type="none" w="med" len="med"/>
+                    </a:lnT>
+                    <a:lnB w="12700" cap="flat" cmpd="sng" algn="ctr">
+                      <a:solidFill>
+                        <a:schemeClr val="tx1"/>
+                      </a:solidFill>
+                      <a:prstDash val="solid"/>
+                      <a:round/>
+                      <a:headEnd type="none" w="med" len="med"/>
+                      <a:tailEnd type="none" w="med" len="med"/>
+                    </a:lnB>
+                  </a:tcPr>
+                </a:tc>
+                <a:tc>
+                  <a:txBody>
+                    <a:bodyPr/>
+                    <a:lstStyle/>
+                    <a:p>
+                      <a:pPr algn="ctr"/>
+                      <a:r>
+                        <a:rPr lang="en-US" sz="1600" dirty="0" err="1">
+                          <a:solidFill>
+                            <a:srgbClr val="7030A0"/>
+                          </a:solidFill>
+                        </a:rPr>
+                        <a:t>b</a:t>
+                      </a:r>
+                      <a:r>
+                        <a:rPr lang="en-US" sz="1600" dirty="0" err="1" smtClean="0">
+                          <a:solidFill>
+                            <a:srgbClr val="7030A0"/>
+                          </a:solidFill>
+                        </a:rPr>
+                        <a:t>igpoints</a:t>
+                      </a:r>
+                      <a:endParaRPr lang="en-US" sz="1600" dirty="0">
+                        <a:solidFill>
+                          <a:srgbClr val="7030A0"/>
+                        </a:solidFill>
+                      </a:endParaRPr>
+                    </a:p>
+                  </a:txBody>
+                  <a:tcPr anchor="ctr">
+                    <a:lnT w="12700" cap="flat" cmpd="sng" algn="ctr">
+                      <a:solidFill>
+                        <a:schemeClr val="tx1"/>
+                      </a:solidFill>
+                      <a:prstDash val="dot"/>
+                      <a:round/>
+                      <a:headEnd type="none" w="med" len="med"/>
+                      <a:tailEnd type="none" w="med" len="med"/>
+                    </a:lnT>
+                    <a:lnB w="12700" cap="flat" cmpd="sng" algn="ctr">
+                      <a:solidFill>
+                        <a:schemeClr val="tx1"/>
+                      </a:solidFill>
+                      <a:prstDash val="solid"/>
+                      <a:round/>
+                      <a:headEnd type="none" w="med" len="med"/>
+                      <a:tailEnd type="none" w="med" len="med"/>
+                    </a:lnB>
+                  </a:tcPr>
+                </a:tc>
+                <a:tc>
+                  <a:txBody>
+                    <a:bodyPr/>
+                    <a:lstStyle/>
+                    <a:p>
+                      <a:pPr algn="ctr"/>
+                      <a:r>
+                        <a:rPr lang="en-US" sz="1600" dirty="0" err="1">
+                          <a:solidFill>
+                            <a:schemeClr val="accent6"/>
+                          </a:solidFill>
+                        </a:rPr>
+                        <a:t>b</a:t>
+                      </a:r>
+                      <a:r>
+                        <a:rPr lang="en-US" sz="1600" dirty="0" err="1" smtClean="0">
+                          <a:solidFill>
+                            <a:schemeClr val="accent6"/>
+                          </a:solidFill>
+                        </a:rPr>
+                        <a:t>igpoints</a:t>
+                      </a:r>
+                      <a:endParaRPr lang="en-US" sz="1600" dirty="0">
+                        <a:solidFill>
+                          <a:schemeClr val="accent6"/>
+                        </a:solidFill>
+                      </a:endParaRPr>
+                    </a:p>
+                  </a:txBody>
+                  <a:tcPr anchor="ctr">
+                    <a:lnT w="12700" cap="flat" cmpd="sng" algn="ctr">
+                      <a:solidFill>
+                        <a:schemeClr val="tx1"/>
+                      </a:solidFill>
+                      <a:prstDash val="dot"/>
+                      <a:round/>
+                      <a:headEnd type="none" w="med" len="med"/>
+                      <a:tailEnd type="none" w="med" len="med"/>
+                    </a:lnT>
+                    <a:lnB w="12700" cap="flat" cmpd="sng" algn="ctr">
+                      <a:solidFill>
+                        <a:schemeClr val="tx1"/>
+                      </a:solidFill>
+                      <a:prstDash val="solid"/>
+                      <a:round/>
+                      <a:headEnd type="none" w="med" len="med"/>
+                      <a:tailEnd type="none" w="med" len="med"/>
+                    </a:lnB>
+                  </a:tcPr>
+                </a:tc>
+                <a:tc>
+                  <a:txBody>
+                    <a:bodyPr/>
+                    <a:lstStyle/>
+                    <a:p>
+                      <a:pPr algn="ctr"/>
+                      <a:r>
+                        <a:rPr lang="en-US" sz="1600" dirty="0" err="1">
+                          <a:solidFill>
+                            <a:schemeClr val="accent4">
+                              <a:lumMod val="75000"/>
+                            </a:schemeClr>
+                          </a:solidFill>
+                        </a:rPr>
+                        <a:t>b</a:t>
+                      </a:r>
+                      <a:r>
+                        <a:rPr lang="en-US" sz="1600" dirty="0" err="1" smtClean="0">
+                          <a:solidFill>
+                            <a:schemeClr val="accent4">
+                              <a:lumMod val="75000"/>
+                            </a:schemeClr>
+                          </a:solidFill>
+                        </a:rPr>
+                        <a:t>igpoints</a:t>
+                      </a:r>
+                      <a:endParaRPr lang="en-US" sz="1600" dirty="0">
+                        <a:solidFill>
+                          <a:schemeClr val="accent4">
+                            <a:lumMod val="75000"/>
+                          </a:schemeClr>
+                        </a:solidFill>
+                      </a:endParaRPr>
+                    </a:p>
+                  </a:txBody>
+                  <a:tcPr anchor="ctr">
+                    <a:lnR w="12700" cap="flat" cmpd="sng" algn="ctr">
+                      <a:solidFill>
+                        <a:schemeClr val="tx1"/>
+                      </a:solidFill>
+                      <a:prstDash val="solid"/>
+                      <a:round/>
+                      <a:headEnd type="none" w="med" len="med"/>
+                      <a:tailEnd type="none" w="med" len="med"/>
+                    </a:lnR>
+                    <a:lnT w="12700" cap="flat" cmpd="sng" algn="ctr">
+                      <a:solidFill>
+                        <a:schemeClr val="tx1"/>
+                      </a:solidFill>
+                      <a:prstDash val="dot"/>
+                      <a:round/>
+                      <a:headEnd type="none" w="med" len="med"/>
+                      <a:tailEnd type="none" w="med" len="med"/>
+                    </a:lnT>
+                    <a:lnB w="12700" cap="flat" cmpd="sng" algn="ctr">
+                      <a:solidFill>
+                        <a:schemeClr val="tx1"/>
+                      </a:solidFill>
+                      <a:prstDash val="solid"/>
+                      <a:round/>
+                      <a:headEnd type="none" w="med" len="med"/>
+                      <a:tailEnd type="none" w="med" len="med"/>
+                    </a:lnB>
+                  </a:tcPr>
+                </a:tc>
+                <a:extLst>
+                  <a:ext uri="{0D108BD9-81ED-4DB2-BD59-A6C34878D82A}">
+                    <a16:rowId xmlns:a16="http://schemas.microsoft.com/office/drawing/2014/main" val="57019421"/>
+                  </a:ext>
+                </a:extLst>
+              </a:tr>
+            </a:tbl>
+          </a:graphicData>
+        </a:graphic>
+      </p:graphicFrame>
+      <p:sp>
+        <p:nvSpPr>
+          <p:cNvPr id="41" name="TextBox 40">
+            <a:extLst>
+              <a:ext uri="{FF2B5EF4-FFF2-40B4-BE49-F238E27FC236}">
+                <a16:creationId xmlns:a16="http://schemas.microsoft.com/office/drawing/2014/main" id="{0B81D785-3D60-4F43-9384-1CEFD9F3D464}"/>
+              </a:ext>
+            </a:extLst>
+          </p:cNvPr>
+          <p:cNvSpPr txBox="1"/>
+          <p:nvPr/>
+        </p:nvSpPr>
+        <p:spPr>
+          <a:xfrm>
+            <a:off x="10862318" y="1679670"/>
+            <a:ext cx="1697005" cy="1815882"/>
+          </a:xfrm>
+          <a:prstGeom prst="rect">
+            <a:avLst/>
+          </a:prstGeom>
+          <a:noFill/>
+        </p:spPr>
+        <p:txBody>
+          <a:bodyPr wrap="square">
+            <a:spAutoFit/>
+          </a:bodyPr>
+          <a:lstStyle/>
+          <a:p>
+            <a:r>
+              <a:rPr lang="en-US" sz="1600" i="1" dirty="0" err="1" smtClean="0">
+                <a:solidFill>
+                  <a:schemeClr val="accent6"/>
+                </a:solidFill>
+              </a:rPr>
+              <a:t>margin_legend_i</a:t>
+            </a:r>
+            <a:r>
+              <a:rPr lang="en-US" sz="1600" i="1" dirty="0" smtClean="0">
+                <a:solidFill>
+                  <a:schemeClr val="accent6"/>
+                </a:solidFill>
+              </a:rPr>
+              <a:t>, not pictured, sets the vertical space between legends if there the plot contains more than one. </a:t>
+            </a:r>
+            <a:endParaRPr lang="en-US" sz="1600" i="1" dirty="0">
+              <a:solidFill>
+                <a:schemeClr val="accent6"/>
+              </a:solidFill>
+            </a:endParaRPr>
+          </a:p>
+        </p:txBody>
+      </p:sp>
+    </p:spTree>
+    <p:extLst>
+      <p:ext uri="{BB962C8B-B14F-4D97-AF65-F5344CB8AC3E}">
+        <p14:creationId xmlns:p14="http://schemas.microsoft.com/office/powerpoint/2010/main" val="1733635091"/>
       </p:ext>
     </p:extLst>
   </p:cSld>

</xml_diff>